<commit_message>
change file Final Task.pptx
</commit_message>
<xml_diff>
--- a/Andrii Kozak Final Task.pptx
+++ b/Andrii Kozak Final Task.pptx
@@ -6,8 +6,24 @@
   </p:sldMasterIdLst>
   <p:sldIdLst>
     <p:sldId id="256" r:id="rId2"/>
-    <p:sldId id="257" r:id="rId3"/>
-    <p:sldId id="258" r:id="rId4"/>
+    <p:sldId id="259" r:id="rId3"/>
+    <p:sldId id="257" r:id="rId4"/>
+    <p:sldId id="258" r:id="rId5"/>
+    <p:sldId id="260" r:id="rId6"/>
+    <p:sldId id="261" r:id="rId7"/>
+    <p:sldId id="264" r:id="rId8"/>
+    <p:sldId id="262" r:id="rId9"/>
+    <p:sldId id="263" r:id="rId10"/>
+    <p:sldId id="265" r:id="rId11"/>
+    <p:sldId id="266" r:id="rId12"/>
+    <p:sldId id="267" r:id="rId13"/>
+    <p:sldId id="268" r:id="rId14"/>
+    <p:sldId id="269" r:id="rId15"/>
+    <p:sldId id="270" r:id="rId16"/>
+    <p:sldId id="271" r:id="rId17"/>
+    <p:sldId id="272" r:id="rId18"/>
+    <p:sldId id="273" r:id="rId19"/>
+    <p:sldId id="274" r:id="rId20"/>
   </p:sldIdLst>
   <p:sldSz cx="9144000" cy="6858000" type="screen4x3"/>
   <p:notesSz cx="6858000" cy="9144000"/>
@@ -283,7 +299,7 @@
             <a:fld id="{89440FFE-F3CD-419C-A9E1-16B94B217D40}" type="datetimeFigureOut">
               <a:rPr lang="en-US" smtClean="0"/>
               <a:pPr/>
-              <a:t>12-Mar-21</a:t>
+              <a:t>14-Mar-21</a:t>
             </a:fld>
             <a:endParaRPr lang="en-US"/>
           </a:p>
@@ -450,7 +466,7 @@
             <a:fld id="{89440FFE-F3CD-419C-A9E1-16B94B217D40}" type="datetimeFigureOut">
               <a:rPr lang="en-US" smtClean="0"/>
               <a:pPr/>
-              <a:t>12-Mar-21</a:t>
+              <a:t>14-Mar-21</a:t>
             </a:fld>
             <a:endParaRPr lang="en-US"/>
           </a:p>
@@ -627,7 +643,7 @@
             <a:fld id="{89440FFE-F3CD-419C-A9E1-16B94B217D40}" type="datetimeFigureOut">
               <a:rPr lang="en-US" smtClean="0"/>
               <a:pPr/>
-              <a:t>12-Mar-21</a:t>
+              <a:t>14-Mar-21</a:t>
             </a:fld>
             <a:endParaRPr lang="en-US"/>
           </a:p>
@@ -794,7 +810,7 @@
             <a:fld id="{89440FFE-F3CD-419C-A9E1-16B94B217D40}" type="datetimeFigureOut">
               <a:rPr lang="en-US" smtClean="0"/>
               <a:pPr/>
-              <a:t>12-Mar-21</a:t>
+              <a:t>14-Mar-21</a:t>
             </a:fld>
             <a:endParaRPr lang="en-US"/>
           </a:p>
@@ -1038,7 +1054,7 @@
             <a:fld id="{89440FFE-F3CD-419C-A9E1-16B94B217D40}" type="datetimeFigureOut">
               <a:rPr lang="en-US" smtClean="0"/>
               <a:pPr/>
-              <a:t>12-Mar-21</a:t>
+              <a:t>14-Mar-21</a:t>
             </a:fld>
             <a:endParaRPr lang="en-US"/>
           </a:p>
@@ -1304,7 +1320,7 @@
             <a:fld id="{89440FFE-F3CD-419C-A9E1-16B94B217D40}" type="datetimeFigureOut">
               <a:rPr lang="en-US" smtClean="0"/>
               <a:pPr/>
-              <a:t>12-Mar-21</a:t>
+              <a:t>14-Mar-21</a:t>
             </a:fld>
             <a:endParaRPr lang="en-US"/>
           </a:p>
@@ -1684,7 +1700,7 @@
             <a:fld id="{89440FFE-F3CD-419C-A9E1-16B94B217D40}" type="datetimeFigureOut">
               <a:rPr lang="en-US" smtClean="0"/>
               <a:pPr/>
-              <a:t>12-Mar-21</a:t>
+              <a:t>14-Mar-21</a:t>
             </a:fld>
             <a:endParaRPr lang="en-US"/>
           </a:p>
@@ -1836,7 +1852,7 @@
             <a:fld id="{89440FFE-F3CD-419C-A9E1-16B94B217D40}" type="datetimeFigureOut">
               <a:rPr lang="en-US" smtClean="0"/>
               <a:pPr/>
-              <a:t>12-Mar-21</a:t>
+              <a:t>14-Mar-21</a:t>
             </a:fld>
             <a:endParaRPr lang="en-US"/>
           </a:p>
@@ -1928,7 +1944,7 @@
             <a:fld id="{89440FFE-F3CD-419C-A9E1-16B94B217D40}" type="datetimeFigureOut">
               <a:rPr lang="en-US" smtClean="0"/>
               <a:pPr/>
-              <a:t>12-Mar-21</a:t>
+              <a:t>14-Mar-21</a:t>
             </a:fld>
             <a:endParaRPr lang="en-US"/>
           </a:p>
@@ -2191,7 +2207,7 @@
             <a:fld id="{89440FFE-F3CD-419C-A9E1-16B94B217D40}" type="datetimeFigureOut">
               <a:rPr lang="en-US" smtClean="0"/>
               <a:pPr/>
-              <a:t>12-Mar-21</a:t>
+              <a:t>14-Mar-21</a:t>
             </a:fld>
             <a:endParaRPr lang="en-US"/>
           </a:p>
@@ -2481,7 +2497,7 @@
             <a:fld id="{89440FFE-F3CD-419C-A9E1-16B94B217D40}" type="datetimeFigureOut">
               <a:rPr lang="en-US" smtClean="0"/>
               <a:pPr/>
-              <a:t>12-Mar-21</a:t>
+              <a:t>14-Mar-21</a:t>
             </a:fld>
             <a:endParaRPr lang="en-US"/>
           </a:p>
@@ -3254,7 +3270,7 @@
             <a:fld id="{89440FFE-F3CD-419C-A9E1-16B94B217D40}" type="datetimeFigureOut">
               <a:rPr lang="en-US" smtClean="0"/>
               <a:pPr/>
-              <a:t>12-Mar-21</a:t>
+              <a:t>14-Mar-21</a:t>
             </a:fld>
             <a:endParaRPr lang="en-US"/>
           </a:p>
@@ -3962,8 +3978,8 @@
                 <a:solidFill>
                   <a:schemeClr val="bg1"/>
                 </a:solidFill>
-                <a:latin typeface="Arial" pitchFamily="34" charset="0"/>
-                <a:cs typeface="Arial" pitchFamily="34" charset="0"/>
+                <a:latin typeface="Times New Roman" pitchFamily="18" charset="0"/>
+                <a:cs typeface="Times New Roman" pitchFamily="18" charset="0"/>
               </a:rPr>
               <a:t>Creating basic </a:t>
             </a:r>
@@ -3972,8 +3988,8 @@
                 <a:solidFill>
                   <a:schemeClr val="bg1"/>
                 </a:solidFill>
-                <a:latin typeface="Arial" pitchFamily="34" charset="0"/>
-                <a:cs typeface="Arial" pitchFamily="34" charset="0"/>
+                <a:latin typeface="Times New Roman" pitchFamily="18" charset="0"/>
+                <a:cs typeface="Times New Roman" pitchFamily="18" charset="0"/>
               </a:rPr>
               <a:t>DevOps</a:t>
             </a:r>
@@ -3982,8 +3998,8 @@
                 <a:solidFill>
                   <a:schemeClr val="bg1"/>
                 </a:solidFill>
-                <a:latin typeface="Arial" pitchFamily="34" charset="0"/>
-                <a:cs typeface="Arial" pitchFamily="34" charset="0"/>
+                <a:latin typeface="Times New Roman" pitchFamily="18" charset="0"/>
+                <a:cs typeface="Times New Roman" pitchFamily="18" charset="0"/>
               </a:rPr>
               <a:t> chain connecting local machine, </a:t>
             </a:r>
@@ -3992,8 +4008,8 @@
                 <a:solidFill>
                   <a:schemeClr val="bg1"/>
                 </a:solidFill>
-                <a:latin typeface="Arial" pitchFamily="34" charset="0"/>
-                <a:cs typeface="Arial" pitchFamily="34" charset="0"/>
+                <a:latin typeface="Times New Roman" pitchFamily="18" charset="0"/>
+                <a:cs typeface="Times New Roman" pitchFamily="18" charset="0"/>
               </a:rPr>
               <a:t>GitHub</a:t>
             </a:r>
@@ -4002,16 +4018,11 @@
                 <a:solidFill>
                   <a:schemeClr val="bg1"/>
                 </a:solidFill>
-                <a:latin typeface="Arial" pitchFamily="34" charset="0"/>
-                <a:cs typeface="Arial" pitchFamily="34" charset="0"/>
+                <a:latin typeface="Times New Roman" pitchFamily="18" charset="0"/>
+                <a:cs typeface="Times New Roman" pitchFamily="18" charset="0"/>
               </a:rPr>
               <a:t> repository and GCP instance</a:t>
             </a:r>
-            <a:endParaRPr lang="en-US" sz="2800" b="1" spc="100" dirty="0" smtClean="0">
-              <a:solidFill>
-                <a:schemeClr val="bg1"/>
-              </a:solidFill>
-            </a:endParaRPr>
           </a:p>
           <a:p>
             <a:endParaRPr lang="en-US" sz="2800" b="1" dirty="0" smtClean="0">
@@ -4026,8 +4037,8 @@
                 <a:solidFill>
                   <a:schemeClr val="bg1"/>
                 </a:solidFill>
-                <a:latin typeface="Arial" pitchFamily="34" charset="0"/>
-                <a:cs typeface="Arial" pitchFamily="34" charset="0"/>
+                <a:latin typeface="Times New Roman" pitchFamily="18" charset="0"/>
+                <a:cs typeface="Times New Roman" pitchFamily="18" charset="0"/>
               </a:rPr>
               <a:t>Andrii</a:t>
             </a:r>
@@ -4036,8 +4047,8 @@
                 <a:solidFill>
                   <a:schemeClr val="bg1"/>
                 </a:solidFill>
-                <a:latin typeface="Arial" pitchFamily="34" charset="0"/>
-                <a:cs typeface="Arial" pitchFamily="34" charset="0"/>
+                <a:latin typeface="Times New Roman" pitchFamily="18" charset="0"/>
+                <a:cs typeface="Times New Roman" pitchFamily="18" charset="0"/>
               </a:rPr>
               <a:t> </a:t>
             </a:r>
@@ -4046,8 +4057,8 @@
                 <a:solidFill>
                   <a:schemeClr val="bg1"/>
                 </a:solidFill>
-                <a:latin typeface="Arial" pitchFamily="34" charset="0"/>
-                <a:cs typeface="Arial" pitchFamily="34" charset="0"/>
+                <a:latin typeface="Times New Roman" pitchFamily="18" charset="0"/>
+                <a:cs typeface="Times New Roman" pitchFamily="18" charset="0"/>
               </a:rPr>
               <a:t>Kozak</a:t>
             </a:r>
@@ -4055,12 +4066,1633 @@
               <a:solidFill>
                 <a:schemeClr val="bg1"/>
               </a:solidFill>
-              <a:latin typeface="Arial" pitchFamily="34" charset="0"/>
-              <a:cs typeface="Arial" pitchFamily="34" charset="0"/>
+              <a:latin typeface="Times New Roman" pitchFamily="18" charset="0"/>
+              <a:cs typeface="Times New Roman" pitchFamily="18" charset="0"/>
             </a:endParaRPr>
           </a:p>
           <a:p>
             <a:endParaRPr lang="en-US" dirty="0"/>
+          </a:p>
+        </p:txBody>
+      </p:sp>
+    </p:spTree>
+  </p:cSld>
+  <p:clrMapOvr>
+    <a:masterClrMapping/>
+  </p:clrMapOvr>
+</p:sld>
+</file>
+
+<file path=ppt/slides/slide10.xml><?xml version="1.0" encoding="utf-8"?>
+<p:sld xmlns:a="http://schemas.openxmlformats.org/drawingml/2006/main" xmlns:r="http://schemas.openxmlformats.org/officeDocument/2006/relationships" xmlns:p="http://schemas.openxmlformats.org/presentationml/2006/main">
+  <p:cSld>
+    <p:spTree>
+      <p:nvGrpSpPr>
+        <p:cNvPr id="1" name=""/>
+        <p:cNvGrpSpPr/>
+        <p:nvPr/>
+      </p:nvGrpSpPr>
+      <p:grpSpPr>
+        <a:xfrm>
+          <a:off x="0" y="0"/>
+          <a:ext cx="0" cy="0"/>
+          <a:chOff x="0" y="0"/>
+          <a:chExt cx="0" cy="0"/>
+        </a:xfrm>
+      </p:grpSpPr>
+      <p:sp>
+        <p:nvSpPr>
+          <p:cNvPr id="2" name="Заголовок 1"/>
+          <p:cNvSpPr>
+            <a:spLocks noGrp="1"/>
+          </p:cNvSpPr>
+          <p:nvPr>
+            <p:ph type="title"/>
+          </p:nvPr>
+        </p:nvSpPr>
+        <p:spPr>
+          <a:xfrm>
+            <a:off x="457200" y="704088"/>
+            <a:ext cx="8229600" cy="667512"/>
+          </a:xfrm>
+        </p:spPr>
+        <p:txBody>
+          <a:bodyPr>
+            <a:noAutofit/>
+          </a:bodyPr>
+          <a:lstStyle/>
+          <a:p>
+            <a:pPr algn="ctr"/>
+            <a:r>
+              <a:rPr lang="en-US" sz="4500" dirty="0" smtClean="0"/>
+              <a:t>Jenkins</a:t>
+            </a:r>
+            <a:endParaRPr lang="en-US" sz="4500" dirty="0"/>
+          </a:p>
+        </p:txBody>
+      </p:sp>
+      <p:pic>
+        <p:nvPicPr>
+          <p:cNvPr id="4" name="Содержимое 3" descr="jenkins.png"/>
+          <p:cNvPicPr>
+            <a:picLocks noGrp="1" noChangeAspect="1"/>
+          </p:cNvPicPr>
+          <p:nvPr>
+            <p:ph idx="1"/>
+          </p:nvPr>
+        </p:nvPicPr>
+        <p:blipFill>
+          <a:blip r:embed="rId2" cstate="print"/>
+          <a:stretch>
+            <a:fillRect/>
+          </a:stretch>
+        </p:blipFill>
+        <p:spPr>
+          <a:xfrm>
+            <a:off x="6781800" y="533400"/>
+            <a:ext cx="1048498" cy="1447800"/>
+          </a:xfrm>
+        </p:spPr>
+      </p:pic>
+      <p:sp>
+        <p:nvSpPr>
+          <p:cNvPr id="5" name="Прямоугольник 4"/>
+          <p:cNvSpPr/>
+          <p:nvPr/>
+        </p:nvSpPr>
+        <p:spPr>
+          <a:xfrm>
+            <a:off x="838200" y="2057400"/>
+            <a:ext cx="7848600" cy="3785652"/>
+          </a:xfrm>
+          <a:prstGeom prst="rect">
+            <a:avLst/>
+          </a:prstGeom>
+        </p:spPr>
+        <p:txBody>
+          <a:bodyPr wrap="square">
+            <a:spAutoFit/>
+          </a:bodyPr>
+          <a:lstStyle/>
+          <a:p>
+            <a:pPr algn="just"/>
+            <a:r>
+              <a:rPr lang="en-US" sz="2400" dirty="0" smtClean="0">
+                <a:latin typeface="Times New Roman" pitchFamily="18" charset="0"/>
+                <a:cs typeface="Times New Roman" pitchFamily="18" charset="0"/>
+              </a:rPr>
+              <a:t>Jenkins is a free and open source automation server. It helps automate the parts of software development related to building, testing, and deploying, facilitating continuous integration and continuous delivery. It is a server-based system that runs in </a:t>
+            </a:r>
+            <a:r>
+              <a:rPr lang="en-US" sz="2400" dirty="0" err="1" smtClean="0">
+                <a:latin typeface="Times New Roman" pitchFamily="18" charset="0"/>
+                <a:cs typeface="Times New Roman" pitchFamily="18" charset="0"/>
+              </a:rPr>
+              <a:t>servlet</a:t>
+            </a:r>
+            <a:r>
+              <a:rPr lang="en-US" sz="2400" dirty="0" smtClean="0">
+                <a:latin typeface="Times New Roman" pitchFamily="18" charset="0"/>
+                <a:cs typeface="Times New Roman" pitchFamily="18" charset="0"/>
+              </a:rPr>
+              <a:t> containers such as Apache Tomcat. It supports version control tools, including </a:t>
+            </a:r>
+            <a:r>
+              <a:rPr lang="en-US" sz="2400" dirty="0" err="1" smtClean="0">
+                <a:latin typeface="Times New Roman" pitchFamily="18" charset="0"/>
+                <a:cs typeface="Times New Roman" pitchFamily="18" charset="0"/>
+              </a:rPr>
+              <a:t>AccuRev</a:t>
+            </a:r>
+            <a:r>
+              <a:rPr lang="en-US" sz="2400" dirty="0" smtClean="0">
+                <a:latin typeface="Times New Roman" pitchFamily="18" charset="0"/>
+                <a:cs typeface="Times New Roman" pitchFamily="18" charset="0"/>
+              </a:rPr>
+              <a:t>, CVS, Subversion, </a:t>
+            </a:r>
+            <a:r>
+              <a:rPr lang="en-US" sz="2400" dirty="0" err="1" smtClean="0">
+                <a:latin typeface="Times New Roman" pitchFamily="18" charset="0"/>
+                <a:cs typeface="Times New Roman" pitchFamily="18" charset="0"/>
+              </a:rPr>
+              <a:t>Git</a:t>
+            </a:r>
+            <a:r>
+              <a:rPr lang="en-US" sz="2400" dirty="0" smtClean="0">
+                <a:latin typeface="Times New Roman" pitchFamily="18" charset="0"/>
+                <a:cs typeface="Times New Roman" pitchFamily="18" charset="0"/>
+              </a:rPr>
+              <a:t>, Mercurial, Perforce, </a:t>
+            </a:r>
+            <a:r>
+              <a:rPr lang="en-US" sz="2400" dirty="0" err="1" smtClean="0">
+                <a:latin typeface="Times New Roman" pitchFamily="18" charset="0"/>
+                <a:cs typeface="Times New Roman" pitchFamily="18" charset="0"/>
+              </a:rPr>
+              <a:t>ClearCase</a:t>
+            </a:r>
+            <a:r>
+              <a:rPr lang="en-US" sz="2400" dirty="0" smtClean="0">
+                <a:latin typeface="Times New Roman" pitchFamily="18" charset="0"/>
+                <a:cs typeface="Times New Roman" pitchFamily="18" charset="0"/>
+              </a:rPr>
+              <a:t> and RTC, and can execute Apache Ant, Apache Maven and </a:t>
+            </a:r>
+            <a:r>
+              <a:rPr lang="en-US" sz="2400" dirty="0" err="1" smtClean="0">
+                <a:latin typeface="Times New Roman" pitchFamily="18" charset="0"/>
+                <a:cs typeface="Times New Roman" pitchFamily="18" charset="0"/>
+              </a:rPr>
+              <a:t>sbt</a:t>
+            </a:r>
+            <a:r>
+              <a:rPr lang="en-US" sz="2400" dirty="0" smtClean="0">
+                <a:latin typeface="Times New Roman" pitchFamily="18" charset="0"/>
+                <a:cs typeface="Times New Roman" pitchFamily="18" charset="0"/>
+              </a:rPr>
+              <a:t> based projects as well as arbitrary shell scripts and Windows batch commands. </a:t>
+            </a:r>
+            <a:endParaRPr lang="en-US" sz="2400" dirty="0">
+              <a:latin typeface="Times New Roman" pitchFamily="18" charset="0"/>
+              <a:cs typeface="Times New Roman" pitchFamily="18" charset="0"/>
+            </a:endParaRPr>
+          </a:p>
+        </p:txBody>
+      </p:sp>
+    </p:spTree>
+  </p:cSld>
+  <p:clrMapOvr>
+    <a:masterClrMapping/>
+  </p:clrMapOvr>
+</p:sld>
+</file>
+
+<file path=ppt/slides/slide11.xml><?xml version="1.0" encoding="utf-8"?>
+<p:sld xmlns:a="http://schemas.openxmlformats.org/drawingml/2006/main" xmlns:r="http://schemas.openxmlformats.org/officeDocument/2006/relationships" xmlns:p="http://schemas.openxmlformats.org/presentationml/2006/main">
+  <p:cSld>
+    <p:spTree>
+      <p:nvGrpSpPr>
+        <p:cNvPr id="1" name=""/>
+        <p:cNvGrpSpPr/>
+        <p:nvPr/>
+      </p:nvGrpSpPr>
+      <p:grpSpPr>
+        <a:xfrm>
+          <a:off x="0" y="0"/>
+          <a:ext cx="0" cy="0"/>
+          <a:chOff x="0" y="0"/>
+          <a:chExt cx="0" cy="0"/>
+        </a:xfrm>
+      </p:grpSpPr>
+      <p:sp>
+        <p:nvSpPr>
+          <p:cNvPr id="2" name="Заголовок 1"/>
+          <p:cNvSpPr>
+            <a:spLocks noGrp="1"/>
+          </p:cNvSpPr>
+          <p:nvPr>
+            <p:ph type="title"/>
+          </p:nvPr>
+        </p:nvSpPr>
+        <p:spPr>
+          <a:xfrm>
+            <a:off x="457200" y="704088"/>
+            <a:ext cx="8229600" cy="667512"/>
+          </a:xfrm>
+        </p:spPr>
+        <p:txBody>
+          <a:bodyPr>
+            <a:noAutofit/>
+          </a:bodyPr>
+          <a:lstStyle/>
+          <a:p>
+            <a:pPr algn="ctr"/>
+            <a:r>
+              <a:rPr lang="en-US" sz="4500" dirty="0" smtClean="0"/>
+              <a:t>Jenkins</a:t>
+            </a:r>
+            <a:endParaRPr lang="en-US" sz="4500" dirty="0"/>
+          </a:p>
+        </p:txBody>
+      </p:sp>
+      <p:pic>
+        <p:nvPicPr>
+          <p:cNvPr id="4" name="Содержимое 3" descr="jenkins.png"/>
+          <p:cNvPicPr>
+            <a:picLocks noGrp="1" noChangeAspect="1"/>
+          </p:cNvPicPr>
+          <p:nvPr>
+            <p:ph idx="1"/>
+          </p:nvPr>
+        </p:nvPicPr>
+        <p:blipFill>
+          <a:blip r:embed="rId2" cstate="print"/>
+          <a:stretch>
+            <a:fillRect/>
+          </a:stretch>
+        </p:blipFill>
+        <p:spPr>
+          <a:xfrm>
+            <a:off x="6781800" y="533400"/>
+            <a:ext cx="1048498" cy="1447800"/>
+          </a:xfrm>
+        </p:spPr>
+      </p:pic>
+      <p:sp>
+        <p:nvSpPr>
+          <p:cNvPr id="5" name="Прямоугольник 4"/>
+          <p:cNvSpPr/>
+          <p:nvPr/>
+        </p:nvSpPr>
+        <p:spPr>
+          <a:xfrm>
+            <a:off x="838200" y="2057400"/>
+            <a:ext cx="7848600" cy="461665"/>
+          </a:xfrm>
+          <a:prstGeom prst="rect">
+            <a:avLst/>
+          </a:prstGeom>
+        </p:spPr>
+        <p:txBody>
+          <a:bodyPr wrap="square">
+            <a:spAutoFit/>
+          </a:bodyPr>
+          <a:lstStyle/>
+          <a:p>
+            <a:pPr algn="just"/>
+            <a:r>
+              <a:rPr lang="en-US" sz="2400" dirty="0" smtClean="0">
+                <a:latin typeface="Times New Roman" pitchFamily="18" charset="0"/>
+                <a:cs typeface="Times New Roman" pitchFamily="18" charset="0"/>
+              </a:rPr>
+              <a:t>Configure node1 (slave)</a:t>
+            </a:r>
+            <a:endParaRPr lang="en-US" sz="2400" dirty="0">
+              <a:latin typeface="Times New Roman" pitchFamily="18" charset="0"/>
+              <a:cs typeface="Times New Roman" pitchFamily="18" charset="0"/>
+            </a:endParaRPr>
+          </a:p>
+        </p:txBody>
+      </p:sp>
+      <p:pic>
+        <p:nvPicPr>
+          <p:cNvPr id="8" name="Рисунок 7" descr="2.png"/>
+          <p:cNvPicPr>
+            <a:picLocks noChangeAspect="1"/>
+          </p:cNvPicPr>
+          <p:nvPr/>
+        </p:nvPicPr>
+        <p:blipFill>
+          <a:blip r:embed="rId3" cstate="print"/>
+          <a:stretch>
+            <a:fillRect/>
+          </a:stretch>
+        </p:blipFill>
+        <p:spPr>
+          <a:xfrm>
+            <a:off x="457199" y="2590800"/>
+            <a:ext cx="7408139" cy="3276600"/>
+          </a:xfrm>
+          <a:prstGeom prst="rect">
+            <a:avLst/>
+          </a:prstGeom>
+        </p:spPr>
+      </p:pic>
+      <p:pic>
+        <p:nvPicPr>
+          <p:cNvPr id="9" name="Рисунок 8" descr="1.png"/>
+          <p:cNvPicPr>
+            <a:picLocks noChangeAspect="1"/>
+          </p:cNvPicPr>
+          <p:nvPr/>
+        </p:nvPicPr>
+        <p:blipFill>
+          <a:blip r:embed="rId4" cstate="print"/>
+          <a:stretch>
+            <a:fillRect/>
+          </a:stretch>
+        </p:blipFill>
+        <p:spPr>
+          <a:xfrm>
+            <a:off x="4419600" y="5181600"/>
+            <a:ext cx="4459233" cy="893066"/>
+          </a:xfrm>
+          <a:prstGeom prst="rect">
+            <a:avLst/>
+          </a:prstGeom>
+        </p:spPr>
+      </p:pic>
+    </p:spTree>
+  </p:cSld>
+  <p:clrMapOvr>
+    <a:masterClrMapping/>
+  </p:clrMapOvr>
+</p:sld>
+</file>
+
+<file path=ppt/slides/slide12.xml><?xml version="1.0" encoding="utf-8"?>
+<p:sld xmlns:a="http://schemas.openxmlformats.org/drawingml/2006/main" xmlns:r="http://schemas.openxmlformats.org/officeDocument/2006/relationships" xmlns:p="http://schemas.openxmlformats.org/presentationml/2006/main">
+  <p:cSld>
+    <p:spTree>
+      <p:nvGrpSpPr>
+        <p:cNvPr id="1" name=""/>
+        <p:cNvGrpSpPr/>
+        <p:nvPr/>
+      </p:nvGrpSpPr>
+      <p:grpSpPr>
+        <a:xfrm>
+          <a:off x="0" y="0"/>
+          <a:ext cx="0" cy="0"/>
+          <a:chOff x="0" y="0"/>
+          <a:chExt cx="0" cy="0"/>
+        </a:xfrm>
+      </p:grpSpPr>
+      <p:sp>
+        <p:nvSpPr>
+          <p:cNvPr id="2" name="Заголовок 1"/>
+          <p:cNvSpPr>
+            <a:spLocks noGrp="1"/>
+          </p:cNvSpPr>
+          <p:nvPr>
+            <p:ph type="title"/>
+          </p:nvPr>
+        </p:nvSpPr>
+        <p:spPr>
+          <a:xfrm>
+            <a:off x="457200" y="704088"/>
+            <a:ext cx="8229600" cy="667512"/>
+          </a:xfrm>
+        </p:spPr>
+        <p:txBody>
+          <a:bodyPr>
+            <a:noAutofit/>
+          </a:bodyPr>
+          <a:lstStyle/>
+          <a:p>
+            <a:pPr algn="ctr"/>
+            <a:r>
+              <a:rPr lang="en-US" sz="4500" dirty="0" smtClean="0"/>
+              <a:t>Jenkins</a:t>
+            </a:r>
+            <a:endParaRPr lang="en-US" sz="4500" dirty="0"/>
+          </a:p>
+        </p:txBody>
+      </p:sp>
+      <p:pic>
+        <p:nvPicPr>
+          <p:cNvPr id="4" name="Содержимое 3" descr="jenkins.png"/>
+          <p:cNvPicPr>
+            <a:picLocks noGrp="1" noChangeAspect="1"/>
+          </p:cNvPicPr>
+          <p:nvPr>
+            <p:ph idx="1"/>
+          </p:nvPr>
+        </p:nvPicPr>
+        <p:blipFill>
+          <a:blip r:embed="rId2" cstate="print"/>
+          <a:stretch>
+            <a:fillRect/>
+          </a:stretch>
+        </p:blipFill>
+        <p:spPr>
+          <a:xfrm>
+            <a:off x="6781800" y="533400"/>
+            <a:ext cx="1048498" cy="1447800"/>
+          </a:xfrm>
+        </p:spPr>
+      </p:pic>
+      <p:sp>
+        <p:nvSpPr>
+          <p:cNvPr id="5" name="Прямоугольник 4"/>
+          <p:cNvSpPr/>
+          <p:nvPr/>
+        </p:nvSpPr>
+        <p:spPr>
+          <a:xfrm>
+            <a:off x="838200" y="2057400"/>
+            <a:ext cx="7848600" cy="461665"/>
+          </a:xfrm>
+          <a:prstGeom prst="rect">
+            <a:avLst/>
+          </a:prstGeom>
+        </p:spPr>
+        <p:txBody>
+          <a:bodyPr wrap="square">
+            <a:spAutoFit/>
+          </a:bodyPr>
+          <a:lstStyle/>
+          <a:p>
+            <a:pPr algn="just"/>
+            <a:r>
+              <a:rPr lang="en-US" sz="2400" dirty="0" smtClean="0">
+                <a:latin typeface="Times New Roman" pitchFamily="18" charset="0"/>
+                <a:cs typeface="Times New Roman" pitchFamily="18" charset="0"/>
+              </a:rPr>
+              <a:t>Configure our job: </a:t>
+            </a:r>
+            <a:r>
+              <a:rPr lang="en-US" sz="2400" dirty="0" err="1" smtClean="0">
+                <a:latin typeface="Times New Roman" pitchFamily="18" charset="0"/>
+                <a:cs typeface="Times New Roman" pitchFamily="18" charset="0"/>
+              </a:rPr>
+              <a:t>finaltask</a:t>
+            </a:r>
+            <a:r>
+              <a:rPr lang="en-US" sz="2400" dirty="0" smtClean="0">
+                <a:latin typeface="Times New Roman" pitchFamily="18" charset="0"/>
+                <a:cs typeface="Times New Roman" pitchFamily="18" charset="0"/>
+              </a:rPr>
+              <a:t>.</a:t>
+            </a:r>
+            <a:endParaRPr lang="en-US" sz="2400" dirty="0">
+              <a:latin typeface="Times New Roman" pitchFamily="18" charset="0"/>
+              <a:cs typeface="Times New Roman" pitchFamily="18" charset="0"/>
+            </a:endParaRPr>
+          </a:p>
+        </p:txBody>
+      </p:sp>
+      <p:pic>
+        <p:nvPicPr>
+          <p:cNvPr id="7" name="Рисунок 6" descr="add-github-ssh-key.png"/>
+          <p:cNvPicPr>
+            <a:picLocks noChangeAspect="1"/>
+          </p:cNvPicPr>
+          <p:nvPr/>
+        </p:nvPicPr>
+        <p:blipFill>
+          <a:blip r:embed="rId3" cstate="print"/>
+          <a:stretch>
+            <a:fillRect/>
+          </a:stretch>
+        </p:blipFill>
+        <p:spPr>
+          <a:xfrm>
+            <a:off x="914400" y="2598418"/>
+            <a:ext cx="5334000" cy="2694189"/>
+          </a:xfrm>
+          <a:prstGeom prst="rect">
+            <a:avLst/>
+          </a:prstGeom>
+        </p:spPr>
+      </p:pic>
+      <p:pic>
+        <p:nvPicPr>
+          <p:cNvPr id="10" name="Рисунок 9" descr="add-github-webhook-jenkins.png"/>
+          <p:cNvPicPr>
+            <a:picLocks noChangeAspect="1"/>
+          </p:cNvPicPr>
+          <p:nvPr/>
+        </p:nvPicPr>
+        <p:blipFill>
+          <a:blip r:embed="rId4" cstate="print"/>
+          <a:stretch>
+            <a:fillRect/>
+          </a:stretch>
+        </p:blipFill>
+        <p:spPr>
+          <a:xfrm>
+            <a:off x="3048000" y="4191000"/>
+            <a:ext cx="5632704" cy="2346961"/>
+          </a:xfrm>
+          <a:prstGeom prst="rect">
+            <a:avLst/>
+          </a:prstGeom>
+        </p:spPr>
+      </p:pic>
+    </p:spTree>
+  </p:cSld>
+  <p:clrMapOvr>
+    <a:masterClrMapping/>
+  </p:clrMapOvr>
+</p:sld>
+</file>
+
+<file path=ppt/slides/slide13.xml><?xml version="1.0" encoding="utf-8"?>
+<p:sld xmlns:a="http://schemas.openxmlformats.org/drawingml/2006/main" xmlns:r="http://schemas.openxmlformats.org/officeDocument/2006/relationships" xmlns:p="http://schemas.openxmlformats.org/presentationml/2006/main">
+  <p:cSld>
+    <p:spTree>
+      <p:nvGrpSpPr>
+        <p:cNvPr id="1" name=""/>
+        <p:cNvGrpSpPr/>
+        <p:nvPr/>
+      </p:nvGrpSpPr>
+      <p:grpSpPr>
+        <a:xfrm>
+          <a:off x="0" y="0"/>
+          <a:ext cx="0" cy="0"/>
+          <a:chOff x="0" y="0"/>
+          <a:chExt cx="0" cy="0"/>
+        </a:xfrm>
+      </p:grpSpPr>
+      <p:sp>
+        <p:nvSpPr>
+          <p:cNvPr id="2" name="Заголовок 1"/>
+          <p:cNvSpPr>
+            <a:spLocks noGrp="1"/>
+          </p:cNvSpPr>
+          <p:nvPr>
+            <p:ph type="title"/>
+          </p:nvPr>
+        </p:nvSpPr>
+        <p:spPr>
+          <a:xfrm>
+            <a:off x="457200" y="704088"/>
+            <a:ext cx="8229600" cy="667512"/>
+          </a:xfrm>
+        </p:spPr>
+        <p:txBody>
+          <a:bodyPr>
+            <a:noAutofit/>
+          </a:bodyPr>
+          <a:lstStyle/>
+          <a:p>
+            <a:pPr algn="ctr"/>
+            <a:r>
+              <a:rPr lang="en-US" sz="4500" dirty="0" smtClean="0"/>
+              <a:t>Jenkins</a:t>
+            </a:r>
+            <a:endParaRPr lang="en-US" sz="4500" dirty="0"/>
+          </a:p>
+        </p:txBody>
+      </p:sp>
+      <p:pic>
+        <p:nvPicPr>
+          <p:cNvPr id="4" name="Содержимое 3" descr="jenkins.png"/>
+          <p:cNvPicPr>
+            <a:picLocks noGrp="1" noChangeAspect="1"/>
+          </p:cNvPicPr>
+          <p:nvPr>
+            <p:ph idx="1"/>
+          </p:nvPr>
+        </p:nvPicPr>
+        <p:blipFill>
+          <a:blip r:embed="rId2" cstate="print"/>
+          <a:stretch>
+            <a:fillRect/>
+          </a:stretch>
+        </p:blipFill>
+        <p:spPr>
+          <a:xfrm>
+            <a:off x="6781800" y="533400"/>
+            <a:ext cx="1048498" cy="1447800"/>
+          </a:xfrm>
+        </p:spPr>
+      </p:pic>
+      <p:sp>
+        <p:nvSpPr>
+          <p:cNvPr id="5" name="Прямоугольник 4"/>
+          <p:cNvSpPr/>
+          <p:nvPr/>
+        </p:nvSpPr>
+        <p:spPr>
+          <a:xfrm>
+            <a:off x="838200" y="2057400"/>
+            <a:ext cx="7848600" cy="461665"/>
+          </a:xfrm>
+          <a:prstGeom prst="rect">
+            <a:avLst/>
+          </a:prstGeom>
+        </p:spPr>
+        <p:txBody>
+          <a:bodyPr wrap="square">
+            <a:spAutoFit/>
+          </a:bodyPr>
+          <a:lstStyle/>
+          <a:p>
+            <a:pPr algn="just"/>
+            <a:r>
+              <a:rPr lang="en-US" sz="2400" dirty="0" smtClean="0">
+                <a:latin typeface="Times New Roman" pitchFamily="18" charset="0"/>
+                <a:cs typeface="Times New Roman" pitchFamily="18" charset="0"/>
+              </a:rPr>
+              <a:t>Configure our job: </a:t>
+            </a:r>
+            <a:r>
+              <a:rPr lang="en-US" sz="2400" dirty="0" err="1" smtClean="0">
+                <a:latin typeface="Times New Roman" pitchFamily="18" charset="0"/>
+                <a:cs typeface="Times New Roman" pitchFamily="18" charset="0"/>
+              </a:rPr>
+              <a:t>finaltask</a:t>
+            </a:r>
+            <a:r>
+              <a:rPr lang="en-US" sz="2400" dirty="0" smtClean="0">
+                <a:latin typeface="Times New Roman" pitchFamily="18" charset="0"/>
+                <a:cs typeface="Times New Roman" pitchFamily="18" charset="0"/>
+              </a:rPr>
+              <a:t>.</a:t>
+            </a:r>
+            <a:endParaRPr lang="en-US" sz="2400" dirty="0">
+              <a:latin typeface="Times New Roman" pitchFamily="18" charset="0"/>
+              <a:cs typeface="Times New Roman" pitchFamily="18" charset="0"/>
+            </a:endParaRPr>
+          </a:p>
+        </p:txBody>
+      </p:sp>
+      <p:pic>
+        <p:nvPicPr>
+          <p:cNvPr id="8" name="Рисунок 7" descr="start-node1.png"/>
+          <p:cNvPicPr>
+            <a:picLocks noChangeAspect="1"/>
+          </p:cNvPicPr>
+          <p:nvPr/>
+        </p:nvPicPr>
+        <p:blipFill>
+          <a:blip r:embed="rId3" cstate="print"/>
+          <a:stretch>
+            <a:fillRect/>
+          </a:stretch>
+        </p:blipFill>
+        <p:spPr>
+          <a:xfrm>
+            <a:off x="1219200" y="2514600"/>
+            <a:ext cx="5967522" cy="1231393"/>
+          </a:xfrm>
+          <a:prstGeom prst="rect">
+            <a:avLst/>
+          </a:prstGeom>
+        </p:spPr>
+      </p:pic>
+      <p:pic>
+        <p:nvPicPr>
+          <p:cNvPr id="9" name="Рисунок 8" descr="start-script-docker.png"/>
+          <p:cNvPicPr>
+            <a:picLocks noChangeAspect="1"/>
+          </p:cNvPicPr>
+          <p:nvPr/>
+        </p:nvPicPr>
+        <p:blipFill>
+          <a:blip r:embed="rId4" cstate="print"/>
+          <a:stretch>
+            <a:fillRect/>
+          </a:stretch>
+        </p:blipFill>
+        <p:spPr>
+          <a:xfrm>
+            <a:off x="1219200" y="3886200"/>
+            <a:ext cx="6406791" cy="2369635"/>
+          </a:xfrm>
+          <a:prstGeom prst="rect">
+            <a:avLst/>
+          </a:prstGeom>
+        </p:spPr>
+      </p:pic>
+    </p:spTree>
+  </p:cSld>
+  <p:clrMapOvr>
+    <a:masterClrMapping/>
+  </p:clrMapOvr>
+</p:sld>
+</file>
+
+<file path=ppt/slides/slide14.xml><?xml version="1.0" encoding="utf-8"?>
+<p:sld xmlns:a="http://schemas.openxmlformats.org/drawingml/2006/main" xmlns:r="http://schemas.openxmlformats.org/officeDocument/2006/relationships" xmlns:p="http://schemas.openxmlformats.org/presentationml/2006/main">
+  <p:cSld>
+    <p:spTree>
+      <p:nvGrpSpPr>
+        <p:cNvPr id="1" name=""/>
+        <p:cNvGrpSpPr/>
+        <p:nvPr/>
+      </p:nvGrpSpPr>
+      <p:grpSpPr>
+        <a:xfrm>
+          <a:off x="0" y="0"/>
+          <a:ext cx="0" cy="0"/>
+          <a:chOff x="0" y="0"/>
+          <a:chExt cx="0" cy="0"/>
+        </a:xfrm>
+      </p:grpSpPr>
+      <p:sp>
+        <p:nvSpPr>
+          <p:cNvPr id="2" name="Заголовок 1"/>
+          <p:cNvSpPr>
+            <a:spLocks noGrp="1"/>
+          </p:cNvSpPr>
+          <p:nvPr>
+            <p:ph type="title"/>
+          </p:nvPr>
+        </p:nvSpPr>
+        <p:spPr>
+          <a:xfrm>
+            <a:off x="457200" y="704088"/>
+            <a:ext cx="8229600" cy="667512"/>
+          </a:xfrm>
+        </p:spPr>
+        <p:txBody>
+          <a:bodyPr>
+            <a:normAutofit fontScale="90000"/>
+          </a:bodyPr>
+          <a:lstStyle/>
+          <a:p>
+            <a:pPr algn="ctr"/>
+            <a:r>
+              <a:rPr lang="en-US" sz="4400" dirty="0" smtClean="0"/>
+              <a:t>Prometheus</a:t>
+            </a:r>
+            <a:endParaRPr lang="en-US" sz="4400" dirty="0"/>
+          </a:p>
+        </p:txBody>
+      </p:sp>
+      <p:sp>
+        <p:nvSpPr>
+          <p:cNvPr id="3" name="Содержимое 2"/>
+          <p:cNvSpPr>
+            <a:spLocks noGrp="1"/>
+          </p:cNvSpPr>
+          <p:nvPr>
+            <p:ph idx="1"/>
+          </p:nvPr>
+        </p:nvSpPr>
+        <p:spPr/>
+        <p:txBody>
+          <a:bodyPr>
+            <a:normAutofit/>
+          </a:bodyPr>
+          <a:lstStyle/>
+          <a:p>
+            <a:pPr algn="just"/>
+            <a:r>
+              <a:rPr lang="en-US" sz="2400" dirty="0" smtClean="0">
+                <a:latin typeface="Times New Roman" pitchFamily="18" charset="0"/>
+                <a:cs typeface="Times New Roman" pitchFamily="18" charset="0"/>
+              </a:rPr>
+              <a:t>Prometheus is a free software application used for event monitoring and alerting. It records real-time metrics in a time series database (allowing for high dimensionality) built using a HTTP pull model, with flexible queries and real-time alerting. The project is written in Go and licensed under the Apache 2 License, with source code available on </a:t>
+            </a:r>
+            <a:r>
+              <a:rPr lang="en-US" sz="2400" dirty="0" err="1" smtClean="0">
+                <a:latin typeface="Times New Roman" pitchFamily="18" charset="0"/>
+                <a:cs typeface="Times New Roman" pitchFamily="18" charset="0"/>
+              </a:rPr>
+              <a:t>GitHub</a:t>
+            </a:r>
+            <a:r>
+              <a:rPr lang="en-US" sz="2400" dirty="0" smtClean="0">
+                <a:latin typeface="Times New Roman" pitchFamily="18" charset="0"/>
+                <a:cs typeface="Times New Roman" pitchFamily="18" charset="0"/>
+              </a:rPr>
+              <a:t>, and </a:t>
+            </a:r>
+            <a:r>
+              <a:rPr lang="en-US" sz="2400" dirty="0" smtClean="0">
+                <a:latin typeface="Times New Roman" pitchFamily="18" charset="0"/>
+                <a:cs typeface="Times New Roman" pitchFamily="18" charset="0"/>
+              </a:rPr>
+              <a:t>is a graduated project of the Cloud Native Computing Foundation, along with </a:t>
+            </a:r>
+            <a:r>
+              <a:rPr lang="en-US" sz="2400" dirty="0" err="1" smtClean="0">
+                <a:latin typeface="Times New Roman" pitchFamily="18" charset="0"/>
+                <a:cs typeface="Times New Roman" pitchFamily="18" charset="0"/>
+              </a:rPr>
+              <a:t>Kubernetes</a:t>
+            </a:r>
+            <a:r>
+              <a:rPr lang="en-US" sz="2400" dirty="0" smtClean="0">
+                <a:latin typeface="Times New Roman" pitchFamily="18" charset="0"/>
+                <a:cs typeface="Times New Roman" pitchFamily="18" charset="0"/>
+              </a:rPr>
+              <a:t> and Envoy.</a:t>
+            </a:r>
+            <a:endParaRPr lang="en-US" sz="2400" dirty="0">
+              <a:latin typeface="Times New Roman" pitchFamily="18" charset="0"/>
+              <a:cs typeface="Times New Roman" pitchFamily="18" charset="0"/>
+            </a:endParaRPr>
+          </a:p>
+        </p:txBody>
+      </p:sp>
+      <p:pic>
+        <p:nvPicPr>
+          <p:cNvPr id="4" name="Рисунок 3" descr="prometheus.png"/>
+          <p:cNvPicPr>
+            <a:picLocks noChangeAspect="1"/>
+          </p:cNvPicPr>
+          <p:nvPr/>
+        </p:nvPicPr>
+        <p:blipFill>
+          <a:blip r:embed="rId2" cstate="print"/>
+          <a:stretch>
+            <a:fillRect/>
+          </a:stretch>
+        </p:blipFill>
+        <p:spPr>
+          <a:xfrm>
+            <a:off x="6553200" y="304800"/>
+            <a:ext cx="1828800" cy="1121494"/>
+          </a:xfrm>
+          <a:prstGeom prst="rect">
+            <a:avLst/>
+          </a:prstGeom>
+        </p:spPr>
+      </p:pic>
+    </p:spTree>
+  </p:cSld>
+  <p:clrMapOvr>
+    <a:masterClrMapping/>
+  </p:clrMapOvr>
+</p:sld>
+</file>
+
+<file path=ppt/slides/slide15.xml><?xml version="1.0" encoding="utf-8"?>
+<p:sld xmlns:a="http://schemas.openxmlformats.org/drawingml/2006/main" xmlns:r="http://schemas.openxmlformats.org/officeDocument/2006/relationships" xmlns:p="http://schemas.openxmlformats.org/presentationml/2006/main">
+  <p:cSld>
+    <p:spTree>
+      <p:nvGrpSpPr>
+        <p:cNvPr id="1" name=""/>
+        <p:cNvGrpSpPr/>
+        <p:nvPr/>
+      </p:nvGrpSpPr>
+      <p:grpSpPr>
+        <a:xfrm>
+          <a:off x="0" y="0"/>
+          <a:ext cx="0" cy="0"/>
+          <a:chOff x="0" y="0"/>
+          <a:chExt cx="0" cy="0"/>
+        </a:xfrm>
+      </p:grpSpPr>
+      <p:sp>
+        <p:nvSpPr>
+          <p:cNvPr id="2" name="Заголовок 1"/>
+          <p:cNvSpPr>
+            <a:spLocks noGrp="1"/>
+          </p:cNvSpPr>
+          <p:nvPr>
+            <p:ph type="title"/>
+          </p:nvPr>
+        </p:nvSpPr>
+        <p:spPr>
+          <a:xfrm>
+            <a:off x="457200" y="704088"/>
+            <a:ext cx="8229600" cy="667512"/>
+          </a:xfrm>
+        </p:spPr>
+        <p:txBody>
+          <a:bodyPr>
+            <a:normAutofit fontScale="90000"/>
+          </a:bodyPr>
+          <a:lstStyle/>
+          <a:p>
+            <a:pPr algn="ctr"/>
+            <a:r>
+              <a:rPr lang="en-US" sz="4400" dirty="0" smtClean="0"/>
+              <a:t>Prometheus</a:t>
+            </a:r>
+            <a:endParaRPr lang="en-US" sz="4400" dirty="0"/>
+          </a:p>
+        </p:txBody>
+      </p:sp>
+      <p:pic>
+        <p:nvPicPr>
+          <p:cNvPr id="5" name="Содержимое 4" descr="prometheus.png"/>
+          <p:cNvPicPr>
+            <a:picLocks noGrp="1" noChangeAspect="1"/>
+          </p:cNvPicPr>
+          <p:nvPr>
+            <p:ph idx="1"/>
+          </p:nvPr>
+        </p:nvPicPr>
+        <p:blipFill>
+          <a:blip r:embed="rId2" cstate="print"/>
+          <a:stretch>
+            <a:fillRect/>
+          </a:stretch>
+        </p:blipFill>
+        <p:spPr>
+          <a:xfrm>
+            <a:off x="330790" y="1676400"/>
+            <a:ext cx="8193014" cy="4343400"/>
+          </a:xfrm>
+        </p:spPr>
+      </p:pic>
+      <p:pic>
+        <p:nvPicPr>
+          <p:cNvPr id="4" name="Рисунок 3" descr="prometheus.png"/>
+          <p:cNvPicPr>
+            <a:picLocks noChangeAspect="1"/>
+          </p:cNvPicPr>
+          <p:nvPr/>
+        </p:nvPicPr>
+        <p:blipFill>
+          <a:blip r:embed="rId3" cstate="print"/>
+          <a:stretch>
+            <a:fillRect/>
+          </a:stretch>
+        </p:blipFill>
+        <p:spPr>
+          <a:xfrm>
+            <a:off x="6553200" y="304800"/>
+            <a:ext cx="1828800" cy="1121494"/>
+          </a:xfrm>
+          <a:prstGeom prst="rect">
+            <a:avLst/>
+          </a:prstGeom>
+        </p:spPr>
+      </p:pic>
+    </p:spTree>
+  </p:cSld>
+  <p:clrMapOvr>
+    <a:masterClrMapping/>
+  </p:clrMapOvr>
+</p:sld>
+</file>
+
+<file path=ppt/slides/slide16.xml><?xml version="1.0" encoding="utf-8"?>
+<p:sld xmlns:a="http://schemas.openxmlformats.org/drawingml/2006/main" xmlns:r="http://schemas.openxmlformats.org/officeDocument/2006/relationships" xmlns:p="http://schemas.openxmlformats.org/presentationml/2006/main">
+  <p:cSld>
+    <p:spTree>
+      <p:nvGrpSpPr>
+        <p:cNvPr id="1" name=""/>
+        <p:cNvGrpSpPr/>
+        <p:nvPr/>
+      </p:nvGrpSpPr>
+      <p:grpSpPr>
+        <a:xfrm>
+          <a:off x="0" y="0"/>
+          <a:ext cx="0" cy="0"/>
+          <a:chOff x="0" y="0"/>
+          <a:chExt cx="0" cy="0"/>
+        </a:xfrm>
+      </p:grpSpPr>
+      <p:sp>
+        <p:nvSpPr>
+          <p:cNvPr id="2" name="Заголовок 1"/>
+          <p:cNvSpPr>
+            <a:spLocks noGrp="1"/>
+          </p:cNvSpPr>
+          <p:nvPr>
+            <p:ph type="title"/>
+          </p:nvPr>
+        </p:nvSpPr>
+        <p:spPr>
+          <a:xfrm>
+            <a:off x="457200" y="704088"/>
+            <a:ext cx="8229600" cy="896112"/>
+          </a:xfrm>
+        </p:spPr>
+        <p:txBody>
+          <a:bodyPr>
+            <a:normAutofit/>
+          </a:bodyPr>
+          <a:lstStyle/>
+          <a:p>
+            <a:pPr algn="ctr"/>
+            <a:r>
+              <a:rPr lang="en-US" sz="4500" dirty="0" err="1" smtClean="0"/>
+              <a:t>Grafana</a:t>
+            </a:r>
+            <a:endParaRPr lang="en-US" sz="4500" dirty="0"/>
+          </a:p>
+        </p:txBody>
+      </p:sp>
+      <p:sp>
+        <p:nvSpPr>
+          <p:cNvPr id="3" name="Содержимое 2"/>
+          <p:cNvSpPr>
+            <a:spLocks noGrp="1"/>
+          </p:cNvSpPr>
+          <p:nvPr>
+            <p:ph idx="1"/>
+          </p:nvPr>
+        </p:nvSpPr>
+        <p:spPr/>
+        <p:txBody>
+          <a:bodyPr/>
+          <a:lstStyle/>
+          <a:p>
+            <a:pPr algn="just"/>
+            <a:r>
+              <a:rPr lang="en-US" sz="2400" dirty="0" err="1" smtClean="0">
+                <a:latin typeface="Times New Roman" pitchFamily="18" charset="0"/>
+                <a:cs typeface="Times New Roman" pitchFamily="18" charset="0"/>
+              </a:rPr>
+              <a:t>Grafana</a:t>
+            </a:r>
+            <a:r>
+              <a:rPr lang="en-US" sz="2400" dirty="0" smtClean="0">
+                <a:latin typeface="Times New Roman" pitchFamily="18" charset="0"/>
+                <a:cs typeface="Times New Roman" pitchFamily="18" charset="0"/>
+              </a:rPr>
+              <a:t> is a multi-platform open source analytics and interactive visualization web application. It provides charts, graphs, and alerts for the web when connected to supported data sources. </a:t>
+            </a:r>
+            <a:r>
+              <a:rPr lang="en-US" sz="2400" dirty="0" err="1" smtClean="0">
+                <a:latin typeface="Times New Roman" pitchFamily="18" charset="0"/>
+                <a:cs typeface="Times New Roman" pitchFamily="18" charset="0"/>
+              </a:rPr>
+              <a:t>Grafana</a:t>
+            </a:r>
+            <a:r>
+              <a:rPr lang="en-US" sz="2400" dirty="0" smtClean="0">
+                <a:latin typeface="Times New Roman" pitchFamily="18" charset="0"/>
+                <a:cs typeface="Times New Roman" pitchFamily="18" charset="0"/>
+              </a:rPr>
+              <a:t> Enterprise version with additional capabilities is also available. It is expandable through a plug-in system. End users can create complex monitoring dashboards using interactive query builders</a:t>
+            </a:r>
+            <a:r>
+              <a:rPr lang="en-US" dirty="0" smtClean="0"/>
+              <a:t>.</a:t>
+            </a:r>
+            <a:endParaRPr lang="en-US" dirty="0"/>
+          </a:p>
+        </p:txBody>
+      </p:sp>
+      <p:pic>
+        <p:nvPicPr>
+          <p:cNvPr id="5" name="Рисунок 4" descr="grafana.jpg"/>
+          <p:cNvPicPr>
+            <a:picLocks noChangeAspect="1"/>
+          </p:cNvPicPr>
+          <p:nvPr/>
+        </p:nvPicPr>
+        <p:blipFill>
+          <a:blip r:embed="rId2" cstate="print"/>
+          <a:stretch>
+            <a:fillRect/>
+          </a:stretch>
+        </p:blipFill>
+        <p:spPr>
+          <a:xfrm>
+            <a:off x="6629400" y="381000"/>
+            <a:ext cx="1371600" cy="1371600"/>
+          </a:xfrm>
+          <a:prstGeom prst="rect">
+            <a:avLst/>
+          </a:prstGeom>
+        </p:spPr>
+      </p:pic>
+    </p:spTree>
+  </p:cSld>
+  <p:clrMapOvr>
+    <a:masterClrMapping/>
+  </p:clrMapOvr>
+</p:sld>
+</file>
+
+<file path=ppt/slides/slide17.xml><?xml version="1.0" encoding="utf-8"?>
+<p:sld xmlns:a="http://schemas.openxmlformats.org/drawingml/2006/main" xmlns:r="http://schemas.openxmlformats.org/officeDocument/2006/relationships" xmlns:p="http://schemas.openxmlformats.org/presentationml/2006/main">
+  <p:cSld>
+    <p:spTree>
+      <p:nvGrpSpPr>
+        <p:cNvPr id="1" name=""/>
+        <p:cNvGrpSpPr/>
+        <p:nvPr/>
+      </p:nvGrpSpPr>
+      <p:grpSpPr>
+        <a:xfrm>
+          <a:off x="0" y="0"/>
+          <a:ext cx="0" cy="0"/>
+          <a:chOff x="0" y="0"/>
+          <a:chExt cx="0" cy="0"/>
+        </a:xfrm>
+      </p:grpSpPr>
+      <p:sp>
+        <p:nvSpPr>
+          <p:cNvPr id="2" name="Заголовок 1"/>
+          <p:cNvSpPr>
+            <a:spLocks noGrp="1"/>
+          </p:cNvSpPr>
+          <p:nvPr>
+            <p:ph type="title"/>
+          </p:nvPr>
+        </p:nvSpPr>
+        <p:spPr>
+          <a:xfrm>
+            <a:off x="457200" y="704088"/>
+            <a:ext cx="8229600" cy="896112"/>
+          </a:xfrm>
+        </p:spPr>
+        <p:txBody>
+          <a:bodyPr>
+            <a:normAutofit/>
+          </a:bodyPr>
+          <a:lstStyle/>
+          <a:p>
+            <a:pPr algn="ctr"/>
+            <a:r>
+              <a:rPr lang="en-US" sz="4500" dirty="0" err="1" smtClean="0"/>
+              <a:t>Grafana</a:t>
+            </a:r>
+            <a:endParaRPr lang="en-US" sz="4500" dirty="0"/>
+          </a:p>
+        </p:txBody>
+      </p:sp>
+      <p:pic>
+        <p:nvPicPr>
+          <p:cNvPr id="5" name="Рисунок 4" descr="grafana.jpg"/>
+          <p:cNvPicPr>
+            <a:picLocks noChangeAspect="1"/>
+          </p:cNvPicPr>
+          <p:nvPr/>
+        </p:nvPicPr>
+        <p:blipFill>
+          <a:blip r:embed="rId2" cstate="print"/>
+          <a:stretch>
+            <a:fillRect/>
+          </a:stretch>
+        </p:blipFill>
+        <p:spPr>
+          <a:xfrm>
+            <a:off x="6629400" y="381000"/>
+            <a:ext cx="1371600" cy="1371600"/>
+          </a:xfrm>
+          <a:prstGeom prst="rect">
+            <a:avLst/>
+          </a:prstGeom>
+        </p:spPr>
+      </p:pic>
+      <p:pic>
+        <p:nvPicPr>
+          <p:cNvPr id="8" name="Содержимое 7" descr="grafana.png"/>
+          <p:cNvPicPr>
+            <a:picLocks noGrp="1" noChangeAspect="1"/>
+          </p:cNvPicPr>
+          <p:nvPr>
+            <p:ph idx="1"/>
+          </p:nvPr>
+        </p:nvPicPr>
+        <p:blipFill>
+          <a:blip r:embed="rId3" cstate="print"/>
+          <a:stretch>
+            <a:fillRect/>
+          </a:stretch>
+        </p:blipFill>
+        <p:spPr>
+          <a:xfrm>
+            <a:off x="304800" y="2133600"/>
+            <a:ext cx="8537417" cy="4114800"/>
+          </a:xfrm>
+        </p:spPr>
+      </p:pic>
+    </p:spTree>
+  </p:cSld>
+  <p:clrMapOvr>
+    <a:masterClrMapping/>
+  </p:clrMapOvr>
+</p:sld>
+</file>
+
+<file path=ppt/slides/slide18.xml><?xml version="1.0" encoding="utf-8"?>
+<p:sld xmlns:a="http://schemas.openxmlformats.org/drawingml/2006/main" xmlns:r="http://schemas.openxmlformats.org/officeDocument/2006/relationships" xmlns:p="http://schemas.openxmlformats.org/presentationml/2006/main">
+  <p:cSld>
+    <p:spTree>
+      <p:nvGrpSpPr>
+        <p:cNvPr id="1" name=""/>
+        <p:cNvGrpSpPr/>
+        <p:nvPr/>
+      </p:nvGrpSpPr>
+      <p:grpSpPr>
+        <a:xfrm>
+          <a:off x="0" y="0"/>
+          <a:ext cx="0" cy="0"/>
+          <a:chOff x="0" y="0"/>
+          <a:chExt cx="0" cy="0"/>
+        </a:xfrm>
+      </p:grpSpPr>
+      <p:sp>
+        <p:nvSpPr>
+          <p:cNvPr id="2" name="Заголовок 1"/>
+          <p:cNvSpPr>
+            <a:spLocks noGrp="1"/>
+          </p:cNvSpPr>
+          <p:nvPr>
+            <p:ph type="title"/>
+          </p:nvPr>
+        </p:nvSpPr>
+        <p:spPr>
+          <a:xfrm>
+            <a:off x="533400" y="1524000"/>
+            <a:ext cx="8229600" cy="533400"/>
+          </a:xfrm>
+        </p:spPr>
+        <p:txBody>
+          <a:bodyPr>
+            <a:normAutofit fontScale="90000"/>
+          </a:bodyPr>
+          <a:lstStyle/>
+          <a:p>
+            <a:pPr algn="ctr"/>
+            <a:r>
+              <a:rPr lang="en-US" sz="4500" dirty="0" smtClean="0"/>
+              <a:t>Prometheus + </a:t>
+            </a:r>
+            <a:r>
+              <a:rPr lang="en-US" sz="4500" dirty="0" err="1" smtClean="0"/>
+              <a:t>Grafana</a:t>
+            </a:r>
+            <a:r>
+              <a:rPr lang="en-US" sz="4500" dirty="0" smtClean="0"/>
+              <a:t> install</a:t>
+            </a:r>
+            <a:endParaRPr lang="en-US" sz="4500" dirty="0"/>
+          </a:p>
+        </p:txBody>
+      </p:sp>
+      <p:sp>
+        <p:nvSpPr>
+          <p:cNvPr id="3" name="Содержимое 2"/>
+          <p:cNvSpPr>
+            <a:spLocks noGrp="1"/>
+          </p:cNvSpPr>
+          <p:nvPr>
+            <p:ph idx="1"/>
+          </p:nvPr>
+        </p:nvSpPr>
+        <p:spPr>
+          <a:xfrm>
+            <a:off x="457200" y="2286000"/>
+            <a:ext cx="8229600" cy="4389120"/>
+          </a:xfrm>
+        </p:spPr>
+        <p:txBody>
+          <a:bodyPr>
+            <a:normAutofit/>
+          </a:bodyPr>
+          <a:lstStyle/>
+          <a:p>
+            <a:pPr algn="just"/>
+            <a:r>
+              <a:rPr lang="en-US" sz="2400" dirty="0" smtClean="0">
+                <a:latin typeface="Times New Roman" pitchFamily="18" charset="0"/>
+                <a:cs typeface="Times New Roman" pitchFamily="18" charset="0"/>
+              </a:rPr>
+              <a:t>We will use </a:t>
+            </a:r>
+            <a:r>
+              <a:rPr lang="en-US" sz="2400" dirty="0" err="1" smtClean="0">
+                <a:latin typeface="Times New Roman" pitchFamily="18" charset="0"/>
+                <a:cs typeface="Times New Roman" pitchFamily="18" charset="0"/>
+              </a:rPr>
+              <a:t>Einsteinish</a:t>
+            </a:r>
+            <a:r>
+              <a:rPr lang="en-US" sz="2400" dirty="0" smtClean="0">
+                <a:latin typeface="Times New Roman" pitchFamily="18" charset="0"/>
+                <a:cs typeface="Times New Roman" pitchFamily="18" charset="0"/>
+              </a:rPr>
+              <a:t>/</a:t>
+            </a:r>
+            <a:r>
+              <a:rPr lang="en-US" sz="2400" dirty="0" err="1" smtClean="0">
+                <a:latin typeface="Times New Roman" pitchFamily="18" charset="0"/>
+                <a:cs typeface="Times New Roman" pitchFamily="18" charset="0"/>
+              </a:rPr>
+              <a:t>Docker</a:t>
+            </a:r>
+            <a:r>
+              <a:rPr lang="en-US" sz="2400" dirty="0" smtClean="0">
+                <a:latin typeface="Times New Roman" pitchFamily="18" charset="0"/>
+                <a:cs typeface="Times New Roman" pitchFamily="18" charset="0"/>
+              </a:rPr>
+              <a:t>-Compose-Prometheus-and-</a:t>
+            </a:r>
+            <a:r>
+              <a:rPr lang="en-US" sz="2400" dirty="0" err="1" smtClean="0">
+                <a:latin typeface="Times New Roman" pitchFamily="18" charset="0"/>
+                <a:cs typeface="Times New Roman" pitchFamily="18" charset="0"/>
+              </a:rPr>
+              <a:t>Grafana</a:t>
+            </a:r>
+            <a:r>
+              <a:rPr lang="en-US" sz="2400" dirty="0" smtClean="0">
+                <a:latin typeface="Times New Roman" pitchFamily="18" charset="0"/>
+                <a:cs typeface="Times New Roman" pitchFamily="18" charset="0"/>
+              </a:rPr>
+              <a:t>, which includes Prometheus, </a:t>
+            </a:r>
+            <a:r>
+              <a:rPr lang="en-US" sz="2400" dirty="0" err="1" smtClean="0">
+                <a:latin typeface="Times New Roman" pitchFamily="18" charset="0"/>
+                <a:cs typeface="Times New Roman" pitchFamily="18" charset="0"/>
+              </a:rPr>
+              <a:t>Grafana</a:t>
+            </a:r>
+            <a:r>
+              <a:rPr lang="en-US" sz="2400" dirty="0" smtClean="0">
+                <a:latin typeface="Times New Roman" pitchFamily="18" charset="0"/>
+                <a:cs typeface="Times New Roman" pitchFamily="18" charset="0"/>
+              </a:rPr>
+              <a:t>, </a:t>
+            </a:r>
+            <a:r>
+              <a:rPr lang="en-US" sz="2400" dirty="0" err="1" smtClean="0">
+                <a:latin typeface="Times New Roman" pitchFamily="18" charset="0"/>
+                <a:cs typeface="Times New Roman" pitchFamily="18" charset="0"/>
+              </a:rPr>
+              <a:t>cAdvisor</a:t>
+            </a:r>
+            <a:r>
+              <a:rPr lang="en-US" sz="2400" dirty="0" smtClean="0">
+                <a:latin typeface="Times New Roman" pitchFamily="18" charset="0"/>
+                <a:cs typeface="Times New Roman" pitchFamily="18" charset="0"/>
+              </a:rPr>
+              <a:t>, </a:t>
+            </a:r>
+            <a:r>
+              <a:rPr lang="en-US" sz="2400" dirty="0" err="1" smtClean="0">
+                <a:latin typeface="Times New Roman" pitchFamily="18" charset="0"/>
+                <a:cs typeface="Times New Roman" pitchFamily="18" charset="0"/>
+              </a:rPr>
+              <a:t>NodeExporter</a:t>
+            </a:r>
+            <a:r>
+              <a:rPr lang="en-US" sz="2400" dirty="0" smtClean="0">
+                <a:latin typeface="Times New Roman" pitchFamily="18" charset="0"/>
+                <a:cs typeface="Times New Roman" pitchFamily="18" charset="0"/>
+              </a:rPr>
+              <a:t> </a:t>
+            </a:r>
+            <a:r>
+              <a:rPr lang="en-US" sz="2400" dirty="0" smtClean="0">
+                <a:latin typeface="Times New Roman" pitchFamily="18" charset="0"/>
+                <a:cs typeface="Times New Roman" pitchFamily="18" charset="0"/>
+              </a:rPr>
+              <a:t>and </a:t>
+            </a:r>
+            <a:r>
+              <a:rPr lang="en-US" sz="2400" dirty="0" err="1" smtClean="0">
+                <a:latin typeface="Times New Roman" pitchFamily="18" charset="0"/>
+                <a:cs typeface="Times New Roman" pitchFamily="18" charset="0"/>
+              </a:rPr>
+              <a:t>AlertManager</a:t>
+            </a:r>
+            <a:r>
+              <a:rPr lang="en-US" sz="2400" dirty="0" smtClean="0">
+                <a:latin typeface="Times New Roman" pitchFamily="18" charset="0"/>
+                <a:cs typeface="Times New Roman" pitchFamily="18" charset="0"/>
+              </a:rPr>
+              <a:t>.</a:t>
+            </a:r>
+          </a:p>
+          <a:p>
+            <a:pPr algn="just"/>
+            <a:r>
+              <a:rPr lang="en-US" sz="2400" dirty="0" smtClean="0">
+                <a:latin typeface="Times New Roman" pitchFamily="18" charset="0"/>
+                <a:cs typeface="Times New Roman" pitchFamily="18" charset="0"/>
+              </a:rPr>
+              <a:t>Clone the repository and run the installation</a:t>
+            </a:r>
+            <a:r>
+              <a:rPr lang="en-US" sz="2400" dirty="0" smtClean="0">
+                <a:latin typeface="Times New Roman" pitchFamily="18" charset="0"/>
+                <a:cs typeface="Times New Roman" pitchFamily="18" charset="0"/>
+              </a:rPr>
+              <a:t>:</a:t>
+            </a:r>
+          </a:p>
+          <a:p>
+            <a:pPr algn="just">
+              <a:buNone/>
+            </a:pPr>
+            <a:endParaRPr lang="en-US" sz="2400" dirty="0" smtClean="0">
+              <a:latin typeface="Times New Roman" pitchFamily="18" charset="0"/>
+              <a:cs typeface="Times New Roman" pitchFamily="18" charset="0"/>
+            </a:endParaRPr>
+          </a:p>
+          <a:p>
+            <a:pPr algn="just">
+              <a:buNone/>
+            </a:pPr>
+            <a:endParaRPr lang="en-US" sz="2400" dirty="0" smtClean="0">
+              <a:latin typeface="Times New Roman" pitchFamily="18" charset="0"/>
+              <a:cs typeface="Times New Roman" pitchFamily="18" charset="0"/>
+            </a:endParaRPr>
+          </a:p>
+          <a:p>
+            <a:pPr>
+              <a:buNone/>
+            </a:pPr>
+            <a:r>
+              <a:rPr lang="en-US" sz="1800" dirty="0" err="1" smtClean="0">
+                <a:latin typeface="Times New Roman" pitchFamily="18" charset="0"/>
+                <a:cs typeface="Times New Roman" pitchFamily="18" charset="0"/>
+              </a:rPr>
+              <a:t>git</a:t>
+            </a:r>
+            <a:r>
+              <a:rPr lang="en-US" sz="1800" dirty="0" smtClean="0">
+                <a:latin typeface="Times New Roman" pitchFamily="18" charset="0"/>
+                <a:cs typeface="Times New Roman" pitchFamily="18" charset="0"/>
+              </a:rPr>
+              <a:t> clone https://github.com/Einsteinish/Docker-Compose-Prometheus-and-Grafana.git</a:t>
+            </a:r>
+          </a:p>
+          <a:p>
+            <a:pPr algn="just">
+              <a:buNone/>
+            </a:pPr>
+            <a:r>
+              <a:rPr lang="en-US" sz="1800" dirty="0" err="1" smtClean="0">
+                <a:latin typeface="Times New Roman" pitchFamily="18" charset="0"/>
+                <a:cs typeface="Times New Roman" pitchFamily="18" charset="0"/>
+              </a:rPr>
+              <a:t>cd</a:t>
+            </a:r>
+            <a:r>
+              <a:rPr lang="en-US" sz="1800" dirty="0" smtClean="0">
+                <a:latin typeface="Times New Roman" pitchFamily="18" charset="0"/>
+                <a:cs typeface="Times New Roman" pitchFamily="18" charset="0"/>
+              </a:rPr>
+              <a:t> </a:t>
+            </a:r>
+            <a:r>
+              <a:rPr lang="en-US" sz="1800" dirty="0" err="1" smtClean="0">
+                <a:latin typeface="Times New Roman" pitchFamily="18" charset="0"/>
+                <a:cs typeface="Times New Roman" pitchFamily="18" charset="0"/>
+              </a:rPr>
+              <a:t>Docker</a:t>
+            </a:r>
+            <a:r>
+              <a:rPr lang="en-US" sz="1800" dirty="0" smtClean="0">
+                <a:latin typeface="Times New Roman" pitchFamily="18" charset="0"/>
+                <a:cs typeface="Times New Roman" pitchFamily="18" charset="0"/>
+              </a:rPr>
+              <a:t>-Compose-Prometheus-and-</a:t>
+            </a:r>
+            <a:r>
+              <a:rPr lang="en-US" sz="1800" dirty="0" err="1" smtClean="0">
+                <a:latin typeface="Times New Roman" pitchFamily="18" charset="0"/>
+                <a:cs typeface="Times New Roman" pitchFamily="18" charset="0"/>
+              </a:rPr>
+              <a:t>Grafana</a:t>
+            </a:r>
+            <a:endParaRPr lang="en-US" sz="1800" dirty="0" smtClean="0">
+              <a:latin typeface="Times New Roman" pitchFamily="18" charset="0"/>
+              <a:cs typeface="Times New Roman" pitchFamily="18" charset="0"/>
+            </a:endParaRPr>
+          </a:p>
+          <a:p>
+            <a:pPr algn="just">
+              <a:buNone/>
+            </a:pPr>
+            <a:r>
+              <a:rPr lang="en-US" sz="1800" dirty="0" err="1" smtClean="0">
+                <a:latin typeface="Times New Roman" pitchFamily="18" charset="0"/>
+                <a:cs typeface="Times New Roman" pitchFamily="18" charset="0"/>
+              </a:rPr>
+              <a:t>docker</a:t>
+            </a:r>
+            <a:r>
+              <a:rPr lang="en-US" sz="1800" dirty="0" smtClean="0">
+                <a:latin typeface="Times New Roman" pitchFamily="18" charset="0"/>
+                <a:cs typeface="Times New Roman" pitchFamily="18" charset="0"/>
+              </a:rPr>
+              <a:t>-compose up -d</a:t>
+            </a:r>
+            <a:endParaRPr lang="en-US" sz="1800" dirty="0">
+              <a:latin typeface="Times New Roman" pitchFamily="18" charset="0"/>
+              <a:cs typeface="Times New Roman" pitchFamily="18" charset="0"/>
+            </a:endParaRPr>
+          </a:p>
+        </p:txBody>
+      </p:sp>
+      <p:pic>
+        <p:nvPicPr>
+          <p:cNvPr id="4" name="Рисунок 3" descr="grafana.jpg"/>
+          <p:cNvPicPr>
+            <a:picLocks noChangeAspect="1"/>
+          </p:cNvPicPr>
+          <p:nvPr/>
+        </p:nvPicPr>
+        <p:blipFill>
+          <a:blip r:embed="rId2" cstate="print"/>
+          <a:stretch>
+            <a:fillRect/>
+          </a:stretch>
+        </p:blipFill>
+        <p:spPr>
+          <a:xfrm>
+            <a:off x="7696200" y="304800"/>
+            <a:ext cx="1320800" cy="1320800"/>
+          </a:xfrm>
+          <a:prstGeom prst="rect">
+            <a:avLst/>
+          </a:prstGeom>
+        </p:spPr>
+      </p:pic>
+      <p:pic>
+        <p:nvPicPr>
+          <p:cNvPr id="5" name="Рисунок 4" descr="prometheus.png"/>
+          <p:cNvPicPr>
+            <a:picLocks noChangeAspect="1"/>
+          </p:cNvPicPr>
+          <p:nvPr/>
+        </p:nvPicPr>
+        <p:blipFill>
+          <a:blip r:embed="rId3" cstate="print"/>
+          <a:stretch>
+            <a:fillRect/>
+          </a:stretch>
+        </p:blipFill>
+        <p:spPr>
+          <a:xfrm>
+            <a:off x="152400" y="228600"/>
+            <a:ext cx="2186940" cy="1341120"/>
+          </a:xfrm>
+          <a:prstGeom prst="rect">
+            <a:avLst/>
+          </a:prstGeom>
+        </p:spPr>
+      </p:pic>
+    </p:spTree>
+  </p:cSld>
+  <p:clrMapOvr>
+    <a:masterClrMapping/>
+  </p:clrMapOvr>
+</p:sld>
+</file>
+
+<file path=ppt/slides/slide19.xml><?xml version="1.0" encoding="utf-8"?>
+<p:sld xmlns:a="http://schemas.openxmlformats.org/drawingml/2006/main" xmlns:r="http://schemas.openxmlformats.org/officeDocument/2006/relationships" xmlns:p="http://schemas.openxmlformats.org/presentationml/2006/main">
+  <p:cSld>
+    <p:spTree>
+      <p:nvGrpSpPr>
+        <p:cNvPr id="1" name=""/>
+        <p:cNvGrpSpPr/>
+        <p:nvPr/>
+      </p:nvGrpSpPr>
+      <p:grpSpPr>
+        <a:xfrm>
+          <a:off x="0" y="0"/>
+          <a:ext cx="0" cy="0"/>
+          <a:chOff x="0" y="0"/>
+          <a:chExt cx="0" cy="0"/>
+        </a:xfrm>
+      </p:grpSpPr>
+      <p:sp>
+        <p:nvSpPr>
+          <p:cNvPr id="2" name="Заголовок 1"/>
+          <p:cNvSpPr>
+            <a:spLocks noGrp="1"/>
+          </p:cNvSpPr>
+          <p:nvPr>
+            <p:ph type="title"/>
+          </p:nvPr>
+        </p:nvSpPr>
+        <p:spPr/>
+        <p:txBody>
+          <a:bodyPr/>
+          <a:lstStyle/>
+          <a:p>
+            <a:endParaRPr lang="en-US"/>
+          </a:p>
+        </p:txBody>
+      </p:sp>
+      <p:sp>
+        <p:nvSpPr>
+          <p:cNvPr id="3" name="Содержимое 2"/>
+          <p:cNvSpPr>
+            <a:spLocks noGrp="1"/>
+          </p:cNvSpPr>
+          <p:nvPr>
+            <p:ph idx="1"/>
+          </p:nvPr>
+        </p:nvSpPr>
+        <p:spPr/>
+        <p:txBody>
+          <a:bodyPr/>
+          <a:lstStyle/>
+          <a:p>
+            <a:endParaRPr lang="en-US"/>
           </a:p>
         </p:txBody>
       </p:sp>
@@ -4102,178 +5734,50 @@
         <p:spPr>
           <a:xfrm>
             <a:off x="457200" y="457200"/>
-            <a:ext cx="8229600" cy="667512"/>
-          </a:xfrm>
-        </p:spPr>
-        <p:txBody>
-          <a:bodyPr>
-            <a:normAutofit fontScale="90000"/>
-          </a:bodyPr>
+            <a:ext cx="8229600" cy="819912"/>
+          </a:xfrm>
+        </p:spPr>
+        <p:txBody>
+          <a:bodyPr/>
           <a:lstStyle/>
           <a:p>
             <a:pPr algn="ctr"/>
             <a:r>
               <a:rPr lang="en-US" dirty="0" smtClean="0"/>
-              <a:t>Task descriptions</a:t>
-            </a:r>
-            <a:endParaRPr lang="en-US" dirty="0"/>
-          </a:p>
-        </p:txBody>
-      </p:sp>
-      <p:sp>
-        <p:nvSpPr>
-          <p:cNvPr id="3" name="Содержимое 2"/>
-          <p:cNvSpPr>
-            <a:spLocks noGrp="1"/>
-          </p:cNvSpPr>
-          <p:nvPr>
-            <p:ph idx="1"/>
-          </p:nvPr>
-        </p:nvSpPr>
-        <p:spPr>
-          <a:xfrm>
-            <a:off x="457200" y="1066800"/>
-            <a:ext cx="8229600" cy="5257800"/>
-          </a:xfrm>
-        </p:spPr>
-        <p:txBody>
-          <a:bodyPr>
-            <a:normAutofit lnSpcReduction="10000"/>
-          </a:bodyPr>
-          <a:lstStyle/>
-          <a:p>
-            <a:pPr marL="109728" indent="0">
-              <a:buNone/>
-            </a:pPr>
-            <a:r>
-              <a:rPr lang="en-US" sz="2800" dirty="0" smtClean="0"/>
-              <a:t>Automated and fast deployment site </a:t>
-            </a:r>
-            <a:r>
-              <a:rPr lang="en-US" sz="2800" dirty="0" smtClean="0"/>
-              <a:t>to </a:t>
-            </a:r>
-            <a:r>
-              <a:rPr lang="en-US" sz="2800" dirty="0" smtClean="0"/>
-              <a:t>server after changes.</a:t>
-            </a:r>
-          </a:p>
-          <a:p>
-            <a:pPr marL="109728" indent="0">
-              <a:buNone/>
-            </a:pPr>
-            <a:r>
-              <a:rPr lang="en-US" sz="2800" dirty="0" smtClean="0"/>
-              <a:t>In project I</a:t>
-            </a:r>
-            <a:r>
-              <a:rPr lang="en-US" sz="2800" dirty="0" smtClean="0"/>
-              <a:t> </a:t>
-            </a:r>
-            <a:r>
-              <a:rPr lang="en-US" sz="2800" dirty="0" smtClean="0"/>
-              <a:t>used:</a:t>
-            </a:r>
-          </a:p>
-          <a:p>
-            <a:r>
-              <a:rPr lang="en-US" sz="2800" dirty="0" smtClean="0"/>
-              <a:t>Google Cloud </a:t>
-            </a:r>
-            <a:r>
-              <a:rPr lang="en-US" sz="2800" dirty="0" smtClean="0"/>
-              <a:t>Platform;</a:t>
-            </a:r>
-            <a:endParaRPr lang="en-US" sz="2800" dirty="0" smtClean="0"/>
-          </a:p>
-          <a:p>
-            <a:r>
-              <a:rPr lang="en-US" sz="2800" dirty="0" err="1" smtClean="0"/>
-              <a:t>GitHub</a:t>
-            </a:r>
-            <a:r>
-              <a:rPr lang="en-US" sz="2800" dirty="0" smtClean="0"/>
-              <a:t>;</a:t>
-            </a:r>
-            <a:endParaRPr lang="uk-UA" sz="2800" dirty="0" smtClean="0"/>
-          </a:p>
-          <a:p>
-            <a:r>
-              <a:rPr lang="en-US" sz="2800" dirty="0" smtClean="0"/>
-              <a:t>Jenkins;</a:t>
-            </a:r>
-          </a:p>
-          <a:p>
-            <a:r>
-              <a:rPr lang="en-US" sz="2800" dirty="0" err="1" smtClean="0"/>
-              <a:t>Terraform</a:t>
-            </a:r>
-            <a:r>
-              <a:rPr lang="en-US" sz="2800" dirty="0" smtClean="0"/>
-              <a:t>;</a:t>
-            </a:r>
-          </a:p>
-          <a:p>
-            <a:r>
-              <a:rPr lang="en-US" sz="2800" dirty="0" smtClean="0"/>
-              <a:t>Bash scripts;</a:t>
-            </a:r>
-            <a:endParaRPr lang="en-US" sz="2800" dirty="0" smtClean="0"/>
-          </a:p>
-          <a:p>
-            <a:r>
-              <a:rPr lang="en-US" sz="2800" dirty="0" err="1" smtClean="0"/>
-              <a:t>Docker</a:t>
-            </a:r>
-            <a:r>
-              <a:rPr lang="en-US" sz="2800" dirty="0" smtClean="0"/>
-              <a:t>, </a:t>
-            </a:r>
-            <a:r>
-              <a:rPr lang="en-US" sz="2800" dirty="0" err="1" smtClean="0"/>
-              <a:t>docker</a:t>
-            </a:r>
-            <a:r>
-              <a:rPr lang="en-US" sz="2800" dirty="0" smtClean="0"/>
-              <a:t>-compose;</a:t>
-            </a:r>
-            <a:endParaRPr lang="en-US" sz="2800" dirty="0" smtClean="0"/>
-          </a:p>
-          <a:p>
-            <a:r>
-              <a:rPr lang="en-US" sz="2800" dirty="0" err="1" smtClean="0"/>
-              <a:t>Django</a:t>
-            </a:r>
-            <a:r>
-              <a:rPr lang="en-US" sz="2800" dirty="0" smtClean="0"/>
-              <a:t>;</a:t>
-            </a:r>
-            <a:endParaRPr lang="en-US" sz="2800" dirty="0" smtClean="0"/>
-          </a:p>
-          <a:p>
-            <a:r>
-              <a:rPr lang="en-US" sz="2800" dirty="0" smtClean="0"/>
-              <a:t>Bonus+: </a:t>
-            </a:r>
-            <a:r>
-              <a:rPr lang="en-US" sz="2800" dirty="0" smtClean="0"/>
-              <a:t>Prometheus, </a:t>
-            </a:r>
-            <a:r>
-              <a:rPr lang="en-US" sz="2800" dirty="0" err="1" smtClean="0"/>
-              <a:t>Grafana</a:t>
-            </a:r>
-            <a:r>
-              <a:rPr lang="en-US" sz="2800" dirty="0" smtClean="0"/>
-              <a:t>.</a:t>
-            </a:r>
-            <a:endParaRPr lang="ru-RU" sz="2800" dirty="0" smtClean="0"/>
-          </a:p>
-          <a:p>
-            <a:endParaRPr lang="en-US" dirty="0"/>
-          </a:p>
-        </p:txBody>
-      </p:sp>
+              <a:t>Final task </a:t>
+            </a:r>
+            <a:r>
+              <a:rPr lang="en-US" sz="4500" dirty="0" smtClean="0"/>
+              <a:t>diagram</a:t>
+            </a:r>
+            <a:endParaRPr lang="en-US" sz="4500" dirty="0"/>
+          </a:p>
+        </p:txBody>
+      </p:sp>
+      <p:pic>
+        <p:nvPicPr>
+          <p:cNvPr id="5" name="Рисунок 4" descr="finaltask1.png"/>
+          <p:cNvPicPr>
+            <a:picLocks noChangeAspect="1"/>
+          </p:cNvPicPr>
+          <p:nvPr/>
+        </p:nvPicPr>
+        <p:blipFill>
+          <a:blip r:embed="rId2" cstate="print"/>
+          <a:stretch>
+            <a:fillRect/>
+          </a:stretch>
+        </p:blipFill>
+        <p:spPr>
+          <a:xfrm>
+            <a:off x="457200" y="1371600"/>
+            <a:ext cx="7638766" cy="5181600"/>
+          </a:xfrm>
+          <a:prstGeom prst="rect">
+            <a:avLst/>
+          </a:prstGeom>
+        </p:spPr>
+      </p:pic>
     </p:spTree>
   </p:cSld>
   <p:clrMapOvr>
@@ -4311,7 +5815,249 @@
         </p:nvSpPr>
         <p:spPr>
           <a:xfrm>
-            <a:off x="457200" y="704088"/>
+            <a:off x="457200" y="457200"/>
+            <a:ext cx="8229600" cy="667512"/>
+          </a:xfrm>
+        </p:spPr>
+        <p:txBody>
+          <a:bodyPr>
+            <a:normAutofit fontScale="90000"/>
+          </a:bodyPr>
+          <a:lstStyle/>
+          <a:p>
+            <a:pPr algn="ctr"/>
+            <a:r>
+              <a:rPr lang="en-US" dirty="0" smtClean="0"/>
+              <a:t>Task descriptions</a:t>
+            </a:r>
+            <a:endParaRPr lang="en-US" dirty="0"/>
+          </a:p>
+        </p:txBody>
+      </p:sp>
+      <p:sp>
+        <p:nvSpPr>
+          <p:cNvPr id="3" name="Содержимое 2"/>
+          <p:cNvSpPr>
+            <a:spLocks noGrp="1"/>
+          </p:cNvSpPr>
+          <p:nvPr>
+            <p:ph idx="1"/>
+          </p:nvPr>
+        </p:nvSpPr>
+        <p:spPr>
+          <a:xfrm>
+            <a:off x="457200" y="1066800"/>
+            <a:ext cx="8229600" cy="5257800"/>
+          </a:xfrm>
+        </p:spPr>
+        <p:txBody>
+          <a:bodyPr>
+            <a:normAutofit lnSpcReduction="10000"/>
+          </a:bodyPr>
+          <a:lstStyle/>
+          <a:p>
+            <a:pPr marL="109728" indent="0">
+              <a:buNone/>
+            </a:pPr>
+            <a:r>
+              <a:rPr lang="en-US" sz="2800" dirty="0" smtClean="0">
+                <a:latin typeface="Times New Roman" pitchFamily="18" charset="0"/>
+                <a:cs typeface="Times New Roman" pitchFamily="18" charset="0"/>
+              </a:rPr>
+              <a:t>Automated and fast deployment site to server after changes.</a:t>
+            </a:r>
+          </a:p>
+          <a:p>
+            <a:pPr marL="109728" indent="0">
+              <a:buNone/>
+            </a:pPr>
+            <a:r>
+              <a:rPr lang="en-US" sz="2800" b="1" dirty="0" smtClean="0">
+                <a:latin typeface="Times New Roman" pitchFamily="18" charset="0"/>
+                <a:cs typeface="Times New Roman" pitchFamily="18" charset="0"/>
+              </a:rPr>
+              <a:t>In project we used:</a:t>
+            </a:r>
+          </a:p>
+          <a:p>
+            <a:r>
+              <a:rPr lang="en-US" sz="2800" dirty="0" smtClean="0">
+                <a:latin typeface="Times New Roman" pitchFamily="18" charset="0"/>
+                <a:cs typeface="Times New Roman" pitchFamily="18" charset="0"/>
+              </a:rPr>
+              <a:t>Google Cloud Platform;</a:t>
+            </a:r>
+          </a:p>
+          <a:p>
+            <a:r>
+              <a:rPr lang="en-US" sz="2800" dirty="0" err="1" smtClean="0">
+                <a:latin typeface="Times New Roman" pitchFamily="18" charset="0"/>
+                <a:cs typeface="Times New Roman" pitchFamily="18" charset="0"/>
+              </a:rPr>
+              <a:t>GitHub</a:t>
+            </a:r>
+            <a:r>
+              <a:rPr lang="en-US" sz="2800" dirty="0" smtClean="0">
+                <a:latin typeface="Times New Roman" pitchFamily="18" charset="0"/>
+                <a:cs typeface="Times New Roman" pitchFamily="18" charset="0"/>
+              </a:rPr>
+              <a:t>;</a:t>
+            </a:r>
+            <a:endParaRPr lang="uk-UA" sz="2800" dirty="0" smtClean="0">
+              <a:latin typeface="Times New Roman" pitchFamily="18" charset="0"/>
+              <a:cs typeface="Times New Roman" pitchFamily="18" charset="0"/>
+            </a:endParaRPr>
+          </a:p>
+          <a:p>
+            <a:r>
+              <a:rPr lang="en-US" sz="2800" dirty="0" smtClean="0">
+                <a:latin typeface="Times New Roman" pitchFamily="18" charset="0"/>
+                <a:cs typeface="Times New Roman" pitchFamily="18" charset="0"/>
+              </a:rPr>
+              <a:t>Jenkins;</a:t>
+            </a:r>
+          </a:p>
+          <a:p>
+            <a:r>
+              <a:rPr lang="en-US" sz="2800" dirty="0" err="1" smtClean="0">
+                <a:latin typeface="Times New Roman" pitchFamily="18" charset="0"/>
+                <a:cs typeface="Times New Roman" pitchFamily="18" charset="0"/>
+              </a:rPr>
+              <a:t>Terraform</a:t>
+            </a:r>
+            <a:r>
+              <a:rPr lang="en-US" sz="2800" dirty="0" smtClean="0">
+                <a:latin typeface="Times New Roman" pitchFamily="18" charset="0"/>
+                <a:cs typeface="Times New Roman" pitchFamily="18" charset="0"/>
+              </a:rPr>
+              <a:t>;</a:t>
+            </a:r>
+          </a:p>
+          <a:p>
+            <a:r>
+              <a:rPr lang="en-US" sz="2800" dirty="0" smtClean="0">
+                <a:latin typeface="Times New Roman" pitchFamily="18" charset="0"/>
+                <a:cs typeface="Times New Roman" pitchFamily="18" charset="0"/>
+              </a:rPr>
+              <a:t>Bash scripts;</a:t>
+            </a:r>
+          </a:p>
+          <a:p>
+            <a:r>
+              <a:rPr lang="en-US" sz="2800" dirty="0" err="1" smtClean="0">
+                <a:latin typeface="Times New Roman" pitchFamily="18" charset="0"/>
+                <a:cs typeface="Times New Roman" pitchFamily="18" charset="0"/>
+              </a:rPr>
+              <a:t>Docker</a:t>
+            </a:r>
+            <a:r>
+              <a:rPr lang="en-US" sz="2800" dirty="0" smtClean="0">
+                <a:latin typeface="Times New Roman" pitchFamily="18" charset="0"/>
+                <a:cs typeface="Times New Roman" pitchFamily="18" charset="0"/>
+              </a:rPr>
+              <a:t>, </a:t>
+            </a:r>
+            <a:r>
+              <a:rPr lang="en-US" sz="2800" dirty="0" err="1" smtClean="0">
+                <a:latin typeface="Times New Roman" pitchFamily="18" charset="0"/>
+                <a:cs typeface="Times New Roman" pitchFamily="18" charset="0"/>
+              </a:rPr>
+              <a:t>docker</a:t>
+            </a:r>
+            <a:r>
+              <a:rPr lang="en-US" sz="2800" dirty="0" smtClean="0">
+                <a:latin typeface="Times New Roman" pitchFamily="18" charset="0"/>
+                <a:cs typeface="Times New Roman" pitchFamily="18" charset="0"/>
+              </a:rPr>
+              <a:t>-compose;</a:t>
+            </a:r>
+          </a:p>
+          <a:p>
+            <a:r>
+              <a:rPr lang="en-US" sz="2800" dirty="0" err="1" smtClean="0">
+                <a:latin typeface="Times New Roman" pitchFamily="18" charset="0"/>
+                <a:cs typeface="Times New Roman" pitchFamily="18" charset="0"/>
+              </a:rPr>
+              <a:t>Django</a:t>
+            </a:r>
+            <a:r>
+              <a:rPr lang="en-US" sz="2800" dirty="0" smtClean="0">
+                <a:latin typeface="Times New Roman" pitchFamily="18" charset="0"/>
+                <a:cs typeface="Times New Roman" pitchFamily="18" charset="0"/>
+              </a:rPr>
+              <a:t>;</a:t>
+            </a:r>
+          </a:p>
+          <a:p>
+            <a:r>
+              <a:rPr lang="en-US" sz="2800" dirty="0" smtClean="0">
+                <a:latin typeface="Times New Roman" pitchFamily="18" charset="0"/>
+                <a:cs typeface="Times New Roman" pitchFamily="18" charset="0"/>
+              </a:rPr>
+              <a:t>Bonus+: Prometheus, </a:t>
+            </a:r>
+            <a:r>
+              <a:rPr lang="en-US" sz="2800" dirty="0" err="1" smtClean="0">
+                <a:latin typeface="Times New Roman" pitchFamily="18" charset="0"/>
+                <a:cs typeface="Times New Roman" pitchFamily="18" charset="0"/>
+              </a:rPr>
+              <a:t>Grafana</a:t>
+            </a:r>
+            <a:r>
+              <a:rPr lang="en-US" sz="2800" dirty="0" smtClean="0">
+                <a:latin typeface="Times New Roman" pitchFamily="18" charset="0"/>
+                <a:cs typeface="Times New Roman" pitchFamily="18" charset="0"/>
+              </a:rPr>
+              <a:t>.</a:t>
+            </a:r>
+            <a:endParaRPr lang="ru-RU" sz="2800" dirty="0" smtClean="0">
+              <a:latin typeface="Times New Roman" pitchFamily="18" charset="0"/>
+              <a:cs typeface="Times New Roman" pitchFamily="18" charset="0"/>
+            </a:endParaRPr>
+          </a:p>
+          <a:p>
+            <a:endParaRPr lang="en-US" dirty="0"/>
+          </a:p>
+        </p:txBody>
+      </p:sp>
+    </p:spTree>
+  </p:cSld>
+  <p:clrMapOvr>
+    <a:masterClrMapping/>
+  </p:clrMapOvr>
+</p:sld>
+</file>
+
+<file path=ppt/slides/slide4.xml><?xml version="1.0" encoding="utf-8"?>
+<p:sld xmlns:a="http://schemas.openxmlformats.org/drawingml/2006/main" xmlns:r="http://schemas.openxmlformats.org/officeDocument/2006/relationships" xmlns:p="http://schemas.openxmlformats.org/presentationml/2006/main">
+  <p:cSld>
+    <p:spTree>
+      <p:nvGrpSpPr>
+        <p:cNvPr id="1" name=""/>
+        <p:cNvGrpSpPr/>
+        <p:nvPr/>
+      </p:nvGrpSpPr>
+      <p:grpSpPr>
+        <a:xfrm>
+          <a:off x="0" y="0"/>
+          <a:ext cx="0" cy="0"/>
+          <a:chOff x="0" y="0"/>
+          <a:chExt cx="0" cy="0"/>
+        </a:xfrm>
+      </p:grpSpPr>
+      <p:sp>
+        <p:nvSpPr>
+          <p:cNvPr id="2" name="Заголовок 1"/>
+          <p:cNvSpPr>
+            <a:spLocks noGrp="1"/>
+          </p:cNvSpPr>
+          <p:nvPr>
+            <p:ph type="title"/>
+          </p:nvPr>
+        </p:nvSpPr>
+        <p:spPr>
+          <a:xfrm>
+            <a:off x="457200" y="304800"/>
             <a:ext cx="8229600" cy="591312"/>
           </a:xfrm>
         </p:spPr>
@@ -4360,8 +6106,8 @@
         </p:nvSpPr>
         <p:spPr>
           <a:xfrm>
-            <a:off x="152400" y="1676400"/>
-            <a:ext cx="3657600" cy="3693319"/>
+            <a:off x="228600" y="990600"/>
+            <a:ext cx="4191000" cy="5262979"/>
           </a:xfrm>
           <a:prstGeom prst="rect">
             <a:avLst/>
@@ -4375,13 +6121,13 @@
           <a:p>
             <a:pPr algn="just"/>
             <a:r>
-              <a:rPr lang="en-US" b="1" dirty="0" smtClean="0">
+              <a:rPr lang="en-US" sz="2400" dirty="0" smtClean="0">
                 <a:latin typeface="Times New Roman" pitchFamily="18" charset="0"/>
                 <a:cs typeface="Times New Roman" pitchFamily="18" charset="0"/>
               </a:rPr>
               <a:t>Google Cloud Platform (GCP), offered by Google (company), is a suite of cloud computing services that runs on the same infrastructure that Google uses internally for its end-user products, such as Google Search, Gmail, file storage, and YouTube. Alongside a set of management tools, it provides a series of modular cloud services including computing, data storage, data analytics and machine learning.</a:t>
             </a:r>
-            <a:endParaRPr lang="en-US" dirty="0">
+            <a:endParaRPr lang="en-US" sz="2400" dirty="0">
               <a:latin typeface="Times New Roman" pitchFamily="18" charset="0"/>
               <a:cs typeface="Times New Roman" pitchFamily="18" charset="0"/>
             </a:endParaRPr>
@@ -4406,6 +6152,1136 @@
           <a:xfrm>
             <a:off x="6400800" y="304800"/>
             <a:ext cx="1980724" cy="1237953"/>
+          </a:xfrm>
+          <a:prstGeom prst="rect">
+            <a:avLst/>
+          </a:prstGeom>
+        </p:spPr>
+      </p:pic>
+    </p:spTree>
+  </p:cSld>
+  <p:clrMapOvr>
+    <a:masterClrMapping/>
+  </p:clrMapOvr>
+</p:sld>
+</file>
+
+<file path=ppt/slides/slide5.xml><?xml version="1.0" encoding="utf-8"?>
+<p:sld xmlns:a="http://schemas.openxmlformats.org/drawingml/2006/main" xmlns:r="http://schemas.openxmlformats.org/officeDocument/2006/relationships" xmlns:p="http://schemas.openxmlformats.org/presentationml/2006/main">
+  <p:cSld>
+    <p:spTree>
+      <p:nvGrpSpPr>
+        <p:cNvPr id="1" name=""/>
+        <p:cNvGrpSpPr/>
+        <p:nvPr/>
+      </p:nvGrpSpPr>
+      <p:grpSpPr>
+        <a:xfrm>
+          <a:off x="0" y="0"/>
+          <a:ext cx="0" cy="0"/>
+          <a:chOff x="0" y="0"/>
+          <a:chExt cx="0" cy="0"/>
+        </a:xfrm>
+      </p:grpSpPr>
+      <p:sp>
+        <p:nvSpPr>
+          <p:cNvPr id="2" name="Заголовок 1"/>
+          <p:cNvSpPr>
+            <a:spLocks noGrp="1"/>
+          </p:cNvSpPr>
+          <p:nvPr>
+            <p:ph type="title"/>
+          </p:nvPr>
+        </p:nvSpPr>
+        <p:spPr>
+          <a:xfrm>
+            <a:off x="457200" y="704088"/>
+            <a:ext cx="8229600" cy="743712"/>
+          </a:xfrm>
+        </p:spPr>
+        <p:txBody>
+          <a:bodyPr>
+            <a:normAutofit/>
+          </a:bodyPr>
+          <a:lstStyle/>
+          <a:p>
+            <a:pPr algn="ctr"/>
+            <a:r>
+              <a:rPr lang="en-US" sz="4500" dirty="0" err="1" smtClean="0"/>
+              <a:t>Terraform</a:t>
+            </a:r>
+            <a:endParaRPr lang="en-US" sz="4500" dirty="0"/>
+          </a:p>
+        </p:txBody>
+      </p:sp>
+      <p:sp>
+        <p:nvSpPr>
+          <p:cNvPr id="3" name="Содержимое 2"/>
+          <p:cNvSpPr>
+            <a:spLocks noGrp="1"/>
+          </p:cNvSpPr>
+          <p:nvPr>
+            <p:ph idx="1"/>
+          </p:nvPr>
+        </p:nvSpPr>
+        <p:spPr>
+          <a:xfrm>
+            <a:off x="152400" y="1447800"/>
+            <a:ext cx="3581400" cy="4648200"/>
+          </a:xfrm>
+        </p:spPr>
+        <p:txBody>
+          <a:bodyPr>
+            <a:normAutofit/>
+          </a:bodyPr>
+          <a:lstStyle/>
+          <a:p>
+            <a:pPr algn="just"/>
+            <a:r>
+              <a:rPr lang="en-US" sz="2400" dirty="0" err="1" smtClean="0">
+                <a:latin typeface="Times New Roman" pitchFamily="18" charset="0"/>
+                <a:cs typeface="Times New Roman" pitchFamily="18" charset="0"/>
+              </a:rPr>
+              <a:t>Terraform</a:t>
+            </a:r>
+            <a:r>
+              <a:rPr lang="en-US" sz="2400" dirty="0" smtClean="0">
+                <a:latin typeface="Times New Roman" pitchFamily="18" charset="0"/>
+                <a:cs typeface="Times New Roman" pitchFamily="18" charset="0"/>
+              </a:rPr>
+              <a:t> is an open-source infrastructure as code software tool created by </a:t>
+            </a:r>
+            <a:r>
+              <a:rPr lang="en-US" sz="2400" dirty="0" err="1" smtClean="0">
+                <a:latin typeface="Times New Roman" pitchFamily="18" charset="0"/>
+                <a:cs typeface="Times New Roman" pitchFamily="18" charset="0"/>
+              </a:rPr>
+              <a:t>HashiCorp</a:t>
+            </a:r>
+            <a:r>
+              <a:rPr lang="en-US" sz="2400" dirty="0" smtClean="0">
+                <a:latin typeface="Times New Roman" pitchFamily="18" charset="0"/>
+                <a:cs typeface="Times New Roman" pitchFamily="18" charset="0"/>
+              </a:rPr>
+              <a:t>. Users define and provision data center infrastructure using a declarative configuration language known as </a:t>
+            </a:r>
+            <a:r>
+              <a:rPr lang="en-US" sz="2400" dirty="0" err="1" smtClean="0">
+                <a:latin typeface="Times New Roman" pitchFamily="18" charset="0"/>
+                <a:cs typeface="Times New Roman" pitchFamily="18" charset="0"/>
+              </a:rPr>
+              <a:t>HashiCorp</a:t>
+            </a:r>
+            <a:r>
+              <a:rPr lang="en-US" sz="2400" dirty="0" smtClean="0">
+                <a:latin typeface="Times New Roman" pitchFamily="18" charset="0"/>
+                <a:cs typeface="Times New Roman" pitchFamily="18" charset="0"/>
+              </a:rPr>
+              <a:t> Configuration Language (HCL), or optionally JSON.</a:t>
+            </a:r>
+          </a:p>
+          <a:p>
+            <a:pPr algn="just"/>
+            <a:endParaRPr lang="en-US" sz="2400" dirty="0">
+              <a:latin typeface="Times New Roman" pitchFamily="18" charset="0"/>
+              <a:cs typeface="Times New Roman" pitchFamily="18" charset="0"/>
+            </a:endParaRPr>
+          </a:p>
+        </p:txBody>
+      </p:sp>
+      <p:pic>
+        <p:nvPicPr>
+          <p:cNvPr id="5" name="Рисунок 4" descr="tree.png"/>
+          <p:cNvPicPr>
+            <a:picLocks noChangeAspect="1"/>
+          </p:cNvPicPr>
+          <p:nvPr/>
+        </p:nvPicPr>
+        <p:blipFill>
+          <a:blip r:embed="rId2" cstate="print"/>
+          <a:stretch>
+            <a:fillRect/>
+          </a:stretch>
+        </p:blipFill>
+        <p:spPr>
+          <a:xfrm>
+            <a:off x="3733800" y="1752600"/>
+            <a:ext cx="5250552" cy="3592070"/>
+          </a:xfrm>
+          <a:prstGeom prst="rect">
+            <a:avLst/>
+          </a:prstGeom>
+        </p:spPr>
+      </p:pic>
+      <p:pic>
+        <p:nvPicPr>
+          <p:cNvPr id="6" name="Рисунок 5" descr="terraform-gcp.png"/>
+          <p:cNvPicPr>
+            <a:picLocks noChangeAspect="1"/>
+          </p:cNvPicPr>
+          <p:nvPr/>
+        </p:nvPicPr>
+        <p:blipFill>
+          <a:blip r:embed="rId3" cstate="print"/>
+          <a:stretch>
+            <a:fillRect/>
+          </a:stretch>
+        </p:blipFill>
+        <p:spPr>
+          <a:xfrm>
+            <a:off x="6781800" y="533400"/>
+            <a:ext cx="1840230" cy="908647"/>
+          </a:xfrm>
+          <a:prstGeom prst="rect">
+            <a:avLst/>
+          </a:prstGeom>
+        </p:spPr>
+      </p:pic>
+    </p:spTree>
+  </p:cSld>
+  <p:clrMapOvr>
+    <a:masterClrMapping/>
+  </p:clrMapOvr>
+</p:sld>
+</file>
+
+<file path=ppt/slides/slide6.xml><?xml version="1.0" encoding="utf-8"?>
+<p:sld xmlns:a="http://schemas.openxmlformats.org/drawingml/2006/main" xmlns:r="http://schemas.openxmlformats.org/officeDocument/2006/relationships" xmlns:p="http://schemas.openxmlformats.org/presentationml/2006/main">
+  <p:cSld>
+    <p:spTree>
+      <p:nvGrpSpPr>
+        <p:cNvPr id="1" name=""/>
+        <p:cNvGrpSpPr/>
+        <p:nvPr/>
+      </p:nvGrpSpPr>
+      <p:grpSpPr>
+        <a:xfrm>
+          <a:off x="0" y="0"/>
+          <a:ext cx="0" cy="0"/>
+          <a:chOff x="0" y="0"/>
+          <a:chExt cx="0" cy="0"/>
+        </a:xfrm>
+      </p:grpSpPr>
+      <p:sp>
+        <p:nvSpPr>
+          <p:cNvPr id="2" name="Заголовок 1"/>
+          <p:cNvSpPr>
+            <a:spLocks noGrp="1"/>
+          </p:cNvSpPr>
+          <p:nvPr>
+            <p:ph type="title"/>
+          </p:nvPr>
+        </p:nvSpPr>
+        <p:spPr>
+          <a:xfrm>
+            <a:off x="457200" y="304800"/>
+            <a:ext cx="8229600" cy="743712"/>
+          </a:xfrm>
+        </p:spPr>
+        <p:txBody>
+          <a:bodyPr>
+            <a:normAutofit/>
+          </a:bodyPr>
+          <a:lstStyle/>
+          <a:p>
+            <a:pPr algn="ctr"/>
+            <a:r>
+              <a:rPr lang="en-US" sz="4500" dirty="0" err="1" smtClean="0"/>
+              <a:t>Terraform</a:t>
+            </a:r>
+            <a:endParaRPr lang="en-US" sz="4500" dirty="0"/>
+          </a:p>
+        </p:txBody>
+      </p:sp>
+      <p:sp>
+        <p:nvSpPr>
+          <p:cNvPr id="3" name="Содержимое 2"/>
+          <p:cNvSpPr>
+            <a:spLocks noGrp="1"/>
+          </p:cNvSpPr>
+          <p:nvPr>
+            <p:ph idx="1"/>
+          </p:nvPr>
+        </p:nvSpPr>
+        <p:spPr>
+          <a:xfrm>
+            <a:off x="457200" y="1143000"/>
+            <a:ext cx="8229600" cy="4389120"/>
+          </a:xfrm>
+        </p:spPr>
+        <p:txBody>
+          <a:bodyPr/>
+          <a:lstStyle/>
+          <a:p>
+            <a:pPr algn="just"/>
+            <a:r>
+              <a:rPr lang="en-US" sz="2400" dirty="0" smtClean="0">
+                <a:latin typeface="Times New Roman" pitchFamily="18" charset="0"/>
+                <a:cs typeface="Times New Roman" pitchFamily="18" charset="0"/>
+              </a:rPr>
+              <a:t>main.tf – create</a:t>
+            </a:r>
+            <a:r>
+              <a:rPr lang="uk-UA" sz="2400" dirty="0" smtClean="0">
+                <a:latin typeface="Times New Roman" pitchFamily="18" charset="0"/>
+                <a:cs typeface="Times New Roman" pitchFamily="18" charset="0"/>
+              </a:rPr>
+              <a:t> </a:t>
+            </a:r>
+            <a:r>
+              <a:rPr lang="en-US" sz="2400" dirty="0" smtClean="0">
+                <a:latin typeface="Times New Roman" pitchFamily="18" charset="0"/>
+                <a:cs typeface="Times New Roman" pitchFamily="18" charset="0"/>
+              </a:rPr>
+              <a:t>VPC, </a:t>
+            </a:r>
+            <a:r>
+              <a:rPr lang="en-US" sz="2400" dirty="0" err="1" smtClean="0">
+                <a:latin typeface="Times New Roman" pitchFamily="18" charset="0"/>
+                <a:cs typeface="Times New Roman" pitchFamily="18" charset="0"/>
+              </a:rPr>
+              <a:t>Subnetwork</a:t>
+            </a:r>
+            <a:r>
+              <a:rPr lang="en-US" sz="2400" dirty="0" smtClean="0">
+                <a:latin typeface="Times New Roman" pitchFamily="18" charset="0"/>
+                <a:cs typeface="Times New Roman" pitchFamily="18" charset="0"/>
+              </a:rPr>
+              <a:t>, VPC firewall </a:t>
+            </a:r>
+            <a:r>
+              <a:rPr lang="en-US" sz="2400" dirty="0" smtClean="0">
+                <a:latin typeface="Times New Roman" pitchFamily="18" charset="0"/>
+                <a:cs typeface="Times New Roman" pitchFamily="18" charset="0"/>
+              </a:rPr>
+              <a:t>configuration.</a:t>
+            </a:r>
+          </a:p>
+          <a:p>
+            <a:pPr algn="just"/>
+            <a:r>
+              <a:rPr lang="en-US" sz="2400" dirty="0" smtClean="0">
+                <a:latin typeface="Times New Roman" pitchFamily="18" charset="0"/>
+                <a:cs typeface="Times New Roman" pitchFamily="18" charset="0"/>
+              </a:rPr>
+              <a:t>docker.tf – create instance </a:t>
+            </a:r>
+            <a:r>
+              <a:rPr lang="en-US" sz="2400" dirty="0" err="1" smtClean="0">
+                <a:latin typeface="Times New Roman" pitchFamily="18" charset="0"/>
+                <a:cs typeface="Times New Roman" pitchFamily="18" charset="0"/>
+              </a:rPr>
+              <a:t>docker</a:t>
+            </a:r>
+            <a:r>
+              <a:rPr lang="en-US" sz="2400" dirty="0" smtClean="0">
+                <a:latin typeface="Times New Roman" pitchFamily="18" charset="0"/>
+                <a:cs typeface="Times New Roman" pitchFamily="18" charset="0"/>
+              </a:rPr>
+              <a:t> ( docker.sh – install </a:t>
+            </a:r>
+            <a:r>
+              <a:rPr lang="en-US" sz="2400" dirty="0" err="1" smtClean="0">
+                <a:latin typeface="Times New Roman" pitchFamily="18" charset="0"/>
+                <a:cs typeface="Times New Roman" pitchFamily="18" charset="0"/>
+              </a:rPr>
+              <a:t>docker</a:t>
+            </a:r>
+            <a:r>
+              <a:rPr lang="en-US" sz="2400" dirty="0" smtClean="0">
+                <a:latin typeface="Times New Roman" pitchFamily="18" charset="0"/>
+                <a:cs typeface="Times New Roman" pitchFamily="18" charset="0"/>
+              </a:rPr>
+              <a:t>, </a:t>
+            </a:r>
+            <a:r>
+              <a:rPr lang="en-US" sz="2400" dirty="0" err="1" smtClean="0">
+                <a:latin typeface="Times New Roman" pitchFamily="18" charset="0"/>
+                <a:cs typeface="Times New Roman" pitchFamily="18" charset="0"/>
+              </a:rPr>
+              <a:t>docker</a:t>
+            </a:r>
+            <a:r>
+              <a:rPr lang="en-US" sz="2400" dirty="0" smtClean="0">
+                <a:latin typeface="Times New Roman" pitchFamily="18" charset="0"/>
+                <a:cs typeface="Times New Roman" pitchFamily="18" charset="0"/>
+              </a:rPr>
+              <a:t>-compose).</a:t>
+            </a:r>
+          </a:p>
+          <a:p>
+            <a:pPr algn="just"/>
+            <a:r>
+              <a:rPr lang="en-US" sz="2400" dirty="0" smtClean="0">
+                <a:latin typeface="Times New Roman" pitchFamily="18" charset="0"/>
+                <a:cs typeface="Times New Roman" pitchFamily="18" charset="0"/>
+              </a:rPr>
+              <a:t>jenkins.tf </a:t>
+            </a:r>
+            <a:r>
+              <a:rPr lang="en-US" sz="2400" dirty="0" smtClean="0">
+                <a:latin typeface="Times New Roman" pitchFamily="18" charset="0"/>
+                <a:cs typeface="Times New Roman" pitchFamily="18" charset="0"/>
+              </a:rPr>
+              <a:t>– create instance </a:t>
+            </a:r>
+            <a:r>
+              <a:rPr lang="en-US" sz="2400" dirty="0" err="1" smtClean="0">
+                <a:latin typeface="Times New Roman" pitchFamily="18" charset="0"/>
+                <a:cs typeface="Times New Roman" pitchFamily="18" charset="0"/>
+              </a:rPr>
+              <a:t>jenkins</a:t>
+            </a:r>
+            <a:r>
+              <a:rPr lang="en-US" sz="2400" dirty="0" smtClean="0">
+                <a:latin typeface="Times New Roman" pitchFamily="18" charset="0"/>
+                <a:cs typeface="Times New Roman" pitchFamily="18" charset="0"/>
+              </a:rPr>
+              <a:t> </a:t>
+            </a:r>
+            <a:r>
+              <a:rPr lang="en-US" sz="2400" dirty="0" smtClean="0">
+                <a:latin typeface="Times New Roman" pitchFamily="18" charset="0"/>
+                <a:cs typeface="Times New Roman" pitchFamily="18" charset="0"/>
+              </a:rPr>
+              <a:t>( </a:t>
+            </a:r>
+            <a:r>
+              <a:rPr lang="en-US" sz="2400" dirty="0" smtClean="0">
+                <a:latin typeface="Times New Roman" pitchFamily="18" charset="0"/>
+                <a:cs typeface="Times New Roman" pitchFamily="18" charset="0"/>
+              </a:rPr>
+              <a:t>jenkins.sh –install  Java, </a:t>
+            </a:r>
+            <a:r>
+              <a:rPr lang="en-US" sz="2400" dirty="0" err="1" smtClean="0">
+                <a:latin typeface="Times New Roman" pitchFamily="18" charset="0"/>
+                <a:cs typeface="Times New Roman" pitchFamily="18" charset="0"/>
+              </a:rPr>
+              <a:t>jenkins</a:t>
+            </a:r>
+            <a:r>
+              <a:rPr lang="en-US" sz="2400" dirty="0" smtClean="0">
+                <a:latin typeface="Times New Roman" pitchFamily="18" charset="0"/>
+                <a:cs typeface="Times New Roman" pitchFamily="18" charset="0"/>
+              </a:rPr>
+              <a:t>, </a:t>
+            </a:r>
+            <a:r>
+              <a:rPr lang="en-US" sz="2400" dirty="0" err="1" smtClean="0">
+                <a:latin typeface="Times New Roman" pitchFamily="18" charset="0"/>
+                <a:cs typeface="Times New Roman" pitchFamily="18" charset="0"/>
+              </a:rPr>
+              <a:t>docker</a:t>
+            </a:r>
+            <a:r>
+              <a:rPr lang="en-US" sz="2400" dirty="0" smtClean="0">
+                <a:latin typeface="Times New Roman" pitchFamily="18" charset="0"/>
+                <a:cs typeface="Times New Roman" pitchFamily="18" charset="0"/>
+              </a:rPr>
+              <a:t>, </a:t>
+            </a:r>
+            <a:r>
+              <a:rPr lang="en-US" sz="2400" dirty="0" err="1" smtClean="0">
+                <a:latin typeface="Times New Roman" pitchFamily="18" charset="0"/>
+                <a:cs typeface="Times New Roman" pitchFamily="18" charset="0"/>
+              </a:rPr>
+              <a:t>docker</a:t>
+            </a:r>
+            <a:r>
+              <a:rPr lang="en-US" sz="2400" dirty="0" smtClean="0">
+                <a:latin typeface="Times New Roman" pitchFamily="18" charset="0"/>
+                <a:cs typeface="Times New Roman" pitchFamily="18" charset="0"/>
+              </a:rPr>
+              <a:t>-compose</a:t>
+            </a:r>
+            <a:r>
+              <a:rPr lang="en-US" sz="2400" dirty="0" smtClean="0">
+                <a:latin typeface="Times New Roman" pitchFamily="18" charset="0"/>
+                <a:cs typeface="Times New Roman" pitchFamily="18" charset="0"/>
+              </a:rPr>
+              <a:t>).</a:t>
+            </a:r>
+          </a:p>
+          <a:p>
+            <a:pPr algn="just"/>
+            <a:r>
+              <a:rPr lang="en-US" sz="2400" dirty="0" smtClean="0">
+                <a:latin typeface="Times New Roman" pitchFamily="18" charset="0"/>
+                <a:cs typeface="Times New Roman" pitchFamily="18" charset="0"/>
+              </a:rPr>
+              <a:t>Jenkins-node1.tf </a:t>
+            </a:r>
+            <a:r>
+              <a:rPr lang="en-US" sz="2400" dirty="0" smtClean="0">
+                <a:latin typeface="Times New Roman" pitchFamily="18" charset="0"/>
+                <a:cs typeface="Times New Roman" pitchFamily="18" charset="0"/>
+              </a:rPr>
+              <a:t>– create instance </a:t>
+            </a:r>
+            <a:r>
+              <a:rPr lang="en-US" sz="2400" dirty="0" smtClean="0">
+                <a:latin typeface="Times New Roman" pitchFamily="18" charset="0"/>
+                <a:cs typeface="Times New Roman" pitchFamily="18" charset="0"/>
+              </a:rPr>
+              <a:t>jenkins-node1 </a:t>
+            </a:r>
+            <a:r>
+              <a:rPr lang="en-US" sz="2400" dirty="0" smtClean="0">
+                <a:latin typeface="Times New Roman" pitchFamily="18" charset="0"/>
+                <a:cs typeface="Times New Roman" pitchFamily="18" charset="0"/>
+              </a:rPr>
+              <a:t>( </a:t>
+            </a:r>
+            <a:r>
+              <a:rPr lang="en-US" sz="2400" dirty="0" smtClean="0">
+                <a:latin typeface="Times New Roman" pitchFamily="18" charset="0"/>
+                <a:cs typeface="Times New Roman" pitchFamily="18" charset="0"/>
+              </a:rPr>
+              <a:t>jenkins-node1.sh – install  Java).</a:t>
+            </a:r>
+          </a:p>
+          <a:p>
+            <a:pPr algn="just"/>
+            <a:r>
+              <a:rPr lang="en-US" sz="2400" dirty="0" smtClean="0">
+                <a:latin typeface="Times New Roman" pitchFamily="18" charset="0"/>
+                <a:cs typeface="Times New Roman" pitchFamily="18" charset="0"/>
+              </a:rPr>
+              <a:t>All instances have static IP.</a:t>
+            </a:r>
+            <a:endParaRPr lang="en-US" sz="2400" dirty="0" smtClean="0">
+              <a:latin typeface="Times New Roman" pitchFamily="18" charset="0"/>
+              <a:cs typeface="Times New Roman" pitchFamily="18" charset="0"/>
+            </a:endParaRPr>
+          </a:p>
+          <a:p>
+            <a:endParaRPr lang="en-US" dirty="0" smtClean="0"/>
+          </a:p>
+          <a:p>
+            <a:endParaRPr lang="en-US" dirty="0"/>
+          </a:p>
+        </p:txBody>
+      </p:sp>
+      <p:pic>
+        <p:nvPicPr>
+          <p:cNvPr id="7" name="Рисунок 6" descr="gcp1.png"/>
+          <p:cNvPicPr>
+            <a:picLocks noChangeAspect="1"/>
+          </p:cNvPicPr>
+          <p:nvPr/>
+        </p:nvPicPr>
+        <p:blipFill>
+          <a:blip r:embed="rId2" cstate="print"/>
+          <a:stretch>
+            <a:fillRect/>
+          </a:stretch>
+        </p:blipFill>
+        <p:spPr>
+          <a:xfrm>
+            <a:off x="609600" y="4572000"/>
+            <a:ext cx="8333992" cy="1600200"/>
+          </a:xfrm>
+          <a:prstGeom prst="rect">
+            <a:avLst/>
+          </a:prstGeom>
+        </p:spPr>
+      </p:pic>
+      <p:pic>
+        <p:nvPicPr>
+          <p:cNvPr id="8" name="Рисунок 7" descr="terraform-gcp.png"/>
+          <p:cNvPicPr>
+            <a:picLocks noChangeAspect="1"/>
+          </p:cNvPicPr>
+          <p:nvPr/>
+        </p:nvPicPr>
+        <p:blipFill>
+          <a:blip r:embed="rId3" cstate="print"/>
+          <a:stretch>
+            <a:fillRect/>
+          </a:stretch>
+        </p:blipFill>
+        <p:spPr>
+          <a:xfrm>
+            <a:off x="6781800" y="228600"/>
+            <a:ext cx="1840230" cy="908647"/>
+          </a:xfrm>
+          <a:prstGeom prst="rect">
+            <a:avLst/>
+          </a:prstGeom>
+        </p:spPr>
+      </p:pic>
+    </p:spTree>
+  </p:cSld>
+  <p:clrMapOvr>
+    <a:masterClrMapping/>
+  </p:clrMapOvr>
+</p:sld>
+</file>
+
+<file path=ppt/slides/slide7.xml><?xml version="1.0" encoding="utf-8"?>
+<p:sld xmlns:a="http://schemas.openxmlformats.org/drawingml/2006/main" xmlns:r="http://schemas.openxmlformats.org/officeDocument/2006/relationships" xmlns:p="http://schemas.openxmlformats.org/presentationml/2006/main">
+  <p:cSld>
+    <p:spTree>
+      <p:nvGrpSpPr>
+        <p:cNvPr id="1" name=""/>
+        <p:cNvGrpSpPr/>
+        <p:nvPr/>
+      </p:nvGrpSpPr>
+      <p:grpSpPr>
+        <a:xfrm>
+          <a:off x="0" y="0"/>
+          <a:ext cx="0" cy="0"/>
+          <a:chOff x="0" y="0"/>
+          <a:chExt cx="0" cy="0"/>
+        </a:xfrm>
+      </p:grpSpPr>
+      <p:sp>
+        <p:nvSpPr>
+          <p:cNvPr id="2" name="Заголовок 1"/>
+          <p:cNvSpPr>
+            <a:spLocks noGrp="1"/>
+          </p:cNvSpPr>
+          <p:nvPr>
+            <p:ph type="title"/>
+          </p:nvPr>
+        </p:nvSpPr>
+        <p:spPr>
+          <a:xfrm>
+            <a:off x="457200" y="704088"/>
+            <a:ext cx="8229600" cy="743712"/>
+          </a:xfrm>
+        </p:spPr>
+        <p:txBody>
+          <a:bodyPr>
+            <a:normAutofit fontScale="90000"/>
+          </a:bodyPr>
+          <a:lstStyle/>
+          <a:p>
+            <a:pPr algn="ctr"/>
+            <a:r>
+              <a:rPr lang="en-US" dirty="0" err="1" smtClean="0"/>
+              <a:t>GitHub</a:t>
+            </a:r>
+            <a:endParaRPr lang="en-US" dirty="0"/>
+          </a:p>
+        </p:txBody>
+      </p:sp>
+      <p:sp>
+        <p:nvSpPr>
+          <p:cNvPr id="3" name="Содержимое 2"/>
+          <p:cNvSpPr>
+            <a:spLocks noGrp="1"/>
+          </p:cNvSpPr>
+          <p:nvPr>
+            <p:ph idx="1"/>
+          </p:nvPr>
+        </p:nvSpPr>
+        <p:spPr>
+          <a:xfrm>
+            <a:off x="457200" y="2286000"/>
+            <a:ext cx="8229600" cy="4389120"/>
+          </a:xfrm>
+        </p:spPr>
+        <p:txBody>
+          <a:bodyPr>
+            <a:normAutofit/>
+          </a:bodyPr>
+          <a:lstStyle/>
+          <a:p>
+            <a:pPr algn="just"/>
+            <a:r>
+              <a:rPr lang="en-US" sz="2400" dirty="0" err="1" smtClean="0">
+                <a:latin typeface="Times New Roman" pitchFamily="18" charset="0"/>
+                <a:cs typeface="Times New Roman" pitchFamily="18" charset="0"/>
+              </a:rPr>
+              <a:t>GitHub</a:t>
+            </a:r>
+            <a:r>
+              <a:rPr lang="en-US" sz="2400" dirty="0" smtClean="0">
+                <a:latin typeface="Times New Roman" pitchFamily="18" charset="0"/>
+                <a:cs typeface="Times New Roman" pitchFamily="18" charset="0"/>
+              </a:rPr>
+              <a:t>, Inc. is a provider of Internet hosting for software development and version control using </a:t>
+            </a:r>
+            <a:r>
+              <a:rPr lang="en-US" sz="2400" dirty="0" err="1" smtClean="0">
+                <a:latin typeface="Times New Roman" pitchFamily="18" charset="0"/>
+                <a:cs typeface="Times New Roman" pitchFamily="18" charset="0"/>
+              </a:rPr>
+              <a:t>Git</a:t>
+            </a:r>
+            <a:r>
+              <a:rPr lang="en-US" sz="2400" dirty="0" smtClean="0">
+                <a:latin typeface="Times New Roman" pitchFamily="18" charset="0"/>
+                <a:cs typeface="Times New Roman" pitchFamily="18" charset="0"/>
+              </a:rPr>
+              <a:t>. It offers the distributed version control and source code management (SCM) functionality of </a:t>
+            </a:r>
+            <a:r>
+              <a:rPr lang="en-US" sz="2400" dirty="0" err="1" smtClean="0">
+                <a:latin typeface="Times New Roman" pitchFamily="18" charset="0"/>
+                <a:cs typeface="Times New Roman" pitchFamily="18" charset="0"/>
+              </a:rPr>
+              <a:t>Git</a:t>
+            </a:r>
+            <a:r>
+              <a:rPr lang="en-US" sz="2400" dirty="0" smtClean="0">
+                <a:latin typeface="Times New Roman" pitchFamily="18" charset="0"/>
+                <a:cs typeface="Times New Roman" pitchFamily="18" charset="0"/>
+              </a:rPr>
+              <a:t>, plus its own features. It provides access control and several collaboration features such as bug tracking, feature requests, task management, continuous integration and wikis for every project. Headquartered in California, it has been a subsidiary of Microsoft since 2018.</a:t>
+            </a:r>
+            <a:endParaRPr lang="en-US" sz="2400" dirty="0">
+              <a:latin typeface="Times New Roman" pitchFamily="18" charset="0"/>
+              <a:cs typeface="Times New Roman" pitchFamily="18" charset="0"/>
+            </a:endParaRPr>
+          </a:p>
+        </p:txBody>
+      </p:sp>
+      <p:pic>
+        <p:nvPicPr>
+          <p:cNvPr id="4" name="Рисунок 3" descr="github.jpeg"/>
+          <p:cNvPicPr>
+            <a:picLocks noChangeAspect="1"/>
+          </p:cNvPicPr>
+          <p:nvPr/>
+        </p:nvPicPr>
+        <p:blipFill>
+          <a:blip r:embed="rId2" cstate="print"/>
+          <a:stretch>
+            <a:fillRect/>
+          </a:stretch>
+        </p:blipFill>
+        <p:spPr>
+          <a:xfrm>
+            <a:off x="6324600" y="152400"/>
+            <a:ext cx="1703413" cy="1981200"/>
+          </a:xfrm>
+          <a:prstGeom prst="rect">
+            <a:avLst/>
+          </a:prstGeom>
+        </p:spPr>
+      </p:pic>
+    </p:spTree>
+  </p:cSld>
+  <p:clrMapOvr>
+    <a:masterClrMapping/>
+  </p:clrMapOvr>
+</p:sld>
+</file>
+
+<file path=ppt/slides/slide8.xml><?xml version="1.0" encoding="utf-8"?>
+<p:sld xmlns:a="http://schemas.openxmlformats.org/drawingml/2006/main" xmlns:r="http://schemas.openxmlformats.org/officeDocument/2006/relationships" xmlns:p="http://schemas.openxmlformats.org/presentationml/2006/main">
+  <p:cSld>
+    <p:spTree>
+      <p:nvGrpSpPr>
+        <p:cNvPr id="1" name=""/>
+        <p:cNvGrpSpPr/>
+        <p:nvPr/>
+      </p:nvGrpSpPr>
+      <p:grpSpPr>
+        <a:xfrm>
+          <a:off x="0" y="0"/>
+          <a:ext cx="0" cy="0"/>
+          <a:chOff x="0" y="0"/>
+          <a:chExt cx="0" cy="0"/>
+        </a:xfrm>
+      </p:grpSpPr>
+      <p:sp>
+        <p:nvSpPr>
+          <p:cNvPr id="2" name="Заголовок 1"/>
+          <p:cNvSpPr>
+            <a:spLocks noGrp="1"/>
+          </p:cNvSpPr>
+          <p:nvPr>
+            <p:ph type="title"/>
+          </p:nvPr>
+        </p:nvSpPr>
+        <p:spPr>
+          <a:xfrm>
+            <a:off x="457200" y="381000"/>
+            <a:ext cx="8229600" cy="762000"/>
+          </a:xfrm>
+        </p:spPr>
+        <p:txBody>
+          <a:bodyPr>
+            <a:normAutofit fontScale="90000"/>
+          </a:bodyPr>
+          <a:lstStyle/>
+          <a:p>
+            <a:pPr algn="ctr"/>
+            <a:r>
+              <a:rPr lang="en-US" dirty="0" err="1" smtClean="0"/>
+              <a:t>GitHub</a:t>
+            </a:r>
+            <a:endParaRPr lang="en-US" dirty="0"/>
+          </a:p>
+        </p:txBody>
+      </p:sp>
+      <p:sp>
+        <p:nvSpPr>
+          <p:cNvPr id="3" name="Содержимое 2"/>
+          <p:cNvSpPr>
+            <a:spLocks noGrp="1"/>
+          </p:cNvSpPr>
+          <p:nvPr>
+            <p:ph idx="1"/>
+          </p:nvPr>
+        </p:nvSpPr>
+        <p:spPr>
+          <a:xfrm>
+            <a:off x="457200" y="1143000"/>
+            <a:ext cx="8229600" cy="5181600"/>
+          </a:xfrm>
+        </p:spPr>
+        <p:txBody>
+          <a:bodyPr/>
+          <a:lstStyle/>
+          <a:p>
+            <a:r>
+              <a:rPr lang="en-US" sz="2400" dirty="0" smtClean="0">
+                <a:latin typeface="Times New Roman" pitchFamily="18" charset="0"/>
+                <a:cs typeface="Times New Roman" pitchFamily="18" charset="0"/>
+              </a:rPr>
+              <a:t>We </a:t>
+            </a:r>
+            <a:r>
+              <a:rPr lang="en-US" sz="2400" dirty="0" smtClean="0">
+                <a:latin typeface="Times New Roman" pitchFamily="18" charset="0"/>
+                <a:cs typeface="Times New Roman" pitchFamily="18" charset="0"/>
+              </a:rPr>
+              <a:t>create the following repositories:</a:t>
+            </a:r>
+            <a:endParaRPr lang="en-US" sz="2400" dirty="0" smtClean="0">
+              <a:latin typeface="Times New Roman" pitchFamily="18" charset="0"/>
+              <a:cs typeface="Times New Roman" pitchFamily="18" charset="0"/>
+            </a:endParaRPr>
+          </a:p>
+          <a:p>
+            <a:endParaRPr lang="en-US" dirty="0"/>
+          </a:p>
+        </p:txBody>
+      </p:sp>
+      <p:pic>
+        <p:nvPicPr>
+          <p:cNvPr id="6" name="Рисунок 5" descr="myProject.png"/>
+          <p:cNvPicPr>
+            <a:picLocks noChangeAspect="1"/>
+          </p:cNvPicPr>
+          <p:nvPr/>
+        </p:nvPicPr>
+        <p:blipFill>
+          <a:blip r:embed="rId2" cstate="print"/>
+          <a:stretch>
+            <a:fillRect/>
+          </a:stretch>
+        </p:blipFill>
+        <p:spPr>
+          <a:xfrm>
+            <a:off x="609600" y="1629873"/>
+            <a:ext cx="5486400" cy="2491100"/>
+          </a:xfrm>
+          <a:prstGeom prst="rect">
+            <a:avLst/>
+          </a:prstGeom>
+        </p:spPr>
+      </p:pic>
+      <p:pic>
+        <p:nvPicPr>
+          <p:cNvPr id="7" name="Рисунок 6" descr="mywebsite.png"/>
+          <p:cNvPicPr>
+            <a:picLocks noChangeAspect="1"/>
+          </p:cNvPicPr>
+          <p:nvPr/>
+        </p:nvPicPr>
+        <p:blipFill>
+          <a:blip r:embed="rId3" cstate="print"/>
+          <a:stretch>
+            <a:fillRect/>
+          </a:stretch>
+        </p:blipFill>
+        <p:spPr>
+          <a:xfrm>
+            <a:off x="685800" y="4114800"/>
+            <a:ext cx="5328537" cy="2209800"/>
+          </a:xfrm>
+          <a:prstGeom prst="rect">
+            <a:avLst/>
+          </a:prstGeom>
+        </p:spPr>
+      </p:pic>
+      <p:pic>
+        <p:nvPicPr>
+          <p:cNvPr id="8" name="Рисунок 7" descr="github.jpeg"/>
+          <p:cNvPicPr>
+            <a:picLocks noChangeAspect="1"/>
+          </p:cNvPicPr>
+          <p:nvPr/>
+        </p:nvPicPr>
+        <p:blipFill>
+          <a:blip r:embed="rId4" cstate="print"/>
+          <a:stretch>
+            <a:fillRect/>
+          </a:stretch>
+        </p:blipFill>
+        <p:spPr>
+          <a:xfrm>
+            <a:off x="6324600" y="152400"/>
+            <a:ext cx="1703413" cy="1981200"/>
+          </a:xfrm>
+          <a:prstGeom prst="rect">
+            <a:avLst/>
+          </a:prstGeom>
+        </p:spPr>
+      </p:pic>
+    </p:spTree>
+  </p:cSld>
+  <p:clrMapOvr>
+    <a:masterClrMapping/>
+  </p:clrMapOvr>
+</p:sld>
+</file>
+
+<file path=ppt/slides/slide9.xml><?xml version="1.0" encoding="utf-8"?>
+<p:sld xmlns:a="http://schemas.openxmlformats.org/drawingml/2006/main" xmlns:r="http://schemas.openxmlformats.org/officeDocument/2006/relationships" xmlns:p="http://schemas.openxmlformats.org/presentationml/2006/main">
+  <p:cSld>
+    <p:spTree>
+      <p:nvGrpSpPr>
+        <p:cNvPr id="1" name=""/>
+        <p:cNvGrpSpPr/>
+        <p:nvPr/>
+      </p:nvGrpSpPr>
+      <p:grpSpPr>
+        <a:xfrm>
+          <a:off x="0" y="0"/>
+          <a:ext cx="0" cy="0"/>
+          <a:chOff x="0" y="0"/>
+          <a:chExt cx="0" cy="0"/>
+        </a:xfrm>
+      </p:grpSpPr>
+      <p:sp>
+        <p:nvSpPr>
+          <p:cNvPr id="2" name="Заголовок 1"/>
+          <p:cNvSpPr>
+            <a:spLocks noGrp="1"/>
+          </p:cNvSpPr>
+          <p:nvPr>
+            <p:ph type="title"/>
+          </p:nvPr>
+        </p:nvSpPr>
+        <p:spPr>
+          <a:xfrm>
+            <a:off x="457200" y="381000"/>
+            <a:ext cx="8229600" cy="762000"/>
+          </a:xfrm>
+        </p:spPr>
+        <p:txBody>
+          <a:bodyPr>
+            <a:normAutofit fontScale="90000"/>
+          </a:bodyPr>
+          <a:lstStyle/>
+          <a:p>
+            <a:pPr algn="ctr"/>
+            <a:r>
+              <a:rPr lang="en-US" dirty="0" err="1" smtClean="0"/>
+              <a:t>GitHub</a:t>
+            </a:r>
+            <a:endParaRPr lang="en-US" dirty="0"/>
+          </a:p>
+        </p:txBody>
+      </p:sp>
+      <p:sp>
+        <p:nvSpPr>
+          <p:cNvPr id="3" name="Содержимое 2"/>
+          <p:cNvSpPr>
+            <a:spLocks noGrp="1"/>
+          </p:cNvSpPr>
+          <p:nvPr>
+            <p:ph idx="1"/>
+          </p:nvPr>
+        </p:nvSpPr>
+        <p:spPr>
+          <a:xfrm>
+            <a:off x="457200" y="1143000"/>
+            <a:ext cx="8229600" cy="5181600"/>
+          </a:xfrm>
+        </p:spPr>
+        <p:txBody>
+          <a:bodyPr/>
+          <a:lstStyle/>
+          <a:p>
+            <a:pPr>
+              <a:buNone/>
+            </a:pPr>
+            <a:r>
+              <a:rPr lang="en-US" sz="2400" dirty="0" smtClean="0">
+                <a:latin typeface="Times New Roman" pitchFamily="18" charset="0"/>
+                <a:cs typeface="Times New Roman" pitchFamily="18" charset="0"/>
+              </a:rPr>
+              <a:t>We add the </a:t>
+            </a:r>
+            <a:r>
+              <a:rPr lang="en-US" sz="2400" dirty="0" err="1" smtClean="0">
+                <a:latin typeface="Times New Roman" pitchFamily="18" charset="0"/>
+                <a:cs typeface="Times New Roman" pitchFamily="18" charset="0"/>
+              </a:rPr>
+              <a:t>ssh</a:t>
+            </a:r>
+            <a:r>
+              <a:rPr lang="en-US" sz="2400" dirty="0" smtClean="0">
+                <a:latin typeface="Times New Roman" pitchFamily="18" charset="0"/>
+                <a:cs typeface="Times New Roman" pitchFamily="18" charset="0"/>
+              </a:rPr>
+              <a:t> keys to the repository</a:t>
+            </a:r>
+            <a:r>
+              <a:rPr lang="en-US" sz="2400" dirty="0" smtClean="0">
+                <a:latin typeface="Times New Roman" pitchFamily="18" charset="0"/>
+                <a:cs typeface="Times New Roman" pitchFamily="18" charset="0"/>
+              </a:rPr>
+              <a:t>:</a:t>
+            </a:r>
+          </a:p>
+          <a:p>
+            <a:pPr>
+              <a:buNone/>
+            </a:pPr>
+            <a:endParaRPr lang="en-US" sz="2400" dirty="0" smtClean="0">
+              <a:latin typeface="Times New Roman" pitchFamily="18" charset="0"/>
+              <a:cs typeface="Times New Roman" pitchFamily="18" charset="0"/>
+            </a:endParaRPr>
+          </a:p>
+          <a:p>
+            <a:pPr>
+              <a:buNone/>
+            </a:pPr>
+            <a:endParaRPr lang="en-US" dirty="0"/>
+          </a:p>
+        </p:txBody>
+      </p:sp>
+      <p:pic>
+        <p:nvPicPr>
+          <p:cNvPr id="8" name="Рисунок 7" descr="ssh-keys.png"/>
+          <p:cNvPicPr>
+            <a:picLocks noChangeAspect="1"/>
+          </p:cNvPicPr>
+          <p:nvPr/>
+        </p:nvPicPr>
+        <p:blipFill>
+          <a:blip r:embed="rId2" cstate="print"/>
+          <a:stretch>
+            <a:fillRect/>
+          </a:stretch>
+        </p:blipFill>
+        <p:spPr>
+          <a:xfrm>
+            <a:off x="685800" y="1676400"/>
+            <a:ext cx="4724400" cy="1990032"/>
+          </a:xfrm>
+          <a:prstGeom prst="rect">
+            <a:avLst/>
+          </a:prstGeom>
+        </p:spPr>
+      </p:pic>
+      <p:sp>
+        <p:nvSpPr>
+          <p:cNvPr id="9" name="Прямоугольник 8"/>
+          <p:cNvSpPr/>
+          <p:nvPr/>
+        </p:nvSpPr>
+        <p:spPr>
+          <a:xfrm>
+            <a:off x="609600" y="3733800"/>
+            <a:ext cx="5007005" cy="461665"/>
+          </a:xfrm>
+          <a:prstGeom prst="rect">
+            <a:avLst/>
+          </a:prstGeom>
+        </p:spPr>
+        <p:txBody>
+          <a:bodyPr wrap="square">
+            <a:spAutoFit/>
+          </a:bodyPr>
+          <a:lstStyle/>
+          <a:p>
+            <a:r>
+              <a:rPr lang="en-US" sz="2400" dirty="0" smtClean="0">
+                <a:latin typeface="Times New Roman" pitchFamily="18" charset="0"/>
+                <a:cs typeface="Times New Roman" pitchFamily="18" charset="0"/>
+              </a:rPr>
+              <a:t>We add </a:t>
+            </a:r>
+            <a:r>
+              <a:rPr lang="en-US" sz="2400" dirty="0" err="1" smtClean="0">
+                <a:latin typeface="Times New Roman" pitchFamily="18" charset="0"/>
+                <a:cs typeface="Times New Roman" pitchFamily="18" charset="0"/>
+              </a:rPr>
+              <a:t>webhook</a:t>
+            </a:r>
+            <a:r>
+              <a:rPr lang="en-US" sz="2400" dirty="0" smtClean="0">
+                <a:latin typeface="Times New Roman" pitchFamily="18" charset="0"/>
+                <a:cs typeface="Times New Roman" pitchFamily="18" charset="0"/>
+              </a:rPr>
+              <a:t> </a:t>
+            </a:r>
+            <a:r>
+              <a:rPr lang="en-US" sz="2400" dirty="0" smtClean="0">
+                <a:latin typeface="Times New Roman" pitchFamily="18" charset="0"/>
+                <a:cs typeface="Times New Roman" pitchFamily="18" charset="0"/>
+              </a:rPr>
+              <a:t>to the repository</a:t>
+            </a:r>
+            <a:endParaRPr lang="en-US" sz="2400" dirty="0">
+              <a:latin typeface="Times New Roman" pitchFamily="18" charset="0"/>
+              <a:cs typeface="Times New Roman" pitchFamily="18" charset="0"/>
+            </a:endParaRPr>
+          </a:p>
+        </p:txBody>
+      </p:sp>
+      <p:pic>
+        <p:nvPicPr>
+          <p:cNvPr id="10" name="Рисунок 9" descr="webhook.png"/>
+          <p:cNvPicPr>
+            <a:picLocks noChangeAspect="1"/>
+          </p:cNvPicPr>
+          <p:nvPr/>
+        </p:nvPicPr>
+        <p:blipFill>
+          <a:blip r:embed="rId3" cstate="print"/>
+          <a:stretch>
+            <a:fillRect/>
+          </a:stretch>
+        </p:blipFill>
+        <p:spPr>
+          <a:xfrm>
+            <a:off x="685800" y="4267200"/>
+            <a:ext cx="5580518" cy="1752600"/>
+          </a:xfrm>
+          <a:prstGeom prst="rect">
+            <a:avLst/>
+          </a:prstGeom>
+        </p:spPr>
+      </p:pic>
+      <p:pic>
+        <p:nvPicPr>
+          <p:cNvPr id="11" name="Рисунок 10" descr="github.jpeg"/>
+          <p:cNvPicPr>
+            <a:picLocks noChangeAspect="1"/>
+          </p:cNvPicPr>
+          <p:nvPr/>
+        </p:nvPicPr>
+        <p:blipFill>
+          <a:blip r:embed="rId4" cstate="print"/>
+          <a:stretch>
+            <a:fillRect/>
+          </a:stretch>
+        </p:blipFill>
+        <p:spPr>
+          <a:xfrm>
+            <a:off x="6324600" y="152400"/>
+            <a:ext cx="1703413" cy="1981200"/>
           </a:xfrm>
           <a:prstGeom prst="rect">
             <a:avLst/>

</xml_diff>

<commit_message>
change 1 file Final Task.pptx
</commit_message>
<xml_diff>
--- a/Andrii Kozak Final Task.pptx
+++ b/Andrii Kozak Final Task.pptx
@@ -24,6 +24,7 @@
     <p:sldId id="272" r:id="rId18"/>
     <p:sldId id="273" r:id="rId19"/>
     <p:sldId id="274" r:id="rId20"/>
+    <p:sldId id="275" r:id="rId21"/>
   </p:sldIdLst>
   <p:sldSz cx="9144000" cy="6858000" type="screen4x3"/>
   <p:notesSz cx="6858000" cy="9144000"/>
@@ -3974,55 +3975,155 @@
           <a:p>
             <a:pPr algn="ctr"/>
             <a:r>
-              <a:rPr lang="en-US" sz="2800" b="1" spc="100" dirty="0" smtClean="0">
+              <a:rPr lang="en-US" sz="3200" b="1" spc="100" dirty="0" smtClean="0">
                 <a:solidFill>
-                  <a:schemeClr val="bg1"/>
+                  <a:srgbClr val="FFC000"/>
                 </a:solidFill>
+                <a:effectLst>
+                  <a:outerShdw blurRad="38100" dist="38100" dir="2700000" algn="tl">
+                    <a:srgbClr val="000000">
+                      <a:alpha val="43137"/>
+                    </a:srgbClr>
+                  </a:outerShdw>
+                </a:effectLst>
                 <a:latin typeface="Times New Roman" pitchFamily="18" charset="0"/>
                 <a:cs typeface="Times New Roman" pitchFamily="18" charset="0"/>
               </a:rPr>
               <a:t>Creating basic </a:t>
             </a:r>
             <a:r>
-              <a:rPr lang="en-US" sz="2800" b="1" spc="100" dirty="0" err="1" smtClean="0">
+              <a:rPr lang="en-US" sz="3200" b="1" spc="100" dirty="0" err="1" smtClean="0">
                 <a:solidFill>
-                  <a:schemeClr val="bg1"/>
+                  <a:srgbClr val="FFC000"/>
                 </a:solidFill>
+                <a:effectLst>
+                  <a:outerShdw blurRad="38100" dist="38100" dir="2700000" algn="tl">
+                    <a:srgbClr val="000000">
+                      <a:alpha val="43137"/>
+                    </a:srgbClr>
+                  </a:outerShdw>
+                </a:effectLst>
                 <a:latin typeface="Times New Roman" pitchFamily="18" charset="0"/>
                 <a:cs typeface="Times New Roman" pitchFamily="18" charset="0"/>
               </a:rPr>
               <a:t>DevOps</a:t>
             </a:r>
             <a:r>
-              <a:rPr lang="en-US" sz="2800" b="1" spc="100" dirty="0" smtClean="0">
+              <a:rPr lang="en-US" sz="3200" b="1" spc="100" dirty="0" smtClean="0">
                 <a:solidFill>
-                  <a:schemeClr val="bg1"/>
+                  <a:srgbClr val="FFC000"/>
                 </a:solidFill>
+                <a:effectLst>
+                  <a:outerShdw blurRad="38100" dist="38100" dir="2700000" algn="tl">
+                    <a:srgbClr val="000000">
+                      <a:alpha val="43137"/>
+                    </a:srgbClr>
+                  </a:outerShdw>
+                </a:effectLst>
                 <a:latin typeface="Times New Roman" pitchFamily="18" charset="0"/>
                 <a:cs typeface="Times New Roman" pitchFamily="18" charset="0"/>
               </a:rPr>
               <a:t> chain connecting local machine, </a:t>
             </a:r>
             <a:r>
-              <a:rPr lang="en-US" sz="2800" b="1" spc="100" dirty="0" err="1" smtClean="0">
+              <a:rPr lang="en-US" sz="3200" b="1" spc="100" dirty="0" err="1" smtClean="0">
                 <a:solidFill>
-                  <a:schemeClr val="bg1"/>
+                  <a:srgbClr val="FFC000"/>
                 </a:solidFill>
+                <a:effectLst>
+                  <a:outerShdw blurRad="38100" dist="38100" dir="2700000" algn="tl">
+                    <a:srgbClr val="000000">
+                      <a:alpha val="43137"/>
+                    </a:srgbClr>
+                  </a:outerShdw>
+                </a:effectLst>
                 <a:latin typeface="Times New Roman" pitchFamily="18" charset="0"/>
                 <a:cs typeface="Times New Roman" pitchFamily="18" charset="0"/>
               </a:rPr>
               <a:t>GitHub</a:t>
             </a:r>
             <a:r>
-              <a:rPr lang="en-US" sz="2800" b="1" spc="100" dirty="0" smtClean="0">
+              <a:rPr lang="en-US" sz="3200" b="1" spc="100" dirty="0" smtClean="0">
                 <a:solidFill>
-                  <a:schemeClr val="bg1"/>
+                  <a:srgbClr val="FFC000"/>
                 </a:solidFill>
-                <a:latin typeface="Times New Roman" pitchFamily="18" charset="0"/>
-                <a:cs typeface="Times New Roman" pitchFamily="18" charset="0"/>
-              </a:rPr>
-              <a:t> repository and GCP instance</a:t>
-            </a:r>
+                <a:effectLst>
+                  <a:outerShdw blurRad="38100" dist="38100" dir="2700000" algn="tl">
+                    <a:srgbClr val="000000">
+                      <a:alpha val="43137"/>
+                    </a:srgbClr>
+                  </a:outerShdw>
+                </a:effectLst>
+                <a:latin typeface="Times New Roman" pitchFamily="18" charset="0"/>
+                <a:cs typeface="Times New Roman" pitchFamily="18" charset="0"/>
+              </a:rPr>
+              <a:t> </a:t>
+            </a:r>
+            <a:r>
+              <a:rPr lang="en-US" sz="3200" b="1" spc="100" dirty="0" smtClean="0">
+                <a:solidFill>
+                  <a:srgbClr val="FFC000"/>
+                </a:solidFill>
+                <a:effectLst>
+                  <a:outerShdw blurRad="38100" dist="38100" dir="2700000" algn="tl">
+                    <a:srgbClr val="000000">
+                      <a:alpha val="43137"/>
+                    </a:srgbClr>
+                  </a:outerShdw>
+                </a:effectLst>
+                <a:latin typeface="Times New Roman" pitchFamily="18" charset="0"/>
+                <a:cs typeface="Times New Roman" pitchFamily="18" charset="0"/>
+              </a:rPr>
+              <a:t>repository, Jenkins </a:t>
+            </a:r>
+            <a:r>
+              <a:rPr lang="en-US" sz="3200" b="1" spc="100" dirty="0" smtClean="0">
+                <a:solidFill>
+                  <a:srgbClr val="FFC000"/>
+                </a:solidFill>
+                <a:effectLst>
+                  <a:outerShdw blurRad="38100" dist="38100" dir="2700000" algn="tl">
+                    <a:srgbClr val="000000">
+                      <a:alpha val="43137"/>
+                    </a:srgbClr>
+                  </a:outerShdw>
+                </a:effectLst>
+                <a:latin typeface="Times New Roman" pitchFamily="18" charset="0"/>
+                <a:cs typeface="Times New Roman" pitchFamily="18" charset="0"/>
+              </a:rPr>
+              <a:t>and GCP </a:t>
+            </a:r>
+            <a:r>
+              <a:rPr lang="en-US" sz="3200" b="1" spc="100" dirty="0" smtClean="0">
+                <a:solidFill>
+                  <a:srgbClr val="FFC000"/>
+                </a:solidFill>
+                <a:effectLst>
+                  <a:outerShdw blurRad="38100" dist="38100" dir="2700000" algn="tl">
+                    <a:srgbClr val="000000">
+                      <a:alpha val="43137"/>
+                    </a:srgbClr>
+                  </a:outerShdw>
+                </a:effectLst>
+                <a:latin typeface="Times New Roman" pitchFamily="18" charset="0"/>
+                <a:cs typeface="Times New Roman" pitchFamily="18" charset="0"/>
+              </a:rPr>
+              <a:t>instance.</a:t>
+            </a:r>
+            <a:endParaRPr lang="en-US" sz="3200" b="1" spc="100" dirty="0" smtClean="0">
+              <a:solidFill>
+                <a:srgbClr val="FFC000"/>
+              </a:solidFill>
+              <a:effectLst>
+                <a:outerShdw blurRad="38100" dist="38100" dir="2700000" algn="tl">
+                  <a:srgbClr val="000000">
+                    <a:alpha val="43137"/>
+                  </a:srgbClr>
+                </a:outerShdw>
+              </a:effectLst>
+              <a:latin typeface="Times New Roman" pitchFamily="18" charset="0"/>
+              <a:cs typeface="Times New Roman" pitchFamily="18" charset="0"/>
+            </a:endParaRPr>
           </a:p>
           <a:p>
             <a:endParaRPr lang="en-US" sz="2800" b="1" dirty="0" smtClean="0">
@@ -4035,8 +4136,15 @@
             <a:r>
               <a:rPr lang="en-US" sz="2800" b="1" dirty="0" err="1" smtClean="0">
                 <a:solidFill>
-                  <a:schemeClr val="bg1"/>
+                  <a:srgbClr val="FFC000"/>
                 </a:solidFill>
+                <a:effectLst>
+                  <a:outerShdw blurRad="38100" dist="38100" dir="2700000" algn="tl">
+                    <a:srgbClr val="000000">
+                      <a:alpha val="43137"/>
+                    </a:srgbClr>
+                  </a:outerShdw>
+                </a:effectLst>
                 <a:latin typeface="Times New Roman" pitchFamily="18" charset="0"/>
                 <a:cs typeface="Times New Roman" pitchFamily="18" charset="0"/>
               </a:rPr>
@@ -4045,8 +4153,15 @@
             <a:r>
               <a:rPr lang="en-US" sz="2800" b="1" dirty="0" smtClean="0">
                 <a:solidFill>
-                  <a:schemeClr val="bg1"/>
+                  <a:srgbClr val="FFC000"/>
                 </a:solidFill>
+                <a:effectLst>
+                  <a:outerShdw blurRad="38100" dist="38100" dir="2700000" algn="tl">
+                    <a:srgbClr val="000000">
+                      <a:alpha val="43137"/>
+                    </a:srgbClr>
+                  </a:outerShdw>
+                </a:effectLst>
                 <a:latin typeface="Times New Roman" pitchFamily="18" charset="0"/>
                 <a:cs typeface="Times New Roman" pitchFamily="18" charset="0"/>
               </a:rPr>
@@ -4055,8 +4170,15 @@
             <a:r>
               <a:rPr lang="en-US" sz="2800" b="1" dirty="0" err="1" smtClean="0">
                 <a:solidFill>
-                  <a:schemeClr val="bg1"/>
+                  <a:srgbClr val="FFC000"/>
                 </a:solidFill>
+                <a:effectLst>
+                  <a:outerShdw blurRad="38100" dist="38100" dir="2700000" algn="tl">
+                    <a:srgbClr val="000000">
+                      <a:alpha val="43137"/>
+                    </a:srgbClr>
+                  </a:outerShdw>
+                </a:effectLst>
                 <a:latin typeface="Times New Roman" pitchFamily="18" charset="0"/>
                 <a:cs typeface="Times New Roman" pitchFamily="18" charset="0"/>
               </a:rPr>
@@ -4064,8 +4186,15 @@
             </a:r>
             <a:endParaRPr lang="ru-RU" sz="2800" b="1" dirty="0" smtClean="0">
               <a:solidFill>
-                <a:schemeClr val="bg1"/>
+                <a:srgbClr val="FFC000"/>
               </a:solidFill>
+              <a:effectLst>
+                <a:outerShdw blurRad="38100" dist="38100" dir="2700000" algn="tl">
+                  <a:srgbClr val="000000">
+                    <a:alpha val="43137"/>
+                  </a:srgbClr>
+                </a:outerShdw>
+              </a:effectLst>
               <a:latin typeface="Times New Roman" pitchFamily="18" charset="0"/>
               <a:cs typeface="Times New Roman" pitchFamily="18" charset="0"/>
             </a:endParaRPr>
@@ -4687,7 +4816,7 @@
         </p:nvSpPr>
         <p:spPr>
           <a:xfrm>
-            <a:off x="838200" y="2057400"/>
+            <a:off x="838200" y="1600200"/>
             <a:ext cx="7848600" cy="461665"/>
           </a:xfrm>
           <a:prstGeom prst="rect">
@@ -4745,7 +4874,7 @@
         </p:blipFill>
         <p:spPr>
           <a:xfrm>
-            <a:off x="1219200" y="2514600"/>
+            <a:off x="1219200" y="2057400"/>
             <a:ext cx="5967522" cy="1231393"/>
           </a:xfrm>
           <a:prstGeom prst="rect">
@@ -4769,8 +4898,32 @@
         </p:blipFill>
         <p:spPr>
           <a:xfrm>
-            <a:off x="1219200" y="3886200"/>
+            <a:off x="1143000" y="3048000"/>
             <a:ext cx="6406791" cy="2369635"/>
+          </a:xfrm>
+          <a:prstGeom prst="rect">
+            <a:avLst/>
+          </a:prstGeom>
+        </p:spPr>
+      </p:pic>
+      <p:pic>
+        <p:nvPicPr>
+          <p:cNvPr id="7" name="Рисунок 6" descr="script-sh.png"/>
+          <p:cNvPicPr>
+            <a:picLocks noChangeAspect="1"/>
+          </p:cNvPicPr>
+          <p:nvPr/>
+        </p:nvPicPr>
+        <p:blipFill>
+          <a:blip r:embed="rId5" cstate="print"/>
+          <a:stretch>
+            <a:fillRect/>
+          </a:stretch>
+        </p:blipFill>
+        <p:spPr>
+          <a:xfrm>
+            <a:off x="1295400" y="5562600"/>
+            <a:ext cx="6477000" cy="1007050"/>
           </a:xfrm>
           <a:prstGeom prst="rect">
             <a:avLst/>
@@ -4870,14 +5023,7 @@
                 <a:latin typeface="Times New Roman" pitchFamily="18" charset="0"/>
                 <a:cs typeface="Times New Roman" pitchFamily="18" charset="0"/>
               </a:rPr>
-              <a:t>, and </a:t>
-            </a:r>
-            <a:r>
-              <a:rPr lang="en-US" sz="2400" dirty="0" smtClean="0">
-                <a:latin typeface="Times New Roman" pitchFamily="18" charset="0"/>
-                <a:cs typeface="Times New Roman" pitchFamily="18" charset="0"/>
-              </a:rPr>
-              <a:t>is a graduated project of the Cloud Native Computing Foundation, along with </a:t>
+              <a:t>, and is a graduated project of the Cloud Native Computing Foundation, along with </a:t>
             </a:r>
             <a:r>
               <a:rPr lang="en-US" sz="2400" dirty="0" err="1" smtClean="0">
@@ -5438,45 +5584,31 @@
                 <a:latin typeface="Times New Roman" pitchFamily="18" charset="0"/>
                 <a:cs typeface="Times New Roman" pitchFamily="18" charset="0"/>
               </a:rPr>
-              <a:t> </a:t>
+              <a:t> and </a:t>
+            </a:r>
+            <a:r>
+              <a:rPr lang="en-US" sz="2400" dirty="0" err="1" smtClean="0">
+                <a:latin typeface="Times New Roman" pitchFamily="18" charset="0"/>
+                <a:cs typeface="Times New Roman" pitchFamily="18" charset="0"/>
+              </a:rPr>
+              <a:t>AlertManager</a:t>
             </a:r>
             <a:r>
               <a:rPr lang="en-US" sz="2400" dirty="0" smtClean="0">
                 <a:latin typeface="Times New Roman" pitchFamily="18" charset="0"/>
                 <a:cs typeface="Times New Roman" pitchFamily="18" charset="0"/>
               </a:rPr>
-              <a:t>and </a:t>
-            </a:r>
-            <a:r>
-              <a:rPr lang="en-US" sz="2400" dirty="0" err="1" smtClean="0">
-                <a:latin typeface="Times New Roman" pitchFamily="18" charset="0"/>
-                <a:cs typeface="Times New Roman" pitchFamily="18" charset="0"/>
-              </a:rPr>
-              <a:t>AlertManager</a:t>
-            </a:r>
+              <a:t>.</a:t>
+            </a:r>
+          </a:p>
+          <a:p>
+            <a:pPr algn="just"/>
             <a:r>
               <a:rPr lang="en-US" sz="2400" dirty="0" smtClean="0">
                 <a:latin typeface="Times New Roman" pitchFamily="18" charset="0"/>
                 <a:cs typeface="Times New Roman" pitchFamily="18" charset="0"/>
               </a:rPr>
-              <a:t>.</a:t>
-            </a:r>
-          </a:p>
-          <a:p>
-            <a:pPr algn="just"/>
-            <a:r>
-              <a:rPr lang="en-US" sz="2400" dirty="0" smtClean="0">
-                <a:latin typeface="Times New Roman" pitchFamily="18" charset="0"/>
-                <a:cs typeface="Times New Roman" pitchFamily="18" charset="0"/>
-              </a:rPr>
-              <a:t>Clone the repository and run the installation</a:t>
-            </a:r>
-            <a:r>
-              <a:rPr lang="en-US" sz="2400" dirty="0" smtClean="0">
-                <a:latin typeface="Times New Roman" pitchFamily="18" charset="0"/>
-                <a:cs typeface="Times New Roman" pitchFamily="18" charset="0"/>
-              </a:rPr>
-              <a:t>:</a:t>
+              <a:t>Clone the repository and run the installation:</a:t>
             </a:r>
           </a:p>
           <a:p>
@@ -5668,31 +5800,142 @@
             <p:ph type="title"/>
           </p:nvPr>
         </p:nvSpPr>
-        <p:spPr/>
-        <p:txBody>
-          <a:bodyPr/>
-          <a:lstStyle/>
-          <a:p>
-            <a:endParaRPr lang="en-US"/>
-          </a:p>
-        </p:txBody>
-      </p:sp>
-      <p:sp>
-        <p:nvSpPr>
-          <p:cNvPr id="3" name="Содержимое 2"/>
-          <p:cNvSpPr>
-            <a:spLocks noGrp="1"/>
-          </p:cNvSpPr>
+        <p:spPr>
+          <a:xfrm>
+            <a:off x="457200" y="704088"/>
+            <a:ext cx="8229600" cy="896112"/>
+          </a:xfrm>
+        </p:spPr>
+        <p:txBody>
+          <a:bodyPr>
+            <a:normAutofit/>
+          </a:bodyPr>
+          <a:lstStyle/>
+          <a:p>
+            <a:pPr algn="ctr"/>
+            <a:r>
+              <a:rPr lang="en-US" sz="4500" dirty="0" err="1" smtClean="0"/>
+              <a:t>Django</a:t>
+            </a:r>
+            <a:endParaRPr lang="en-US" sz="4500" dirty="0"/>
+          </a:p>
+        </p:txBody>
+      </p:sp>
+      <p:pic>
+        <p:nvPicPr>
+          <p:cNvPr id="4" name="Содержимое 3" descr="1758694.png"/>
+          <p:cNvPicPr>
+            <a:picLocks noGrp="1" noChangeAspect="1"/>
+          </p:cNvPicPr>
           <p:nvPr>
             <p:ph idx="1"/>
           </p:nvPr>
-        </p:nvSpPr>
-        <p:spPr/>
-        <p:txBody>
-          <a:bodyPr/>
-          <a:lstStyle/>
-          <a:p>
-            <a:endParaRPr lang="en-US"/>
+        </p:nvPicPr>
+        <p:blipFill>
+          <a:blip r:embed="rId2" cstate="print"/>
+          <a:stretch>
+            <a:fillRect/>
+          </a:stretch>
+        </p:blipFill>
+        <p:spPr>
+          <a:xfrm>
+            <a:off x="6858000" y="381000"/>
+            <a:ext cx="1524000" cy="1524000"/>
+          </a:xfrm>
+        </p:spPr>
+      </p:pic>
+      <p:sp>
+        <p:nvSpPr>
+          <p:cNvPr id="5" name="Прямоугольник 4"/>
+          <p:cNvSpPr/>
+          <p:nvPr/>
+        </p:nvSpPr>
+        <p:spPr>
+          <a:xfrm>
+            <a:off x="457200" y="1828800"/>
+            <a:ext cx="8382000" cy="4524315"/>
+          </a:xfrm>
+          <a:prstGeom prst="rect">
+            <a:avLst/>
+          </a:prstGeom>
+        </p:spPr>
+        <p:txBody>
+          <a:bodyPr wrap="square">
+            <a:spAutoFit/>
+          </a:bodyPr>
+          <a:lstStyle/>
+          <a:p>
+            <a:pPr algn="just"/>
+            <a:r>
+              <a:rPr lang="en-US" sz="2400" dirty="0" err="1" smtClean="0">
+                <a:latin typeface="Times New Roman" pitchFamily="18" charset="0"/>
+                <a:cs typeface="Times New Roman" pitchFamily="18" charset="0"/>
+              </a:rPr>
+              <a:t>Django</a:t>
+            </a:r>
+            <a:r>
+              <a:rPr lang="en-US" sz="2400" dirty="0" smtClean="0">
+                <a:latin typeface="Times New Roman" pitchFamily="18" charset="0"/>
+                <a:cs typeface="Times New Roman" pitchFamily="18" charset="0"/>
+              </a:rPr>
+              <a:t>  is a Python-based free and open-source web framework that follows the model-template-views (MTV) architectural pattern.</a:t>
+            </a:r>
+          </a:p>
+          <a:p>
+            <a:pPr algn="just"/>
+            <a:endParaRPr lang="en-US" sz="2400" dirty="0" smtClean="0">
+              <a:latin typeface="Times New Roman" pitchFamily="18" charset="0"/>
+              <a:cs typeface="Times New Roman" pitchFamily="18" charset="0"/>
+            </a:endParaRPr>
+          </a:p>
+          <a:p>
+            <a:pPr algn="just"/>
+            <a:r>
+              <a:rPr lang="en-US" sz="2400" dirty="0" err="1" smtClean="0">
+                <a:latin typeface="Times New Roman" pitchFamily="18" charset="0"/>
+                <a:cs typeface="Times New Roman" pitchFamily="18" charset="0"/>
+              </a:rPr>
+              <a:t>Django's</a:t>
+            </a:r>
+            <a:r>
+              <a:rPr lang="en-US" sz="2400" dirty="0" smtClean="0">
+                <a:latin typeface="Times New Roman" pitchFamily="18" charset="0"/>
+                <a:cs typeface="Times New Roman" pitchFamily="18" charset="0"/>
+              </a:rPr>
+              <a:t> primary goal is to ease the creation of complex, database-driven websites. The framework emphasizes reusability and "</a:t>
+            </a:r>
+            <a:r>
+              <a:rPr lang="en-US" sz="2400" dirty="0" err="1" smtClean="0">
+                <a:latin typeface="Times New Roman" pitchFamily="18" charset="0"/>
+                <a:cs typeface="Times New Roman" pitchFamily="18" charset="0"/>
+              </a:rPr>
+              <a:t>pluggability</a:t>
+            </a:r>
+            <a:r>
+              <a:rPr lang="en-US" sz="2400" dirty="0" smtClean="0">
+                <a:latin typeface="Times New Roman" pitchFamily="18" charset="0"/>
+                <a:cs typeface="Times New Roman" pitchFamily="18" charset="0"/>
+              </a:rPr>
+              <a:t>" of components, less code, low coupling, rapid development, and the principle of don't repeat yourself. Python is used throughout, even for settings, files, and data models. </a:t>
+            </a:r>
+            <a:r>
+              <a:rPr lang="en-US" sz="2400" dirty="0" err="1" smtClean="0">
+                <a:latin typeface="Times New Roman" pitchFamily="18" charset="0"/>
+                <a:cs typeface="Times New Roman" pitchFamily="18" charset="0"/>
+              </a:rPr>
+              <a:t>Django</a:t>
+            </a:r>
+            <a:r>
+              <a:rPr lang="en-US" sz="2400" dirty="0" smtClean="0">
+                <a:latin typeface="Times New Roman" pitchFamily="18" charset="0"/>
+                <a:cs typeface="Times New Roman" pitchFamily="18" charset="0"/>
+              </a:rPr>
+              <a:t> also provides an optional administrative create, read, update and delete interface that is generated dynamically through introspection and configured via admin models. </a:t>
+            </a:r>
+            <a:endParaRPr lang="en-US" sz="2400" dirty="0">
+              <a:latin typeface="Times New Roman" pitchFamily="18" charset="0"/>
+              <a:cs typeface="Times New Roman" pitchFamily="18" charset="0"/>
+            </a:endParaRPr>
           </a:p>
         </p:txBody>
       </p:sp>
@@ -5772,6 +6015,133 @@
           <a:xfrm>
             <a:off x="457200" y="1371600"/>
             <a:ext cx="7638766" cy="5181600"/>
+          </a:xfrm>
+          <a:prstGeom prst="rect">
+            <a:avLst/>
+          </a:prstGeom>
+        </p:spPr>
+      </p:pic>
+    </p:spTree>
+  </p:cSld>
+  <p:clrMapOvr>
+    <a:masterClrMapping/>
+  </p:clrMapOvr>
+</p:sld>
+</file>
+
+<file path=ppt/slides/slide20.xml><?xml version="1.0" encoding="utf-8"?>
+<p:sld xmlns:a="http://schemas.openxmlformats.org/drawingml/2006/main" xmlns:r="http://schemas.openxmlformats.org/officeDocument/2006/relationships" xmlns:p="http://schemas.openxmlformats.org/presentationml/2006/main">
+  <p:cSld>
+    <p:spTree>
+      <p:nvGrpSpPr>
+        <p:cNvPr id="1" name=""/>
+        <p:cNvGrpSpPr/>
+        <p:nvPr/>
+      </p:nvGrpSpPr>
+      <p:grpSpPr>
+        <a:xfrm>
+          <a:off x="0" y="0"/>
+          <a:ext cx="0" cy="0"/>
+          <a:chOff x="0" y="0"/>
+          <a:chExt cx="0" cy="0"/>
+        </a:xfrm>
+      </p:grpSpPr>
+      <p:sp>
+        <p:nvSpPr>
+          <p:cNvPr id="2" name="Заголовок 1"/>
+          <p:cNvSpPr>
+            <a:spLocks noGrp="1"/>
+          </p:cNvSpPr>
+          <p:nvPr>
+            <p:ph type="title"/>
+          </p:nvPr>
+        </p:nvSpPr>
+        <p:spPr>
+          <a:xfrm>
+            <a:off x="457200" y="704088"/>
+            <a:ext cx="8229600" cy="896112"/>
+          </a:xfrm>
+        </p:spPr>
+        <p:txBody>
+          <a:bodyPr>
+            <a:normAutofit/>
+          </a:bodyPr>
+          <a:lstStyle/>
+          <a:p>
+            <a:pPr algn="ctr"/>
+            <a:r>
+              <a:rPr lang="en-US" sz="4500" dirty="0" err="1" smtClean="0"/>
+              <a:t>Django</a:t>
+            </a:r>
+            <a:endParaRPr lang="en-US" sz="4500" dirty="0"/>
+          </a:p>
+        </p:txBody>
+      </p:sp>
+      <p:pic>
+        <p:nvPicPr>
+          <p:cNvPr id="4" name="Содержимое 3" descr="1758694.png"/>
+          <p:cNvPicPr>
+            <a:picLocks noGrp="1" noChangeAspect="1"/>
+          </p:cNvPicPr>
+          <p:nvPr>
+            <p:ph idx="1"/>
+          </p:nvPr>
+        </p:nvPicPr>
+        <p:blipFill>
+          <a:blip r:embed="rId2" cstate="print"/>
+          <a:stretch>
+            <a:fillRect/>
+          </a:stretch>
+        </p:blipFill>
+        <p:spPr>
+          <a:xfrm>
+            <a:off x="6858000" y="381000"/>
+            <a:ext cx="1524000" cy="1524000"/>
+          </a:xfrm>
+        </p:spPr>
+      </p:pic>
+      <p:pic>
+        <p:nvPicPr>
+          <p:cNvPr id="6" name="Рисунок 5" descr="mywebsite.png"/>
+          <p:cNvPicPr>
+            <a:picLocks noChangeAspect="1"/>
+          </p:cNvPicPr>
+          <p:nvPr/>
+        </p:nvPicPr>
+        <p:blipFill>
+          <a:blip r:embed="rId3" cstate="print"/>
+          <a:stretch>
+            <a:fillRect/>
+          </a:stretch>
+        </p:blipFill>
+        <p:spPr>
+          <a:xfrm>
+            <a:off x="3048000" y="1905000"/>
+            <a:ext cx="5839972" cy="4771288"/>
+          </a:xfrm>
+          <a:prstGeom prst="rect">
+            <a:avLst/>
+          </a:prstGeom>
+        </p:spPr>
+      </p:pic>
+      <p:pic>
+        <p:nvPicPr>
+          <p:cNvPr id="7" name="Рисунок 6" descr="structura.png"/>
+          <p:cNvPicPr>
+            <a:picLocks noChangeAspect="1"/>
+          </p:cNvPicPr>
+          <p:nvPr/>
+        </p:nvPicPr>
+        <p:blipFill>
+          <a:blip r:embed="rId4" cstate="print"/>
+          <a:stretch>
+            <a:fillRect/>
+          </a:stretch>
+        </p:blipFill>
+        <p:spPr>
+          <a:xfrm>
+            <a:off x="304799" y="1676400"/>
+            <a:ext cx="2447337" cy="5029200"/>
           </a:xfrm>
           <a:prstGeom prst="rect">
             <a:avLst/>
@@ -6447,14 +6817,59 @@
                 <a:latin typeface="Times New Roman" pitchFamily="18" charset="0"/>
                 <a:cs typeface="Times New Roman" pitchFamily="18" charset="0"/>
               </a:rPr>
-              <a:t>, VPC firewall </a:t>
-            </a:r>
+              <a:t>, VPC firewall configuration.</a:t>
+            </a:r>
+          </a:p>
+          <a:p>
+            <a:pPr algn="just"/>
             <a:r>
               <a:rPr lang="en-US" sz="2400" dirty="0" smtClean="0">
                 <a:latin typeface="Times New Roman" pitchFamily="18" charset="0"/>
                 <a:cs typeface="Times New Roman" pitchFamily="18" charset="0"/>
               </a:rPr>
-              <a:t>configuration.</a:t>
+              <a:t>docker.tf – create instance </a:t>
+            </a:r>
+            <a:r>
+              <a:rPr lang="en-US" sz="2400" dirty="0" err="1" smtClean="0">
+                <a:latin typeface="Times New Roman" pitchFamily="18" charset="0"/>
+                <a:cs typeface="Times New Roman" pitchFamily="18" charset="0"/>
+              </a:rPr>
+              <a:t>docker</a:t>
+            </a:r>
+            <a:r>
+              <a:rPr lang="en-US" sz="2400" dirty="0" smtClean="0">
+                <a:latin typeface="Times New Roman" pitchFamily="18" charset="0"/>
+                <a:cs typeface="Times New Roman" pitchFamily="18" charset="0"/>
+              </a:rPr>
+              <a:t> ( docker.sh – install </a:t>
+            </a:r>
+            <a:r>
+              <a:rPr lang="en-US" sz="2400" dirty="0" err="1" smtClean="0">
+                <a:latin typeface="Times New Roman" pitchFamily="18" charset="0"/>
+                <a:cs typeface="Times New Roman" pitchFamily="18" charset="0"/>
+              </a:rPr>
+              <a:t>docker</a:t>
+            </a:r>
+            <a:r>
+              <a:rPr lang="en-US" sz="2400" dirty="0" smtClean="0">
+                <a:latin typeface="Times New Roman" pitchFamily="18" charset="0"/>
+                <a:cs typeface="Times New Roman" pitchFamily="18" charset="0"/>
+              </a:rPr>
+              <a:t>, </a:t>
+            </a:r>
+            <a:r>
+              <a:rPr lang="en-US" sz="2400" dirty="0" err="1" smtClean="0">
+                <a:latin typeface="Times New Roman" pitchFamily="18" charset="0"/>
+                <a:cs typeface="Times New Roman" pitchFamily="18" charset="0"/>
+              </a:rPr>
+              <a:t>docker</a:t>
+            </a:r>
+            <a:r>
+              <a:rPr lang="en-US" sz="2400" dirty="0" smtClean="0">
+                <a:latin typeface="Times New Roman" pitchFamily="18" charset="0"/>
+                <a:cs typeface="Times New Roman" pitchFamily="18" charset="0"/>
+              </a:rPr>
+              <a:t>-compose).</a:t>
             </a:r>
           </a:p>
           <a:p>
@@ -6464,13 +6879,41 @@
                 <a:latin typeface="Times New Roman" pitchFamily="18" charset="0"/>
                 <a:cs typeface="Times New Roman" pitchFamily="18" charset="0"/>
               </a:rPr>
-              <a:t>docker.tf – create instance </a:t>
+              <a:t>jenkins.tf – create instance </a:t>
             </a:r>
             <a:r>
               <a:rPr lang="en-US" sz="2400" dirty="0" err="1" smtClean="0">
                 <a:latin typeface="Times New Roman" pitchFamily="18" charset="0"/>
                 <a:cs typeface="Times New Roman" pitchFamily="18" charset="0"/>
               </a:rPr>
+              <a:t>jenkins</a:t>
+            </a:r>
+            <a:r>
+              <a:rPr lang="en-US" sz="2400" dirty="0" smtClean="0">
+                <a:latin typeface="Times New Roman" pitchFamily="18" charset="0"/>
+                <a:cs typeface="Times New Roman" pitchFamily="18" charset="0"/>
+              </a:rPr>
+              <a:t> ( jenkins.sh –install  Java, </a:t>
+            </a:r>
+            <a:r>
+              <a:rPr lang="en-US" sz="2400" dirty="0" err="1" smtClean="0">
+                <a:latin typeface="Times New Roman" pitchFamily="18" charset="0"/>
+                <a:cs typeface="Times New Roman" pitchFamily="18" charset="0"/>
+              </a:rPr>
+              <a:t>jenkins</a:t>
+            </a:r>
+            <a:r>
+              <a:rPr lang="en-US" sz="2400" dirty="0" smtClean="0">
+                <a:latin typeface="Times New Roman" pitchFamily="18" charset="0"/>
+                <a:cs typeface="Times New Roman" pitchFamily="18" charset="0"/>
+              </a:rPr>
+              <a:t>, </a:t>
+            </a:r>
+            <a:r>
+              <a:rPr lang="en-US" sz="2400" dirty="0" err="1" smtClean="0">
+                <a:latin typeface="Times New Roman" pitchFamily="18" charset="0"/>
+                <a:cs typeface="Times New Roman" pitchFamily="18" charset="0"/>
+              </a:rPr>
               <a:t>docker</a:t>
             </a:r>
             <a:r>
@@ -6478,7 +6921,7 @@
                 <a:latin typeface="Times New Roman" pitchFamily="18" charset="0"/>
                 <a:cs typeface="Times New Roman" pitchFamily="18" charset="0"/>
               </a:rPr>
-              <a:t> ( docker.sh – install </a:t>
+              <a:t>, </a:t>
             </a:r>
             <a:r>
               <a:rPr lang="en-US" sz="2400" dirty="0" err="1" smtClean="0">
@@ -6492,21 +6935,17 @@
                 <a:latin typeface="Times New Roman" pitchFamily="18" charset="0"/>
                 <a:cs typeface="Times New Roman" pitchFamily="18" charset="0"/>
               </a:rPr>
-              <a:t>, </a:t>
-            </a:r>
-            <a:r>
-              <a:rPr lang="en-US" sz="2400" dirty="0" err="1" smtClean="0">
-                <a:latin typeface="Times New Roman" pitchFamily="18" charset="0"/>
-                <a:cs typeface="Times New Roman" pitchFamily="18" charset="0"/>
-              </a:rPr>
-              <a:t>docker</a:t>
-            </a:r>
+              <a:t>-compose).</a:t>
+            </a:r>
+          </a:p>
+          <a:p>
+            <a:pPr algn="just"/>
             <a:r>
               <a:rPr lang="en-US" sz="2400" dirty="0" smtClean="0">
                 <a:latin typeface="Times New Roman" pitchFamily="18" charset="0"/>
                 <a:cs typeface="Times New Roman" pitchFamily="18" charset="0"/>
               </a:rPr>
-              <a:t>-compose).</a:t>
+              <a:t>Jenkins-node1.tf – create instance jenkins-node1 ( jenkins-node1.sh – install  Java).</a:t>
             </a:r>
           </a:p>
           <a:p>
@@ -6516,144 +6955,8 @@
                 <a:latin typeface="Times New Roman" pitchFamily="18" charset="0"/>
                 <a:cs typeface="Times New Roman" pitchFamily="18" charset="0"/>
               </a:rPr>
-              <a:t>jenkins.tf </a:t>
-            </a:r>
-            <a:r>
-              <a:rPr lang="en-US" sz="2400" dirty="0" smtClean="0">
-                <a:latin typeface="Times New Roman" pitchFamily="18" charset="0"/>
-                <a:cs typeface="Times New Roman" pitchFamily="18" charset="0"/>
-              </a:rPr>
-              <a:t>– create instance </a:t>
-            </a:r>
-            <a:r>
-              <a:rPr lang="en-US" sz="2400" dirty="0" err="1" smtClean="0">
-                <a:latin typeface="Times New Roman" pitchFamily="18" charset="0"/>
-                <a:cs typeface="Times New Roman" pitchFamily="18" charset="0"/>
-              </a:rPr>
-              <a:t>jenkins</a:t>
-            </a:r>
-            <a:r>
-              <a:rPr lang="en-US" sz="2400" dirty="0" smtClean="0">
-                <a:latin typeface="Times New Roman" pitchFamily="18" charset="0"/>
-                <a:cs typeface="Times New Roman" pitchFamily="18" charset="0"/>
-              </a:rPr>
-              <a:t> </a:t>
-            </a:r>
-            <a:r>
-              <a:rPr lang="en-US" sz="2400" dirty="0" smtClean="0">
-                <a:latin typeface="Times New Roman" pitchFamily="18" charset="0"/>
-                <a:cs typeface="Times New Roman" pitchFamily="18" charset="0"/>
-              </a:rPr>
-              <a:t>( </a:t>
-            </a:r>
-            <a:r>
-              <a:rPr lang="en-US" sz="2400" dirty="0" smtClean="0">
-                <a:latin typeface="Times New Roman" pitchFamily="18" charset="0"/>
-                <a:cs typeface="Times New Roman" pitchFamily="18" charset="0"/>
-              </a:rPr>
-              <a:t>jenkins.sh –install  Java, </a:t>
-            </a:r>
-            <a:r>
-              <a:rPr lang="en-US" sz="2400" dirty="0" err="1" smtClean="0">
-                <a:latin typeface="Times New Roman" pitchFamily="18" charset="0"/>
-                <a:cs typeface="Times New Roman" pitchFamily="18" charset="0"/>
-              </a:rPr>
-              <a:t>jenkins</a:t>
-            </a:r>
-            <a:r>
-              <a:rPr lang="en-US" sz="2400" dirty="0" smtClean="0">
-                <a:latin typeface="Times New Roman" pitchFamily="18" charset="0"/>
-                <a:cs typeface="Times New Roman" pitchFamily="18" charset="0"/>
-              </a:rPr>
-              <a:t>, </a:t>
-            </a:r>
-            <a:r>
-              <a:rPr lang="en-US" sz="2400" dirty="0" err="1" smtClean="0">
-                <a:latin typeface="Times New Roman" pitchFamily="18" charset="0"/>
-                <a:cs typeface="Times New Roman" pitchFamily="18" charset="0"/>
-              </a:rPr>
-              <a:t>docker</a:t>
-            </a:r>
-            <a:r>
-              <a:rPr lang="en-US" sz="2400" dirty="0" smtClean="0">
-                <a:latin typeface="Times New Roman" pitchFamily="18" charset="0"/>
-                <a:cs typeface="Times New Roman" pitchFamily="18" charset="0"/>
-              </a:rPr>
-              <a:t>, </a:t>
-            </a:r>
-            <a:r>
-              <a:rPr lang="en-US" sz="2400" dirty="0" err="1" smtClean="0">
-                <a:latin typeface="Times New Roman" pitchFamily="18" charset="0"/>
-                <a:cs typeface="Times New Roman" pitchFamily="18" charset="0"/>
-              </a:rPr>
-              <a:t>docker</a:t>
-            </a:r>
-            <a:r>
-              <a:rPr lang="en-US" sz="2400" dirty="0" smtClean="0">
-                <a:latin typeface="Times New Roman" pitchFamily="18" charset="0"/>
-                <a:cs typeface="Times New Roman" pitchFamily="18" charset="0"/>
-              </a:rPr>
-              <a:t>-compose</a:t>
-            </a:r>
-            <a:r>
-              <a:rPr lang="en-US" sz="2400" dirty="0" smtClean="0">
-                <a:latin typeface="Times New Roman" pitchFamily="18" charset="0"/>
-                <a:cs typeface="Times New Roman" pitchFamily="18" charset="0"/>
-              </a:rPr>
-              <a:t>).</a:t>
-            </a:r>
-          </a:p>
-          <a:p>
-            <a:pPr algn="just"/>
-            <a:r>
-              <a:rPr lang="en-US" sz="2400" dirty="0" smtClean="0">
-                <a:latin typeface="Times New Roman" pitchFamily="18" charset="0"/>
-                <a:cs typeface="Times New Roman" pitchFamily="18" charset="0"/>
-              </a:rPr>
-              <a:t>Jenkins-node1.tf </a:t>
-            </a:r>
-            <a:r>
-              <a:rPr lang="en-US" sz="2400" dirty="0" smtClean="0">
-                <a:latin typeface="Times New Roman" pitchFamily="18" charset="0"/>
-                <a:cs typeface="Times New Roman" pitchFamily="18" charset="0"/>
-              </a:rPr>
-              <a:t>– create instance </a:t>
-            </a:r>
-            <a:r>
-              <a:rPr lang="en-US" sz="2400" dirty="0" smtClean="0">
-                <a:latin typeface="Times New Roman" pitchFamily="18" charset="0"/>
-                <a:cs typeface="Times New Roman" pitchFamily="18" charset="0"/>
-              </a:rPr>
-              <a:t>jenkins-node1 </a:t>
-            </a:r>
-            <a:r>
-              <a:rPr lang="en-US" sz="2400" dirty="0" smtClean="0">
-                <a:latin typeface="Times New Roman" pitchFamily="18" charset="0"/>
-                <a:cs typeface="Times New Roman" pitchFamily="18" charset="0"/>
-              </a:rPr>
-              <a:t>( </a:t>
-            </a:r>
-            <a:r>
-              <a:rPr lang="en-US" sz="2400" dirty="0" smtClean="0">
-                <a:latin typeface="Times New Roman" pitchFamily="18" charset="0"/>
-                <a:cs typeface="Times New Roman" pitchFamily="18" charset="0"/>
-              </a:rPr>
-              <a:t>jenkins-node1.sh – install  Java).</a:t>
-            </a:r>
-          </a:p>
-          <a:p>
-            <a:pPr algn="just"/>
-            <a:r>
-              <a:rPr lang="en-US" sz="2400" dirty="0" smtClean="0">
-                <a:latin typeface="Times New Roman" pitchFamily="18" charset="0"/>
-                <a:cs typeface="Times New Roman" pitchFamily="18" charset="0"/>
-              </a:rPr>
               <a:t>All instances have static IP.</a:t>
             </a:r>
-            <a:endParaRPr lang="en-US" sz="2400" dirty="0" smtClean="0">
-              <a:latin typeface="Times New Roman" pitchFamily="18" charset="0"/>
-              <a:cs typeface="Times New Roman" pitchFamily="18" charset="0"/>
-            </a:endParaRPr>
           </a:p>
           <a:p>
             <a:endParaRPr lang="en-US" dirty="0" smtClean="0"/>
@@ -6944,19 +7247,8 @@
                 <a:latin typeface="Times New Roman" pitchFamily="18" charset="0"/>
                 <a:cs typeface="Times New Roman" pitchFamily="18" charset="0"/>
               </a:rPr>
-              <a:t>We </a:t>
-            </a:r>
-            <a:r>
-              <a:rPr lang="en-US" sz="2400" dirty="0" smtClean="0">
-                <a:latin typeface="Times New Roman" pitchFamily="18" charset="0"/>
-                <a:cs typeface="Times New Roman" pitchFamily="18" charset="0"/>
-              </a:rPr>
-              <a:t>create the following repositories:</a:t>
-            </a:r>
-            <a:endParaRPr lang="en-US" sz="2400" dirty="0" smtClean="0">
-              <a:latin typeface="Times New Roman" pitchFamily="18" charset="0"/>
-              <a:cs typeface="Times New Roman" pitchFamily="18" charset="0"/>
-            </a:endParaRPr>
+              <a:t>We create the following repositories:</a:t>
+            </a:r>
           </a:p>
           <a:p>
             <a:endParaRPr lang="en-US" dirty="0"/>
@@ -7133,14 +7425,7 @@
                 <a:latin typeface="Times New Roman" pitchFamily="18" charset="0"/>
                 <a:cs typeface="Times New Roman" pitchFamily="18" charset="0"/>
               </a:rPr>
-              <a:t> keys to the repository</a:t>
-            </a:r>
-            <a:r>
-              <a:rPr lang="en-US" sz="2400" dirty="0" smtClean="0">
-                <a:latin typeface="Times New Roman" pitchFamily="18" charset="0"/>
-                <a:cs typeface="Times New Roman" pitchFamily="18" charset="0"/>
-              </a:rPr>
-              <a:t>:</a:t>
+              <a:t> keys to the repository:</a:t>
             </a:r>
           </a:p>
           <a:p>
@@ -7224,14 +7509,7 @@
                 <a:latin typeface="Times New Roman" pitchFamily="18" charset="0"/>
                 <a:cs typeface="Times New Roman" pitchFamily="18" charset="0"/>
               </a:rPr>
-              <a:t> </a:t>
-            </a:r>
-            <a:r>
-              <a:rPr lang="en-US" sz="2400" dirty="0" smtClean="0">
-                <a:latin typeface="Times New Roman" pitchFamily="18" charset="0"/>
-                <a:cs typeface="Times New Roman" pitchFamily="18" charset="0"/>
-              </a:rPr>
-              <a:t>to the repository</a:t>
+              <a:t> to the repository</a:t>
             </a:r>
             <a:endParaRPr lang="en-US" sz="2400" dirty="0">
               <a:latin typeface="Times New Roman" pitchFamily="18" charset="0"/>

</xml_diff>

<commit_message>
change 2 file Final Task.pptx
</commit_message>
<xml_diff>
--- a/Andrii Kozak Final Task.pptx
+++ b/Andrii Kozak Final Task.pptx
@@ -25,6 +25,13 @@
     <p:sldId id="273" r:id="rId19"/>
     <p:sldId id="274" r:id="rId20"/>
     <p:sldId id="275" r:id="rId21"/>
+    <p:sldId id="276" r:id="rId22"/>
+    <p:sldId id="277" r:id="rId23"/>
+    <p:sldId id="278" r:id="rId24"/>
+    <p:sldId id="279" r:id="rId25"/>
+    <p:sldId id="280" r:id="rId26"/>
+    <p:sldId id="281" r:id="rId27"/>
+    <p:sldId id="282" r:id="rId28"/>
   </p:sldIdLst>
   <p:sldSz cx="9144000" cy="6858000" type="screen4x3"/>
   <p:notesSz cx="6858000" cy="9144000"/>
@@ -300,7 +307,7 @@
             <a:fld id="{89440FFE-F3CD-419C-A9E1-16B94B217D40}" type="datetimeFigureOut">
               <a:rPr lang="en-US" smtClean="0"/>
               <a:pPr/>
-              <a:t>14-Mar-21</a:t>
+              <a:t>15-Mar-21</a:t>
             </a:fld>
             <a:endParaRPr lang="en-US"/>
           </a:p>
@@ -467,7 +474,7 @@
             <a:fld id="{89440FFE-F3CD-419C-A9E1-16B94B217D40}" type="datetimeFigureOut">
               <a:rPr lang="en-US" smtClean="0"/>
               <a:pPr/>
-              <a:t>14-Mar-21</a:t>
+              <a:t>15-Mar-21</a:t>
             </a:fld>
             <a:endParaRPr lang="en-US"/>
           </a:p>
@@ -644,7 +651,7 @@
             <a:fld id="{89440FFE-F3CD-419C-A9E1-16B94B217D40}" type="datetimeFigureOut">
               <a:rPr lang="en-US" smtClean="0"/>
               <a:pPr/>
-              <a:t>14-Mar-21</a:t>
+              <a:t>15-Mar-21</a:t>
             </a:fld>
             <a:endParaRPr lang="en-US"/>
           </a:p>
@@ -811,7 +818,7 @@
             <a:fld id="{89440FFE-F3CD-419C-A9E1-16B94B217D40}" type="datetimeFigureOut">
               <a:rPr lang="en-US" smtClean="0"/>
               <a:pPr/>
-              <a:t>14-Mar-21</a:t>
+              <a:t>15-Mar-21</a:t>
             </a:fld>
             <a:endParaRPr lang="en-US"/>
           </a:p>
@@ -1055,7 +1062,7 @@
             <a:fld id="{89440FFE-F3CD-419C-A9E1-16B94B217D40}" type="datetimeFigureOut">
               <a:rPr lang="en-US" smtClean="0"/>
               <a:pPr/>
-              <a:t>14-Mar-21</a:t>
+              <a:t>15-Mar-21</a:t>
             </a:fld>
             <a:endParaRPr lang="en-US"/>
           </a:p>
@@ -1321,7 +1328,7 @@
             <a:fld id="{89440FFE-F3CD-419C-A9E1-16B94B217D40}" type="datetimeFigureOut">
               <a:rPr lang="en-US" smtClean="0"/>
               <a:pPr/>
-              <a:t>14-Mar-21</a:t>
+              <a:t>15-Mar-21</a:t>
             </a:fld>
             <a:endParaRPr lang="en-US"/>
           </a:p>
@@ -1701,7 +1708,7 @@
             <a:fld id="{89440FFE-F3CD-419C-A9E1-16B94B217D40}" type="datetimeFigureOut">
               <a:rPr lang="en-US" smtClean="0"/>
               <a:pPr/>
-              <a:t>14-Mar-21</a:t>
+              <a:t>15-Mar-21</a:t>
             </a:fld>
             <a:endParaRPr lang="en-US"/>
           </a:p>
@@ -1853,7 +1860,7 @@
             <a:fld id="{89440FFE-F3CD-419C-A9E1-16B94B217D40}" type="datetimeFigureOut">
               <a:rPr lang="en-US" smtClean="0"/>
               <a:pPr/>
-              <a:t>14-Mar-21</a:t>
+              <a:t>15-Mar-21</a:t>
             </a:fld>
             <a:endParaRPr lang="en-US"/>
           </a:p>
@@ -1945,7 +1952,7 @@
             <a:fld id="{89440FFE-F3CD-419C-A9E1-16B94B217D40}" type="datetimeFigureOut">
               <a:rPr lang="en-US" smtClean="0"/>
               <a:pPr/>
-              <a:t>14-Mar-21</a:t>
+              <a:t>15-Mar-21</a:t>
             </a:fld>
             <a:endParaRPr lang="en-US"/>
           </a:p>
@@ -2208,7 +2215,7 @@
             <a:fld id="{89440FFE-F3CD-419C-A9E1-16B94B217D40}" type="datetimeFigureOut">
               <a:rPr lang="en-US" smtClean="0"/>
               <a:pPr/>
-              <a:t>14-Mar-21</a:t>
+              <a:t>15-Mar-21</a:t>
             </a:fld>
             <a:endParaRPr lang="en-US"/>
           </a:p>
@@ -2498,7 +2505,7 @@
             <a:fld id="{89440FFE-F3CD-419C-A9E1-16B94B217D40}" type="datetimeFigureOut">
               <a:rPr lang="en-US" smtClean="0"/>
               <a:pPr/>
-              <a:t>14-Mar-21</a:t>
+              <a:t>15-Mar-21</a:t>
             </a:fld>
             <a:endParaRPr lang="en-US"/>
           </a:p>
@@ -3271,7 +3278,7 @@
             <a:fld id="{89440FFE-F3CD-419C-A9E1-16B94B217D40}" type="datetimeFigureOut">
               <a:rPr lang="en-US" smtClean="0"/>
               <a:pPr/>
-              <a:t>14-Mar-21</a:t>
+              <a:t>15-Mar-21</a:t>
             </a:fld>
             <a:endParaRPr lang="en-US"/>
           </a:p>
@@ -4057,73 +4064,8 @@
                 <a:latin typeface="Times New Roman" pitchFamily="18" charset="0"/>
                 <a:cs typeface="Times New Roman" pitchFamily="18" charset="0"/>
               </a:rPr>
-              <a:t> </a:t>
-            </a:r>
-            <a:r>
-              <a:rPr lang="en-US" sz="3200" b="1" spc="100" dirty="0" smtClean="0">
-                <a:solidFill>
-                  <a:srgbClr val="FFC000"/>
-                </a:solidFill>
-                <a:effectLst>
-                  <a:outerShdw blurRad="38100" dist="38100" dir="2700000" algn="tl">
-                    <a:srgbClr val="000000">
-                      <a:alpha val="43137"/>
-                    </a:srgbClr>
-                  </a:outerShdw>
-                </a:effectLst>
-                <a:latin typeface="Times New Roman" pitchFamily="18" charset="0"/>
-                <a:cs typeface="Times New Roman" pitchFamily="18" charset="0"/>
-              </a:rPr>
-              <a:t>repository, Jenkins </a:t>
-            </a:r>
-            <a:r>
-              <a:rPr lang="en-US" sz="3200" b="1" spc="100" dirty="0" smtClean="0">
-                <a:solidFill>
-                  <a:srgbClr val="FFC000"/>
-                </a:solidFill>
-                <a:effectLst>
-                  <a:outerShdw blurRad="38100" dist="38100" dir="2700000" algn="tl">
-                    <a:srgbClr val="000000">
-                      <a:alpha val="43137"/>
-                    </a:srgbClr>
-                  </a:outerShdw>
-                </a:effectLst>
-                <a:latin typeface="Times New Roman" pitchFamily="18" charset="0"/>
-                <a:cs typeface="Times New Roman" pitchFamily="18" charset="0"/>
-              </a:rPr>
-              <a:t>and GCP </a:t>
-            </a:r>
-            <a:r>
-              <a:rPr lang="en-US" sz="3200" b="1" spc="100" dirty="0" smtClean="0">
-                <a:solidFill>
-                  <a:srgbClr val="FFC000"/>
-                </a:solidFill>
-                <a:effectLst>
-                  <a:outerShdw blurRad="38100" dist="38100" dir="2700000" algn="tl">
-                    <a:srgbClr val="000000">
-                      <a:alpha val="43137"/>
-                    </a:srgbClr>
-                  </a:outerShdw>
-                </a:effectLst>
-                <a:latin typeface="Times New Roman" pitchFamily="18" charset="0"/>
-                <a:cs typeface="Times New Roman" pitchFamily="18" charset="0"/>
-              </a:rPr>
-              <a:t>instance.</a:t>
-            </a:r>
-            <a:endParaRPr lang="en-US" sz="3200" b="1" spc="100" dirty="0" smtClean="0">
-              <a:solidFill>
-                <a:srgbClr val="FFC000"/>
-              </a:solidFill>
-              <a:effectLst>
-                <a:outerShdw blurRad="38100" dist="38100" dir="2700000" algn="tl">
-                  <a:srgbClr val="000000">
-                    <a:alpha val="43137"/>
-                  </a:srgbClr>
-                </a:outerShdw>
-              </a:effectLst>
-              <a:latin typeface="Times New Roman" pitchFamily="18" charset="0"/>
-              <a:cs typeface="Times New Roman" pitchFamily="18" charset="0"/>
-            </a:endParaRPr>
+              <a:t> repository, Jenkins and GCP instance.</a:t>
+            </a:r>
           </a:p>
           <a:p>
             <a:endParaRPr lang="en-US" sz="2800" b="1" dirty="0" smtClean="0">
@@ -6142,6 +6084,1385 @@
           <a:xfrm>
             <a:off x="304799" y="1676400"/>
             <a:ext cx="2447337" cy="5029200"/>
+          </a:xfrm>
+          <a:prstGeom prst="rect">
+            <a:avLst/>
+          </a:prstGeom>
+        </p:spPr>
+      </p:pic>
+    </p:spTree>
+  </p:cSld>
+  <p:clrMapOvr>
+    <a:masterClrMapping/>
+  </p:clrMapOvr>
+</p:sld>
+</file>
+
+<file path=ppt/slides/slide21.xml><?xml version="1.0" encoding="utf-8"?>
+<p:sld xmlns:a="http://schemas.openxmlformats.org/drawingml/2006/main" xmlns:r="http://schemas.openxmlformats.org/officeDocument/2006/relationships" xmlns:p="http://schemas.openxmlformats.org/presentationml/2006/main">
+  <p:cSld>
+    <p:spTree>
+      <p:nvGrpSpPr>
+        <p:cNvPr id="1" name=""/>
+        <p:cNvGrpSpPr/>
+        <p:nvPr/>
+      </p:nvGrpSpPr>
+      <p:grpSpPr>
+        <a:xfrm>
+          <a:off x="0" y="0"/>
+          <a:ext cx="0" cy="0"/>
+          <a:chOff x="0" y="0"/>
+          <a:chExt cx="0" cy="0"/>
+        </a:xfrm>
+      </p:grpSpPr>
+      <p:sp>
+        <p:nvSpPr>
+          <p:cNvPr id="2" name="Заголовок 1"/>
+          <p:cNvSpPr>
+            <a:spLocks noGrp="1"/>
+          </p:cNvSpPr>
+          <p:nvPr>
+            <p:ph type="title"/>
+          </p:nvPr>
+        </p:nvSpPr>
+        <p:spPr>
+          <a:xfrm>
+            <a:off x="457200" y="704088"/>
+            <a:ext cx="8229600" cy="819912"/>
+          </a:xfrm>
+        </p:spPr>
+        <p:txBody>
+          <a:bodyPr>
+            <a:normAutofit/>
+          </a:bodyPr>
+          <a:lstStyle/>
+          <a:p>
+            <a:pPr algn="ctr"/>
+            <a:r>
+              <a:rPr lang="en-US" sz="4500" dirty="0" err="1" smtClean="0"/>
+              <a:t>Docker</a:t>
+            </a:r>
+            <a:endParaRPr lang="en-US" sz="4500" dirty="0"/>
+          </a:p>
+        </p:txBody>
+      </p:sp>
+      <p:sp>
+        <p:nvSpPr>
+          <p:cNvPr id="3" name="Содержимое 2"/>
+          <p:cNvSpPr>
+            <a:spLocks noGrp="1"/>
+          </p:cNvSpPr>
+          <p:nvPr>
+            <p:ph idx="1"/>
+          </p:nvPr>
+        </p:nvSpPr>
+        <p:spPr>
+          <a:xfrm>
+            <a:off x="381000" y="1524000"/>
+            <a:ext cx="8229600" cy="4389120"/>
+          </a:xfrm>
+        </p:spPr>
+        <p:txBody>
+          <a:bodyPr>
+            <a:normAutofit/>
+          </a:bodyPr>
+          <a:lstStyle/>
+          <a:p>
+            <a:pPr algn="just"/>
+            <a:r>
+              <a:rPr lang="en-US" sz="2400" dirty="0" err="1" smtClean="0">
+                <a:latin typeface="Times New Roman" pitchFamily="18" charset="0"/>
+                <a:cs typeface="Times New Roman" pitchFamily="18" charset="0"/>
+              </a:rPr>
+              <a:t>Docker</a:t>
+            </a:r>
+            <a:r>
+              <a:rPr lang="en-US" sz="2400" dirty="0" smtClean="0">
+                <a:latin typeface="Times New Roman" pitchFamily="18" charset="0"/>
+                <a:cs typeface="Times New Roman" pitchFamily="18" charset="0"/>
+              </a:rPr>
+              <a:t> is a set of platform as a service (</a:t>
+            </a:r>
+            <a:r>
+              <a:rPr lang="en-US" sz="2400" dirty="0" err="1" smtClean="0">
+                <a:latin typeface="Times New Roman" pitchFamily="18" charset="0"/>
+                <a:cs typeface="Times New Roman" pitchFamily="18" charset="0"/>
+              </a:rPr>
+              <a:t>PaaS</a:t>
+            </a:r>
+            <a:r>
+              <a:rPr lang="en-US" sz="2400" dirty="0" smtClean="0">
+                <a:latin typeface="Times New Roman" pitchFamily="18" charset="0"/>
+                <a:cs typeface="Times New Roman" pitchFamily="18" charset="0"/>
+              </a:rPr>
+              <a:t>) products that use OS-level virtualization to deliver software in packages called containers. </a:t>
+            </a:r>
+          </a:p>
+          <a:p>
+            <a:pPr algn="just"/>
+            <a:r>
+              <a:rPr lang="en-US" sz="2400" dirty="0" smtClean="0">
+                <a:latin typeface="Times New Roman" pitchFamily="18" charset="0"/>
+                <a:cs typeface="Times New Roman" pitchFamily="18" charset="0"/>
+              </a:rPr>
+              <a:t>Containers are isolated from one another and bundle their own software, libraries and configuration files; they can communicate with each </a:t>
+            </a:r>
+            <a:r>
+              <a:rPr lang="en-US" sz="2400" dirty="0" smtClean="0">
+                <a:latin typeface="Times New Roman" pitchFamily="18" charset="0"/>
+                <a:cs typeface="Times New Roman" pitchFamily="18" charset="0"/>
+              </a:rPr>
+              <a:t>other </a:t>
+            </a:r>
+            <a:r>
+              <a:rPr lang="en-US" sz="2400" dirty="0" smtClean="0">
+                <a:latin typeface="Times New Roman" pitchFamily="18" charset="0"/>
+                <a:cs typeface="Times New Roman" pitchFamily="18" charset="0"/>
+              </a:rPr>
+              <a:t>through well-defined channels. Because all of the containers share the services of a single operating system kernel, they use fewer </a:t>
+            </a:r>
+            <a:r>
+              <a:rPr lang="en-US" sz="2400" dirty="0" smtClean="0">
+                <a:latin typeface="Times New Roman" pitchFamily="18" charset="0"/>
+                <a:cs typeface="Times New Roman" pitchFamily="18" charset="0"/>
+              </a:rPr>
+              <a:t>resources </a:t>
+            </a:r>
+            <a:r>
+              <a:rPr lang="en-US" sz="2400" dirty="0" smtClean="0">
+                <a:latin typeface="Times New Roman" pitchFamily="18" charset="0"/>
+                <a:cs typeface="Times New Roman" pitchFamily="18" charset="0"/>
+              </a:rPr>
+              <a:t>than virtual machines</a:t>
+            </a:r>
+            <a:r>
+              <a:rPr lang="en-US" sz="2400" dirty="0" smtClean="0">
+                <a:latin typeface="Times New Roman" pitchFamily="18" charset="0"/>
+                <a:cs typeface="Times New Roman" pitchFamily="18" charset="0"/>
+              </a:rPr>
+              <a:t>.</a:t>
+            </a:r>
+            <a:endParaRPr lang="en-US" sz="2400" dirty="0" smtClean="0">
+              <a:latin typeface="Times New Roman" pitchFamily="18" charset="0"/>
+              <a:cs typeface="Times New Roman" pitchFamily="18" charset="0"/>
+            </a:endParaRPr>
+          </a:p>
+          <a:p>
+            <a:pPr algn="just"/>
+            <a:r>
+              <a:rPr lang="en-US" sz="2400" dirty="0" smtClean="0">
+                <a:latin typeface="Times New Roman" pitchFamily="18" charset="0"/>
+                <a:cs typeface="Times New Roman" pitchFamily="18" charset="0"/>
+              </a:rPr>
+              <a:t>The service has both free and premium tiers. The software that hosts the containers is called </a:t>
+            </a:r>
+            <a:r>
+              <a:rPr lang="en-US" sz="2400" dirty="0" err="1" smtClean="0">
+                <a:latin typeface="Times New Roman" pitchFamily="18" charset="0"/>
+                <a:cs typeface="Times New Roman" pitchFamily="18" charset="0"/>
+              </a:rPr>
+              <a:t>Docker</a:t>
+            </a:r>
+            <a:r>
+              <a:rPr lang="en-US" sz="2400" dirty="0" smtClean="0">
+                <a:latin typeface="Times New Roman" pitchFamily="18" charset="0"/>
+                <a:cs typeface="Times New Roman" pitchFamily="18" charset="0"/>
+              </a:rPr>
+              <a:t> Engine.</a:t>
+            </a:r>
+            <a:endParaRPr lang="en-US" sz="2400" dirty="0">
+              <a:latin typeface="Times New Roman" pitchFamily="18" charset="0"/>
+              <a:cs typeface="Times New Roman" pitchFamily="18" charset="0"/>
+            </a:endParaRPr>
+          </a:p>
+        </p:txBody>
+      </p:sp>
+      <p:pic>
+        <p:nvPicPr>
+          <p:cNvPr id="4" name="Рисунок 3" descr="docker-logo.png"/>
+          <p:cNvPicPr>
+            <a:picLocks noChangeAspect="1"/>
+          </p:cNvPicPr>
+          <p:nvPr/>
+        </p:nvPicPr>
+        <p:blipFill>
+          <a:blip r:embed="rId2" cstate="print"/>
+          <a:stretch>
+            <a:fillRect/>
+          </a:stretch>
+        </p:blipFill>
+        <p:spPr>
+          <a:xfrm>
+            <a:off x="6324600" y="0"/>
+            <a:ext cx="1828800" cy="1562100"/>
+          </a:xfrm>
+          <a:prstGeom prst="rect">
+            <a:avLst/>
+          </a:prstGeom>
+        </p:spPr>
+      </p:pic>
+    </p:spTree>
+  </p:cSld>
+  <p:clrMapOvr>
+    <a:masterClrMapping/>
+  </p:clrMapOvr>
+</p:sld>
+</file>
+
+<file path=ppt/slides/slide22.xml><?xml version="1.0" encoding="utf-8"?>
+<p:sld xmlns:a="http://schemas.openxmlformats.org/drawingml/2006/main" xmlns:r="http://schemas.openxmlformats.org/officeDocument/2006/relationships" xmlns:p="http://schemas.openxmlformats.org/presentationml/2006/main">
+  <p:cSld>
+    <p:spTree>
+      <p:nvGrpSpPr>
+        <p:cNvPr id="1" name=""/>
+        <p:cNvGrpSpPr/>
+        <p:nvPr/>
+      </p:nvGrpSpPr>
+      <p:grpSpPr>
+        <a:xfrm>
+          <a:off x="0" y="0"/>
+          <a:ext cx="0" cy="0"/>
+          <a:chOff x="0" y="0"/>
+          <a:chExt cx="0" cy="0"/>
+        </a:xfrm>
+      </p:grpSpPr>
+      <p:sp>
+        <p:nvSpPr>
+          <p:cNvPr id="2" name="Заголовок 1"/>
+          <p:cNvSpPr>
+            <a:spLocks noGrp="1"/>
+          </p:cNvSpPr>
+          <p:nvPr>
+            <p:ph type="title"/>
+          </p:nvPr>
+        </p:nvSpPr>
+        <p:spPr>
+          <a:xfrm>
+            <a:off x="457200" y="704088"/>
+            <a:ext cx="8229600" cy="743712"/>
+          </a:xfrm>
+        </p:spPr>
+        <p:txBody>
+          <a:bodyPr>
+            <a:normAutofit/>
+          </a:bodyPr>
+          <a:lstStyle/>
+          <a:p>
+            <a:pPr algn="ctr"/>
+            <a:r>
+              <a:rPr lang="en-US" sz="4500" dirty="0" err="1" smtClean="0"/>
+              <a:t>Docker</a:t>
+            </a:r>
+            <a:endParaRPr lang="en-US" sz="4500" dirty="0"/>
+          </a:p>
+        </p:txBody>
+      </p:sp>
+      <p:sp>
+        <p:nvSpPr>
+          <p:cNvPr id="3" name="Содержимое 2"/>
+          <p:cNvSpPr>
+            <a:spLocks noGrp="1"/>
+          </p:cNvSpPr>
+          <p:nvPr>
+            <p:ph idx="1"/>
+          </p:nvPr>
+        </p:nvSpPr>
+        <p:spPr>
+          <a:xfrm>
+            <a:off x="381000" y="1524000"/>
+            <a:ext cx="8229600" cy="4389120"/>
+          </a:xfrm>
+        </p:spPr>
+        <p:txBody>
+          <a:bodyPr>
+            <a:normAutofit/>
+          </a:bodyPr>
+          <a:lstStyle/>
+          <a:p>
+            <a:pPr algn="just"/>
+            <a:r>
+              <a:rPr lang="en-US" sz="2400" dirty="0" smtClean="0">
+                <a:latin typeface="Times New Roman" pitchFamily="18" charset="0"/>
+                <a:cs typeface="Times New Roman" pitchFamily="18" charset="0"/>
+              </a:rPr>
+              <a:t>Add the following content to the </a:t>
+            </a:r>
+            <a:r>
+              <a:rPr lang="en-US" sz="2400" dirty="0" err="1" smtClean="0">
+                <a:latin typeface="Times New Roman" pitchFamily="18" charset="0"/>
+                <a:cs typeface="Times New Roman" pitchFamily="18" charset="0"/>
+              </a:rPr>
+              <a:t>Dockerfile</a:t>
+            </a:r>
+            <a:r>
+              <a:rPr lang="en-US" sz="2400" dirty="0" smtClean="0">
+                <a:latin typeface="Times New Roman" pitchFamily="18" charset="0"/>
+                <a:cs typeface="Times New Roman" pitchFamily="18" charset="0"/>
+              </a:rPr>
+              <a:t>.</a:t>
+            </a:r>
+            <a:endParaRPr lang="en-US" sz="2400" dirty="0">
+              <a:latin typeface="Times New Roman" pitchFamily="18" charset="0"/>
+              <a:cs typeface="Times New Roman" pitchFamily="18" charset="0"/>
+            </a:endParaRPr>
+          </a:p>
+        </p:txBody>
+      </p:sp>
+      <p:pic>
+        <p:nvPicPr>
+          <p:cNvPr id="4" name="Рисунок 3" descr="docker-logo.png"/>
+          <p:cNvPicPr>
+            <a:picLocks noChangeAspect="1"/>
+          </p:cNvPicPr>
+          <p:nvPr/>
+        </p:nvPicPr>
+        <p:blipFill>
+          <a:blip r:embed="rId2" cstate="print"/>
+          <a:stretch>
+            <a:fillRect/>
+          </a:stretch>
+        </p:blipFill>
+        <p:spPr>
+          <a:xfrm>
+            <a:off x="6324600" y="0"/>
+            <a:ext cx="1828800" cy="1562100"/>
+          </a:xfrm>
+          <a:prstGeom prst="rect">
+            <a:avLst/>
+          </a:prstGeom>
+        </p:spPr>
+      </p:pic>
+      <p:pic>
+        <p:nvPicPr>
+          <p:cNvPr id="5" name="Рисунок 4" descr="Dockerfile.png"/>
+          <p:cNvPicPr>
+            <a:picLocks noChangeAspect="1"/>
+          </p:cNvPicPr>
+          <p:nvPr/>
+        </p:nvPicPr>
+        <p:blipFill>
+          <a:blip r:embed="rId3" cstate="print"/>
+          <a:stretch>
+            <a:fillRect/>
+          </a:stretch>
+        </p:blipFill>
+        <p:spPr>
+          <a:xfrm>
+            <a:off x="1143000" y="1981200"/>
+            <a:ext cx="3886200" cy="3020582"/>
+          </a:xfrm>
+          <a:prstGeom prst="rect">
+            <a:avLst/>
+          </a:prstGeom>
+        </p:spPr>
+      </p:pic>
+      <p:sp>
+        <p:nvSpPr>
+          <p:cNvPr id="6" name="Прямоугольник 5"/>
+          <p:cNvSpPr/>
+          <p:nvPr/>
+        </p:nvSpPr>
+        <p:spPr>
+          <a:xfrm>
+            <a:off x="228600" y="5103674"/>
+            <a:ext cx="8458200" cy="830997"/>
+          </a:xfrm>
+          <a:prstGeom prst="rect">
+            <a:avLst/>
+          </a:prstGeom>
+        </p:spPr>
+        <p:txBody>
+          <a:bodyPr wrap="square">
+            <a:spAutoFit/>
+          </a:bodyPr>
+          <a:lstStyle/>
+          <a:p>
+            <a:pPr algn="just"/>
+            <a:r>
+              <a:rPr lang="en-US" sz="2400" dirty="0" smtClean="0">
+                <a:latin typeface="Times New Roman" pitchFamily="18" charset="0"/>
+                <a:cs typeface="Times New Roman" pitchFamily="18" charset="0"/>
+              </a:rPr>
+              <a:t>This </a:t>
+            </a:r>
+            <a:r>
+              <a:rPr lang="en-US" sz="2400" dirty="0" err="1" smtClean="0">
+                <a:latin typeface="Times New Roman" pitchFamily="18" charset="0"/>
+                <a:cs typeface="Times New Roman" pitchFamily="18" charset="0"/>
+              </a:rPr>
+              <a:t>Dockerfile</a:t>
+            </a:r>
+            <a:r>
+              <a:rPr lang="en-US" sz="2400" dirty="0" smtClean="0">
+                <a:latin typeface="Times New Roman" pitchFamily="18" charset="0"/>
+                <a:cs typeface="Times New Roman" pitchFamily="18" charset="0"/>
+              </a:rPr>
+              <a:t> starts with a Python 3 parent image. The parent image is modified by adding a new code directory. </a:t>
+            </a:r>
+            <a:endParaRPr lang="en-US" sz="2400" dirty="0">
+              <a:latin typeface="Times New Roman" pitchFamily="18" charset="0"/>
+              <a:cs typeface="Times New Roman" pitchFamily="18" charset="0"/>
+            </a:endParaRPr>
+          </a:p>
+        </p:txBody>
+      </p:sp>
+    </p:spTree>
+  </p:cSld>
+  <p:clrMapOvr>
+    <a:masterClrMapping/>
+  </p:clrMapOvr>
+</p:sld>
+</file>
+
+<file path=ppt/slides/slide23.xml><?xml version="1.0" encoding="utf-8"?>
+<p:sld xmlns:a="http://schemas.openxmlformats.org/drawingml/2006/main" xmlns:r="http://schemas.openxmlformats.org/officeDocument/2006/relationships" xmlns:p="http://schemas.openxmlformats.org/presentationml/2006/main">
+  <p:cSld>
+    <p:spTree>
+      <p:nvGrpSpPr>
+        <p:cNvPr id="1" name=""/>
+        <p:cNvGrpSpPr/>
+        <p:nvPr/>
+      </p:nvGrpSpPr>
+      <p:grpSpPr>
+        <a:xfrm>
+          <a:off x="0" y="0"/>
+          <a:ext cx="0" cy="0"/>
+          <a:chOff x="0" y="0"/>
+          <a:chExt cx="0" cy="0"/>
+        </a:xfrm>
+      </p:grpSpPr>
+      <p:sp>
+        <p:nvSpPr>
+          <p:cNvPr id="2" name="Заголовок 1"/>
+          <p:cNvSpPr>
+            <a:spLocks noGrp="1"/>
+          </p:cNvSpPr>
+          <p:nvPr>
+            <p:ph type="title"/>
+          </p:nvPr>
+        </p:nvSpPr>
+        <p:spPr>
+          <a:xfrm>
+            <a:off x="457200" y="704088"/>
+            <a:ext cx="8229600" cy="819912"/>
+          </a:xfrm>
+        </p:spPr>
+        <p:txBody>
+          <a:bodyPr>
+            <a:normAutofit/>
+          </a:bodyPr>
+          <a:lstStyle/>
+          <a:p>
+            <a:pPr algn="ctr"/>
+            <a:r>
+              <a:rPr lang="en-US" sz="4500" dirty="0" err="1" smtClean="0"/>
+              <a:t>Docker</a:t>
+            </a:r>
+            <a:endParaRPr lang="en-US" sz="4500" dirty="0"/>
+          </a:p>
+        </p:txBody>
+      </p:sp>
+      <p:sp>
+        <p:nvSpPr>
+          <p:cNvPr id="3" name="Содержимое 2"/>
+          <p:cNvSpPr>
+            <a:spLocks noGrp="1"/>
+          </p:cNvSpPr>
+          <p:nvPr>
+            <p:ph idx="1"/>
+          </p:nvPr>
+        </p:nvSpPr>
+        <p:spPr>
+          <a:xfrm>
+            <a:off x="381000" y="1524000"/>
+            <a:ext cx="8229600" cy="4953000"/>
+          </a:xfrm>
+        </p:spPr>
+        <p:txBody>
+          <a:bodyPr>
+            <a:normAutofit/>
+          </a:bodyPr>
+          <a:lstStyle/>
+          <a:p>
+            <a:pPr algn="just"/>
+            <a:r>
+              <a:rPr lang="en-US" sz="1800" dirty="0" smtClean="0">
+                <a:latin typeface="Times New Roman" pitchFamily="18" charset="0"/>
+                <a:cs typeface="Times New Roman" pitchFamily="18" charset="0"/>
+              </a:rPr>
+              <a:t>The </a:t>
+            </a:r>
+            <a:r>
+              <a:rPr lang="en-US" sz="1800" dirty="0" smtClean="0">
+                <a:latin typeface="Times New Roman" pitchFamily="18" charset="0"/>
+                <a:cs typeface="Times New Roman" pitchFamily="18" charset="0"/>
+              </a:rPr>
+              <a:t>parent image is further modified by installing the Python requirements defined in the requirements.txt file.</a:t>
+            </a:r>
+            <a:endParaRPr lang="en-US" sz="1800" dirty="0">
+              <a:latin typeface="Times New Roman" pitchFamily="18" charset="0"/>
+              <a:cs typeface="Times New Roman" pitchFamily="18" charset="0"/>
+            </a:endParaRPr>
+          </a:p>
+        </p:txBody>
+      </p:sp>
+      <p:pic>
+        <p:nvPicPr>
+          <p:cNvPr id="4" name="Рисунок 3" descr="docker-logo.png"/>
+          <p:cNvPicPr>
+            <a:picLocks noChangeAspect="1"/>
+          </p:cNvPicPr>
+          <p:nvPr/>
+        </p:nvPicPr>
+        <p:blipFill>
+          <a:blip r:embed="rId2" cstate="print"/>
+          <a:stretch>
+            <a:fillRect/>
+          </a:stretch>
+        </p:blipFill>
+        <p:spPr>
+          <a:xfrm>
+            <a:off x="6324600" y="0"/>
+            <a:ext cx="1828800" cy="1562100"/>
+          </a:xfrm>
+          <a:prstGeom prst="rect">
+            <a:avLst/>
+          </a:prstGeom>
+        </p:spPr>
+      </p:pic>
+      <p:pic>
+        <p:nvPicPr>
+          <p:cNvPr id="7" name="Рисунок 6" descr="requiremets.png"/>
+          <p:cNvPicPr>
+            <a:picLocks noChangeAspect="1"/>
+          </p:cNvPicPr>
+          <p:nvPr/>
+        </p:nvPicPr>
+        <p:blipFill>
+          <a:blip r:embed="rId3" cstate="print"/>
+          <a:stretch>
+            <a:fillRect/>
+          </a:stretch>
+        </p:blipFill>
+        <p:spPr>
+          <a:xfrm>
+            <a:off x="609600" y="2209800"/>
+            <a:ext cx="4871013" cy="1231392"/>
+          </a:xfrm>
+          <a:prstGeom prst="rect">
+            <a:avLst/>
+          </a:prstGeom>
+        </p:spPr>
+      </p:pic>
+      <p:sp>
+        <p:nvSpPr>
+          <p:cNvPr id="8" name="Прямоугольник 7"/>
+          <p:cNvSpPr/>
+          <p:nvPr/>
+        </p:nvSpPr>
+        <p:spPr>
+          <a:xfrm>
+            <a:off x="0" y="3429000"/>
+            <a:ext cx="4572000" cy="2308324"/>
+          </a:xfrm>
+          <a:prstGeom prst="rect">
+            <a:avLst/>
+          </a:prstGeom>
+        </p:spPr>
+        <p:txBody>
+          <a:bodyPr>
+            <a:spAutoFit/>
+          </a:bodyPr>
+          <a:lstStyle/>
+          <a:p>
+            <a:pPr algn="just"/>
+            <a:r>
+              <a:rPr lang="en-US" dirty="0" smtClean="0">
+                <a:latin typeface="Times New Roman" pitchFamily="18" charset="0"/>
+                <a:cs typeface="Times New Roman" pitchFamily="18" charset="0"/>
+              </a:rPr>
+              <a:t>The docker-compose.yml file describes the services that make our app. In this example those service is a web server. </a:t>
+            </a:r>
+          </a:p>
+          <a:p>
+            <a:pPr algn="just"/>
+            <a:r>
+              <a:rPr lang="en-US" dirty="0" smtClean="0">
+                <a:latin typeface="Times New Roman" pitchFamily="18" charset="0"/>
+                <a:cs typeface="Times New Roman" pitchFamily="18" charset="0"/>
+              </a:rPr>
+              <a:t>The compose file also describes which </a:t>
+            </a:r>
+            <a:r>
+              <a:rPr lang="en-US" dirty="0" err="1" smtClean="0">
+                <a:latin typeface="Times New Roman" pitchFamily="18" charset="0"/>
+                <a:cs typeface="Times New Roman" pitchFamily="18" charset="0"/>
+              </a:rPr>
+              <a:t>Docker</a:t>
+            </a:r>
+            <a:r>
+              <a:rPr lang="en-US" dirty="0" smtClean="0">
+                <a:latin typeface="Times New Roman" pitchFamily="18" charset="0"/>
+                <a:cs typeface="Times New Roman" pitchFamily="18" charset="0"/>
+              </a:rPr>
+              <a:t> image this service use, which volume need to be mounted inside the container. </a:t>
+            </a:r>
+          </a:p>
+          <a:p>
+            <a:pPr algn="just"/>
+            <a:r>
+              <a:rPr lang="en-US" dirty="0" smtClean="0">
+                <a:latin typeface="Times New Roman" pitchFamily="18" charset="0"/>
+                <a:cs typeface="Times New Roman" pitchFamily="18" charset="0"/>
+              </a:rPr>
+              <a:t>Finally, the docker-compose.yml file describes which ports this service expose.</a:t>
+            </a:r>
+            <a:endParaRPr lang="en-US" dirty="0">
+              <a:latin typeface="Times New Roman" pitchFamily="18" charset="0"/>
+              <a:cs typeface="Times New Roman" pitchFamily="18" charset="0"/>
+            </a:endParaRPr>
+          </a:p>
+        </p:txBody>
+      </p:sp>
+      <p:pic>
+        <p:nvPicPr>
+          <p:cNvPr id="9" name="Рисунок 8" descr="docker-compose.png"/>
+          <p:cNvPicPr>
+            <a:picLocks noChangeAspect="1"/>
+          </p:cNvPicPr>
+          <p:nvPr/>
+        </p:nvPicPr>
+        <p:blipFill>
+          <a:blip r:embed="rId4" cstate="print"/>
+          <a:stretch>
+            <a:fillRect/>
+          </a:stretch>
+        </p:blipFill>
+        <p:spPr>
+          <a:xfrm>
+            <a:off x="4572000" y="3048000"/>
+            <a:ext cx="4415632" cy="2895600"/>
+          </a:xfrm>
+          <a:prstGeom prst="rect">
+            <a:avLst/>
+          </a:prstGeom>
+        </p:spPr>
+      </p:pic>
+    </p:spTree>
+  </p:cSld>
+  <p:clrMapOvr>
+    <a:masterClrMapping/>
+  </p:clrMapOvr>
+</p:sld>
+</file>
+
+<file path=ppt/slides/slide24.xml><?xml version="1.0" encoding="utf-8"?>
+<p:sld xmlns:a="http://schemas.openxmlformats.org/drawingml/2006/main" xmlns:r="http://schemas.openxmlformats.org/officeDocument/2006/relationships" xmlns:p="http://schemas.openxmlformats.org/presentationml/2006/main">
+  <p:cSld>
+    <p:spTree>
+      <p:nvGrpSpPr>
+        <p:cNvPr id="1" name=""/>
+        <p:cNvGrpSpPr/>
+        <p:nvPr/>
+      </p:nvGrpSpPr>
+      <p:grpSpPr>
+        <a:xfrm>
+          <a:off x="0" y="0"/>
+          <a:ext cx="0" cy="0"/>
+          <a:chOff x="0" y="0"/>
+          <a:chExt cx="0" cy="0"/>
+        </a:xfrm>
+      </p:grpSpPr>
+      <p:sp>
+        <p:nvSpPr>
+          <p:cNvPr id="2" name="Заголовок 1"/>
+          <p:cNvSpPr>
+            <a:spLocks noGrp="1"/>
+          </p:cNvSpPr>
+          <p:nvPr>
+            <p:ph type="title"/>
+          </p:nvPr>
+        </p:nvSpPr>
+        <p:spPr>
+          <a:xfrm>
+            <a:off x="457200" y="704088"/>
+            <a:ext cx="8229600" cy="743712"/>
+          </a:xfrm>
+        </p:spPr>
+        <p:txBody>
+          <a:bodyPr>
+            <a:normAutofit/>
+          </a:bodyPr>
+          <a:lstStyle/>
+          <a:p>
+            <a:pPr algn="ctr"/>
+            <a:r>
+              <a:rPr lang="en-US" sz="4500" dirty="0" err="1" smtClean="0"/>
+              <a:t>Docker</a:t>
+            </a:r>
+            <a:endParaRPr lang="en-US" sz="4500" dirty="0"/>
+          </a:p>
+        </p:txBody>
+      </p:sp>
+      <p:sp>
+        <p:nvSpPr>
+          <p:cNvPr id="3" name="Содержимое 2"/>
+          <p:cNvSpPr>
+            <a:spLocks noGrp="1"/>
+          </p:cNvSpPr>
+          <p:nvPr>
+            <p:ph idx="1"/>
+          </p:nvPr>
+        </p:nvSpPr>
+        <p:spPr>
+          <a:xfrm>
+            <a:off x="381000" y="1524000"/>
+            <a:ext cx="8229600" cy="4953000"/>
+          </a:xfrm>
+        </p:spPr>
+        <p:txBody>
+          <a:bodyPr>
+            <a:normAutofit/>
+          </a:bodyPr>
+          <a:lstStyle/>
+          <a:p>
+            <a:pPr algn="just">
+              <a:buNone/>
+            </a:pPr>
+            <a:r>
+              <a:rPr lang="en-US" sz="2400" dirty="0" smtClean="0">
+                <a:latin typeface="Times New Roman" pitchFamily="18" charset="0"/>
+                <a:cs typeface="Times New Roman" pitchFamily="18" charset="0"/>
+              </a:rPr>
+              <a:t>   We create </a:t>
+            </a:r>
+            <a:r>
+              <a:rPr lang="en-US" sz="2400" dirty="0" smtClean="0">
+                <a:latin typeface="Times New Roman" pitchFamily="18" charset="0"/>
+                <a:cs typeface="Times New Roman" pitchFamily="18" charset="0"/>
+              </a:rPr>
+              <a:t>the </a:t>
+            </a:r>
+            <a:r>
+              <a:rPr lang="en-US" sz="2400" dirty="0" err="1" smtClean="0">
+                <a:latin typeface="Times New Roman" pitchFamily="18" charset="0"/>
+                <a:cs typeface="Times New Roman" pitchFamily="18" charset="0"/>
+              </a:rPr>
+              <a:t>Django</a:t>
+            </a:r>
+            <a:r>
+              <a:rPr lang="en-US" sz="2400" dirty="0" smtClean="0">
+                <a:latin typeface="Times New Roman" pitchFamily="18" charset="0"/>
+                <a:cs typeface="Times New Roman" pitchFamily="18" charset="0"/>
+              </a:rPr>
+              <a:t> project by running the </a:t>
+            </a:r>
+            <a:r>
+              <a:rPr lang="en-US" sz="2400" dirty="0" err="1" smtClean="0">
+                <a:latin typeface="Times New Roman" pitchFamily="18" charset="0"/>
+                <a:cs typeface="Times New Roman" pitchFamily="18" charset="0"/>
+              </a:rPr>
+              <a:t>docker</a:t>
+            </a:r>
+            <a:r>
+              <a:rPr lang="en-US" sz="2400" dirty="0" smtClean="0">
+                <a:latin typeface="Times New Roman" pitchFamily="18" charset="0"/>
+                <a:cs typeface="Times New Roman" pitchFamily="18" charset="0"/>
+              </a:rPr>
+              <a:t>-compose run command as follows</a:t>
+            </a:r>
+            <a:r>
+              <a:rPr lang="en-US" sz="1800" dirty="0" smtClean="0">
+                <a:latin typeface="Times New Roman" pitchFamily="18" charset="0"/>
+                <a:cs typeface="Times New Roman" pitchFamily="18" charset="0"/>
+              </a:rPr>
+              <a:t>.</a:t>
+            </a:r>
+          </a:p>
+        </p:txBody>
+      </p:sp>
+      <p:pic>
+        <p:nvPicPr>
+          <p:cNvPr id="4" name="Рисунок 3" descr="docker-logo.png"/>
+          <p:cNvPicPr>
+            <a:picLocks noChangeAspect="1"/>
+          </p:cNvPicPr>
+          <p:nvPr/>
+        </p:nvPicPr>
+        <p:blipFill>
+          <a:blip r:embed="rId2" cstate="print"/>
+          <a:stretch>
+            <a:fillRect/>
+          </a:stretch>
+        </p:blipFill>
+        <p:spPr>
+          <a:xfrm>
+            <a:off x="6324600" y="0"/>
+            <a:ext cx="1828800" cy="1562100"/>
+          </a:xfrm>
+          <a:prstGeom prst="rect">
+            <a:avLst/>
+          </a:prstGeom>
+        </p:spPr>
+      </p:pic>
+      <p:pic>
+        <p:nvPicPr>
+          <p:cNvPr id="10" name="Рисунок 9" descr="1.png"/>
+          <p:cNvPicPr>
+            <a:picLocks noChangeAspect="1"/>
+          </p:cNvPicPr>
+          <p:nvPr/>
+        </p:nvPicPr>
+        <p:blipFill>
+          <a:blip r:embed="rId3" cstate="print"/>
+          <a:stretch>
+            <a:fillRect/>
+          </a:stretch>
+        </p:blipFill>
+        <p:spPr>
+          <a:xfrm>
+            <a:off x="990600" y="2438399"/>
+            <a:ext cx="6934200" cy="3815971"/>
+          </a:xfrm>
+          <a:prstGeom prst="rect">
+            <a:avLst/>
+          </a:prstGeom>
+        </p:spPr>
+      </p:pic>
+    </p:spTree>
+  </p:cSld>
+  <p:clrMapOvr>
+    <a:masterClrMapping/>
+  </p:clrMapOvr>
+</p:sld>
+</file>
+
+<file path=ppt/slides/slide25.xml><?xml version="1.0" encoding="utf-8"?>
+<p:sld xmlns:a="http://schemas.openxmlformats.org/drawingml/2006/main" xmlns:r="http://schemas.openxmlformats.org/officeDocument/2006/relationships" xmlns:p="http://schemas.openxmlformats.org/presentationml/2006/main">
+  <p:cSld>
+    <p:spTree>
+      <p:nvGrpSpPr>
+        <p:cNvPr id="1" name=""/>
+        <p:cNvGrpSpPr/>
+        <p:nvPr/>
+      </p:nvGrpSpPr>
+      <p:grpSpPr>
+        <a:xfrm>
+          <a:off x="0" y="0"/>
+          <a:ext cx="0" cy="0"/>
+          <a:chOff x="0" y="0"/>
+          <a:chExt cx="0" cy="0"/>
+        </a:xfrm>
+      </p:grpSpPr>
+      <p:sp>
+        <p:nvSpPr>
+          <p:cNvPr id="2" name="Заголовок 1"/>
+          <p:cNvSpPr>
+            <a:spLocks noGrp="1"/>
+          </p:cNvSpPr>
+          <p:nvPr>
+            <p:ph type="title"/>
+          </p:nvPr>
+        </p:nvSpPr>
+        <p:spPr>
+          <a:xfrm>
+            <a:off x="457200" y="704088"/>
+            <a:ext cx="8229600" cy="743712"/>
+          </a:xfrm>
+        </p:spPr>
+        <p:txBody>
+          <a:bodyPr>
+            <a:normAutofit/>
+          </a:bodyPr>
+          <a:lstStyle/>
+          <a:p>
+            <a:pPr algn="ctr"/>
+            <a:r>
+              <a:rPr lang="en-US" sz="4500" dirty="0" err="1" smtClean="0"/>
+              <a:t>Docker</a:t>
+            </a:r>
+            <a:endParaRPr lang="en-US" sz="4500" dirty="0"/>
+          </a:p>
+        </p:txBody>
+      </p:sp>
+      <p:sp>
+        <p:nvSpPr>
+          <p:cNvPr id="3" name="Содержимое 2"/>
+          <p:cNvSpPr>
+            <a:spLocks noGrp="1"/>
+          </p:cNvSpPr>
+          <p:nvPr>
+            <p:ph idx="1"/>
+          </p:nvPr>
+        </p:nvSpPr>
+        <p:spPr>
+          <a:xfrm>
+            <a:off x="381000" y="1524000"/>
+            <a:ext cx="8229600" cy="4953000"/>
+          </a:xfrm>
+        </p:spPr>
+        <p:txBody>
+          <a:bodyPr>
+            <a:normAutofit/>
+          </a:bodyPr>
+          <a:lstStyle/>
+          <a:p>
+            <a:pPr algn="just">
+              <a:buNone/>
+            </a:pPr>
+            <a:r>
+              <a:rPr lang="en-US" sz="2400" dirty="0" smtClean="0">
+                <a:latin typeface="Times New Roman" pitchFamily="18" charset="0"/>
+                <a:cs typeface="Times New Roman" pitchFamily="18" charset="0"/>
+              </a:rPr>
+              <a:t> Change the ownership of the new files.</a:t>
+            </a:r>
+          </a:p>
+          <a:p>
+            <a:pPr algn="just">
+              <a:buNone/>
+            </a:pPr>
+            <a:r>
+              <a:rPr lang="en-US" sz="2400" dirty="0" smtClean="0">
+                <a:latin typeface="Times New Roman" pitchFamily="18" charset="0"/>
+                <a:cs typeface="Times New Roman" pitchFamily="18" charset="0"/>
+              </a:rPr>
+              <a:t> </a:t>
+            </a:r>
+            <a:r>
+              <a:rPr lang="en-US" sz="2400" dirty="0" err="1" smtClean="0">
+                <a:latin typeface="Times New Roman" pitchFamily="18" charset="0"/>
+                <a:cs typeface="Times New Roman" pitchFamily="18" charset="0"/>
+              </a:rPr>
+              <a:t>sudo</a:t>
+            </a:r>
+            <a:r>
+              <a:rPr lang="en-US" sz="2400" dirty="0" smtClean="0">
+                <a:latin typeface="Times New Roman" pitchFamily="18" charset="0"/>
+                <a:cs typeface="Times New Roman" pitchFamily="18" charset="0"/>
+              </a:rPr>
+              <a:t> </a:t>
+            </a:r>
+            <a:r>
+              <a:rPr lang="en-US" sz="2400" dirty="0" err="1" smtClean="0">
+                <a:latin typeface="Times New Roman" pitchFamily="18" charset="0"/>
+                <a:cs typeface="Times New Roman" pitchFamily="18" charset="0"/>
+              </a:rPr>
+              <a:t>chown</a:t>
+            </a:r>
+            <a:r>
+              <a:rPr lang="en-US" sz="2400" dirty="0" smtClean="0">
+                <a:latin typeface="Times New Roman" pitchFamily="18" charset="0"/>
+                <a:cs typeface="Times New Roman" pitchFamily="18" charset="0"/>
+              </a:rPr>
+              <a:t> -R $USER:$USER </a:t>
+            </a:r>
+            <a:r>
+              <a:rPr lang="en-US" sz="2400" dirty="0" smtClean="0">
+                <a:latin typeface="Times New Roman" pitchFamily="18" charset="0"/>
+                <a:cs typeface="Times New Roman" pitchFamily="18" charset="0"/>
+              </a:rPr>
+              <a:t>.</a:t>
+            </a:r>
+          </a:p>
+          <a:p>
+            <a:pPr algn="just">
+              <a:buNone/>
+            </a:pPr>
+            <a:endParaRPr lang="en-US" sz="1800" dirty="0" smtClean="0">
+              <a:latin typeface="Times New Roman" pitchFamily="18" charset="0"/>
+              <a:cs typeface="Times New Roman" pitchFamily="18" charset="0"/>
+            </a:endParaRPr>
+          </a:p>
+          <a:p>
+            <a:pPr marL="0" indent="0" algn="just">
+              <a:buNone/>
+            </a:pPr>
+            <a:r>
+              <a:rPr lang="en-US" sz="2400" dirty="0" smtClean="0">
+                <a:latin typeface="Times New Roman" pitchFamily="18" charset="0"/>
+                <a:cs typeface="Times New Roman" pitchFamily="18" charset="0"/>
+              </a:rPr>
+              <a:t>Run </a:t>
+            </a:r>
+            <a:r>
+              <a:rPr lang="en-US" sz="2400" dirty="0" smtClean="0">
+                <a:latin typeface="Times New Roman" pitchFamily="18" charset="0"/>
+                <a:cs typeface="Times New Roman" pitchFamily="18" charset="0"/>
+              </a:rPr>
+              <a:t>the </a:t>
+            </a:r>
+            <a:r>
+              <a:rPr lang="en-US" sz="2400" dirty="0" err="1" smtClean="0">
+                <a:latin typeface="Times New Roman" pitchFamily="18" charset="0"/>
+                <a:cs typeface="Times New Roman" pitchFamily="18" charset="0"/>
+              </a:rPr>
+              <a:t>docker</a:t>
+            </a:r>
+            <a:r>
+              <a:rPr lang="en-US" sz="2400" dirty="0" smtClean="0">
+                <a:latin typeface="Times New Roman" pitchFamily="18" charset="0"/>
+                <a:cs typeface="Times New Roman" pitchFamily="18" charset="0"/>
+              </a:rPr>
+              <a:t>-compose up command from the top </a:t>
+            </a:r>
+            <a:r>
+              <a:rPr lang="en-US" sz="2400" dirty="0" smtClean="0">
+                <a:latin typeface="Times New Roman" pitchFamily="18" charset="0"/>
+                <a:cs typeface="Times New Roman" pitchFamily="18" charset="0"/>
+              </a:rPr>
+              <a:t>level directory </a:t>
+            </a:r>
+            <a:r>
+              <a:rPr lang="en-US" sz="2400" dirty="0" smtClean="0">
+                <a:latin typeface="Times New Roman" pitchFamily="18" charset="0"/>
+                <a:cs typeface="Times New Roman" pitchFamily="18" charset="0"/>
+              </a:rPr>
+              <a:t>for your project.</a:t>
+            </a:r>
+          </a:p>
+          <a:p>
+            <a:pPr algn="just">
+              <a:buNone/>
+            </a:pPr>
+            <a:r>
+              <a:rPr lang="en-US" sz="2400" dirty="0" err="1" smtClean="0">
+                <a:latin typeface="Times New Roman" pitchFamily="18" charset="0"/>
+                <a:cs typeface="Times New Roman" pitchFamily="18" charset="0"/>
+              </a:rPr>
+              <a:t>docker</a:t>
+            </a:r>
+            <a:r>
+              <a:rPr lang="en-US" sz="2400" dirty="0" smtClean="0">
+                <a:latin typeface="Times New Roman" pitchFamily="18" charset="0"/>
+                <a:cs typeface="Times New Roman" pitchFamily="18" charset="0"/>
+              </a:rPr>
+              <a:t>-compose up -d</a:t>
+            </a:r>
+          </a:p>
+          <a:p>
+            <a:pPr algn="just">
+              <a:buNone/>
+            </a:pPr>
+            <a:endParaRPr lang="en-US" sz="2400" dirty="0" smtClean="0">
+              <a:latin typeface="Times New Roman" pitchFamily="18" charset="0"/>
+              <a:cs typeface="Times New Roman" pitchFamily="18" charset="0"/>
+            </a:endParaRPr>
+          </a:p>
+        </p:txBody>
+      </p:sp>
+      <p:pic>
+        <p:nvPicPr>
+          <p:cNvPr id="4" name="Рисунок 3" descr="docker-logo.png"/>
+          <p:cNvPicPr>
+            <a:picLocks noChangeAspect="1"/>
+          </p:cNvPicPr>
+          <p:nvPr/>
+        </p:nvPicPr>
+        <p:blipFill>
+          <a:blip r:embed="rId2" cstate="print"/>
+          <a:stretch>
+            <a:fillRect/>
+          </a:stretch>
+        </p:blipFill>
+        <p:spPr>
+          <a:xfrm>
+            <a:off x="6324600" y="0"/>
+            <a:ext cx="1828800" cy="1562100"/>
+          </a:xfrm>
+          <a:prstGeom prst="rect">
+            <a:avLst/>
+          </a:prstGeom>
+        </p:spPr>
+      </p:pic>
+      <p:pic>
+        <p:nvPicPr>
+          <p:cNvPr id="6" name="Рисунок 5" descr="2.png"/>
+          <p:cNvPicPr>
+            <a:picLocks noChangeAspect="1"/>
+          </p:cNvPicPr>
+          <p:nvPr/>
+        </p:nvPicPr>
+        <p:blipFill>
+          <a:blip r:embed="rId3" cstate="print"/>
+          <a:stretch>
+            <a:fillRect/>
+          </a:stretch>
+        </p:blipFill>
+        <p:spPr>
+          <a:xfrm>
+            <a:off x="914400" y="4114800"/>
+            <a:ext cx="7315200" cy="1763086"/>
+          </a:xfrm>
+          <a:prstGeom prst="rect">
+            <a:avLst/>
+          </a:prstGeom>
+        </p:spPr>
+      </p:pic>
+    </p:spTree>
+  </p:cSld>
+  <p:clrMapOvr>
+    <a:masterClrMapping/>
+  </p:clrMapOvr>
+</p:sld>
+</file>
+
+<file path=ppt/slides/slide26.xml><?xml version="1.0" encoding="utf-8"?>
+<p:sld xmlns:a="http://schemas.openxmlformats.org/drawingml/2006/main" xmlns:r="http://schemas.openxmlformats.org/officeDocument/2006/relationships" xmlns:p="http://schemas.openxmlformats.org/presentationml/2006/main">
+  <p:cSld>
+    <p:spTree>
+      <p:nvGrpSpPr>
+        <p:cNvPr id="1" name=""/>
+        <p:cNvGrpSpPr/>
+        <p:nvPr/>
+      </p:nvGrpSpPr>
+      <p:grpSpPr>
+        <a:xfrm>
+          <a:off x="0" y="0"/>
+          <a:ext cx="0" cy="0"/>
+          <a:chOff x="0" y="0"/>
+          <a:chExt cx="0" cy="0"/>
+        </a:xfrm>
+      </p:grpSpPr>
+      <p:sp>
+        <p:nvSpPr>
+          <p:cNvPr id="2" name="Заголовок 1"/>
+          <p:cNvSpPr>
+            <a:spLocks noGrp="1"/>
+          </p:cNvSpPr>
+          <p:nvPr>
+            <p:ph type="title"/>
+          </p:nvPr>
+        </p:nvSpPr>
+        <p:spPr>
+          <a:xfrm>
+            <a:off x="457200" y="457200"/>
+            <a:ext cx="8229600" cy="743712"/>
+          </a:xfrm>
+        </p:spPr>
+        <p:txBody>
+          <a:bodyPr>
+            <a:normAutofit/>
+          </a:bodyPr>
+          <a:lstStyle/>
+          <a:p>
+            <a:pPr algn="ctr"/>
+            <a:r>
+              <a:rPr lang="en-US" sz="4500" dirty="0" smtClean="0"/>
+              <a:t>GCR.IO</a:t>
+            </a:r>
+            <a:endParaRPr lang="en-US" sz="4500" dirty="0"/>
+          </a:p>
+        </p:txBody>
+      </p:sp>
+      <p:pic>
+        <p:nvPicPr>
+          <p:cNvPr id="7" name="Содержимое 6" descr="gcp-container-registry-icon.png"/>
+          <p:cNvPicPr>
+            <a:picLocks noGrp="1" noChangeAspect="1"/>
+          </p:cNvPicPr>
+          <p:nvPr>
+            <p:ph idx="1"/>
+          </p:nvPr>
+        </p:nvPicPr>
+        <p:blipFill>
+          <a:blip r:embed="rId2" cstate="print"/>
+          <a:stretch>
+            <a:fillRect/>
+          </a:stretch>
+        </p:blipFill>
+        <p:spPr>
+          <a:xfrm>
+            <a:off x="6934200" y="0"/>
+            <a:ext cx="1264920" cy="1264920"/>
+          </a:xfrm>
+        </p:spPr>
+      </p:pic>
+      <p:sp>
+        <p:nvSpPr>
+          <p:cNvPr id="8" name="Прямоугольник 7"/>
+          <p:cNvSpPr/>
+          <p:nvPr/>
+        </p:nvSpPr>
+        <p:spPr>
+          <a:xfrm>
+            <a:off x="304800" y="1143000"/>
+            <a:ext cx="8686800" cy="1569660"/>
+          </a:xfrm>
+          <a:prstGeom prst="rect">
+            <a:avLst/>
+          </a:prstGeom>
+        </p:spPr>
+        <p:txBody>
+          <a:bodyPr wrap="square">
+            <a:spAutoFit/>
+          </a:bodyPr>
+          <a:lstStyle/>
+          <a:p>
+            <a:pPr algn="just"/>
+            <a:r>
+              <a:rPr lang="en-US" sz="2400" dirty="0" smtClean="0">
+                <a:latin typeface="Times New Roman" pitchFamily="18" charset="0"/>
+                <a:cs typeface="Times New Roman" pitchFamily="18" charset="0"/>
+              </a:rPr>
+              <a:t>Container Registry is a single place for your team to manage </a:t>
+            </a:r>
+            <a:r>
+              <a:rPr lang="en-US" sz="2400" dirty="0" err="1" smtClean="0">
+                <a:latin typeface="Times New Roman" pitchFamily="18" charset="0"/>
+                <a:cs typeface="Times New Roman" pitchFamily="18" charset="0"/>
+              </a:rPr>
+              <a:t>Docker</a:t>
+            </a:r>
+            <a:r>
+              <a:rPr lang="en-US" sz="2400" dirty="0" smtClean="0">
+                <a:latin typeface="Times New Roman" pitchFamily="18" charset="0"/>
+                <a:cs typeface="Times New Roman" pitchFamily="18" charset="0"/>
+              </a:rPr>
+              <a:t> images, perform vulnerability analysis, and decide who can access what with fine-grained access control. Existing CI/CD integrations let you set up fully automated </a:t>
+            </a:r>
+            <a:r>
+              <a:rPr lang="en-US" sz="2400" dirty="0" err="1" smtClean="0">
+                <a:latin typeface="Times New Roman" pitchFamily="18" charset="0"/>
+                <a:cs typeface="Times New Roman" pitchFamily="18" charset="0"/>
+              </a:rPr>
+              <a:t>Docker</a:t>
+            </a:r>
+            <a:r>
+              <a:rPr lang="en-US" sz="2400" dirty="0" smtClean="0">
+                <a:latin typeface="Times New Roman" pitchFamily="18" charset="0"/>
+                <a:cs typeface="Times New Roman" pitchFamily="18" charset="0"/>
+              </a:rPr>
+              <a:t> pipelines to get fast feedback.</a:t>
+            </a:r>
+            <a:endParaRPr lang="en-US" sz="2400" dirty="0">
+              <a:latin typeface="Times New Roman" pitchFamily="18" charset="0"/>
+              <a:cs typeface="Times New Roman" pitchFamily="18" charset="0"/>
+            </a:endParaRPr>
+          </a:p>
+        </p:txBody>
+      </p:sp>
+      <p:pic>
+        <p:nvPicPr>
+          <p:cNvPr id="10" name="Рисунок 9" descr="push-image.png"/>
+          <p:cNvPicPr>
+            <a:picLocks noChangeAspect="1"/>
+          </p:cNvPicPr>
+          <p:nvPr/>
+        </p:nvPicPr>
+        <p:blipFill>
+          <a:blip r:embed="rId3" cstate="print"/>
+          <a:stretch>
+            <a:fillRect/>
+          </a:stretch>
+        </p:blipFill>
+        <p:spPr>
+          <a:xfrm>
+            <a:off x="914400" y="2667000"/>
+            <a:ext cx="6019800" cy="4067760"/>
+          </a:xfrm>
+          <a:prstGeom prst="rect">
+            <a:avLst/>
+          </a:prstGeom>
+        </p:spPr>
+      </p:pic>
+    </p:spTree>
+  </p:cSld>
+  <p:clrMapOvr>
+    <a:masterClrMapping/>
+  </p:clrMapOvr>
+</p:sld>
+</file>
+
+<file path=ppt/slides/slide27.xml><?xml version="1.0" encoding="utf-8"?>
+<p:sld xmlns:a="http://schemas.openxmlformats.org/drawingml/2006/main" xmlns:r="http://schemas.openxmlformats.org/officeDocument/2006/relationships" xmlns:p="http://schemas.openxmlformats.org/presentationml/2006/main">
+  <p:cSld>
+    <p:spTree>
+      <p:nvGrpSpPr>
+        <p:cNvPr id="1" name=""/>
+        <p:cNvGrpSpPr/>
+        <p:nvPr/>
+      </p:nvGrpSpPr>
+      <p:grpSpPr>
+        <a:xfrm>
+          <a:off x="0" y="0"/>
+          <a:ext cx="0" cy="0"/>
+          <a:chOff x="0" y="0"/>
+          <a:chExt cx="0" cy="0"/>
+        </a:xfrm>
+      </p:grpSpPr>
+      <p:sp>
+        <p:nvSpPr>
+          <p:cNvPr id="2" name="Заголовок 1"/>
+          <p:cNvSpPr>
+            <a:spLocks noGrp="1"/>
+          </p:cNvSpPr>
+          <p:nvPr>
+            <p:ph type="title"/>
+          </p:nvPr>
+        </p:nvSpPr>
+        <p:spPr>
+          <a:xfrm>
+            <a:off x="457200" y="457200"/>
+            <a:ext cx="8229600" cy="743712"/>
+          </a:xfrm>
+        </p:spPr>
+        <p:txBody>
+          <a:bodyPr>
+            <a:normAutofit/>
+          </a:bodyPr>
+          <a:lstStyle/>
+          <a:p>
+            <a:pPr algn="ctr"/>
+            <a:r>
+              <a:rPr lang="en-US" sz="4500" dirty="0" smtClean="0"/>
+              <a:t>GCR.IO</a:t>
+            </a:r>
+            <a:endParaRPr lang="en-US" sz="4500" dirty="0"/>
+          </a:p>
+        </p:txBody>
+      </p:sp>
+      <p:pic>
+        <p:nvPicPr>
+          <p:cNvPr id="7" name="Содержимое 6" descr="gcp-container-registry-icon.png"/>
+          <p:cNvPicPr>
+            <a:picLocks noGrp="1" noChangeAspect="1"/>
+          </p:cNvPicPr>
+          <p:nvPr>
+            <p:ph idx="1"/>
+          </p:nvPr>
+        </p:nvPicPr>
+        <p:blipFill>
+          <a:blip r:embed="rId2" cstate="print"/>
+          <a:stretch>
+            <a:fillRect/>
+          </a:stretch>
+        </p:blipFill>
+        <p:spPr>
+          <a:xfrm>
+            <a:off x="6934200" y="0"/>
+            <a:ext cx="1264920" cy="1264920"/>
+          </a:xfrm>
+        </p:spPr>
+      </p:pic>
+      <p:pic>
+        <p:nvPicPr>
+          <p:cNvPr id="6" name="Рисунок 5" descr="gcr-io.png"/>
+          <p:cNvPicPr>
+            <a:picLocks noChangeAspect="1"/>
+          </p:cNvPicPr>
+          <p:nvPr/>
+        </p:nvPicPr>
+        <p:blipFill>
+          <a:blip r:embed="rId3" cstate="print"/>
+          <a:stretch>
+            <a:fillRect/>
+          </a:stretch>
+        </p:blipFill>
+        <p:spPr>
+          <a:xfrm>
+            <a:off x="152400" y="1752600"/>
+            <a:ext cx="8763000" cy="1472228"/>
           </a:xfrm>
           <a:prstGeom prst="rect">
             <a:avLst/>

</xml_diff>

<commit_message>
change 3 file Final Task.pptx
</commit_message>
<xml_diff>
--- a/Andrii Kozak Final Task.pptx
+++ b/Andrii Kozak Final Task.pptx
@@ -32,6 +32,7 @@
     <p:sldId id="280" r:id="rId26"/>
     <p:sldId id="281" r:id="rId27"/>
     <p:sldId id="282" r:id="rId28"/>
+    <p:sldId id="283" r:id="rId29"/>
   </p:sldIdLst>
   <p:sldSz cx="9144000" cy="6858000" type="screen4x3"/>
   <p:notesSz cx="6858000" cy="9144000"/>
@@ -6205,47 +6206,8 @@
                 <a:latin typeface="Times New Roman" pitchFamily="18" charset="0"/>
                 <a:cs typeface="Times New Roman" pitchFamily="18" charset="0"/>
               </a:rPr>
-              <a:t>Containers are isolated from one another and bundle their own software, libraries and configuration files; they can communicate with each </a:t>
-            </a:r>
-            <a:r>
-              <a:rPr lang="en-US" sz="2400" dirty="0" smtClean="0">
-                <a:latin typeface="Times New Roman" pitchFamily="18" charset="0"/>
-                <a:cs typeface="Times New Roman" pitchFamily="18" charset="0"/>
-              </a:rPr>
-              <a:t>other </a:t>
-            </a:r>
-            <a:r>
-              <a:rPr lang="en-US" sz="2400" dirty="0" smtClean="0">
-                <a:latin typeface="Times New Roman" pitchFamily="18" charset="0"/>
-                <a:cs typeface="Times New Roman" pitchFamily="18" charset="0"/>
-              </a:rPr>
-              <a:t>through well-defined channels. Because all of the containers share the services of a single operating system kernel, they use fewer </a:t>
-            </a:r>
-            <a:r>
-              <a:rPr lang="en-US" sz="2400" dirty="0" smtClean="0">
-                <a:latin typeface="Times New Roman" pitchFamily="18" charset="0"/>
-                <a:cs typeface="Times New Roman" pitchFamily="18" charset="0"/>
-              </a:rPr>
-              <a:t>resources </a:t>
-            </a:r>
-            <a:r>
-              <a:rPr lang="en-US" sz="2400" dirty="0" smtClean="0">
-                <a:latin typeface="Times New Roman" pitchFamily="18" charset="0"/>
-                <a:cs typeface="Times New Roman" pitchFamily="18" charset="0"/>
-              </a:rPr>
-              <a:t>than virtual machines</a:t>
-            </a:r>
-            <a:r>
-              <a:rPr lang="en-US" sz="2400" dirty="0" smtClean="0">
-                <a:latin typeface="Times New Roman" pitchFamily="18" charset="0"/>
-                <a:cs typeface="Times New Roman" pitchFamily="18" charset="0"/>
-              </a:rPr>
-              <a:t>.</a:t>
-            </a:r>
-            <a:endParaRPr lang="en-US" sz="2400" dirty="0" smtClean="0">
-              <a:latin typeface="Times New Roman" pitchFamily="18" charset="0"/>
-              <a:cs typeface="Times New Roman" pitchFamily="18" charset="0"/>
-            </a:endParaRPr>
+              <a:t>Containers are isolated from one another and bundle their own software, libraries and configuration files; they can communicate with each other through well-defined channels. Because all of the containers share the services of a single operating system kernel, they use fewer resources than virtual machines.</a:t>
+            </a:r>
           </a:p>
           <a:p>
             <a:pPr algn="just"/>
@@ -6590,14 +6552,7 @@
                 <a:latin typeface="Times New Roman" pitchFamily="18" charset="0"/>
                 <a:cs typeface="Times New Roman" pitchFamily="18" charset="0"/>
               </a:rPr>
-              <a:t>The </a:t>
-            </a:r>
-            <a:r>
-              <a:rPr lang="en-US" sz="1800" dirty="0" smtClean="0">
-                <a:latin typeface="Times New Roman" pitchFamily="18" charset="0"/>
-                <a:cs typeface="Times New Roman" pitchFamily="18" charset="0"/>
-              </a:rPr>
-              <a:t>parent image is further modified by installing the Python requirements defined in the requirements.txt file.</a:t>
+              <a:t>The parent image is further modified by installing the Python requirements defined in the requirements.txt file.</a:t>
             </a:r>
             <a:endParaRPr lang="en-US" sz="1800" dirty="0">
               <a:latin typeface="Times New Roman" pitchFamily="18" charset="0"/>
@@ -6834,14 +6789,7 @@
                 <a:latin typeface="Times New Roman" pitchFamily="18" charset="0"/>
                 <a:cs typeface="Times New Roman" pitchFamily="18" charset="0"/>
               </a:rPr>
-              <a:t>   We create </a:t>
-            </a:r>
-            <a:r>
-              <a:rPr lang="en-US" sz="2400" dirty="0" smtClean="0">
-                <a:latin typeface="Times New Roman" pitchFamily="18" charset="0"/>
-                <a:cs typeface="Times New Roman" pitchFamily="18" charset="0"/>
-              </a:rPr>
-              <a:t>the </a:t>
+              <a:t>   We create the </a:t>
             </a:r>
             <a:r>
               <a:rPr lang="en-US" sz="2400" dirty="0" err="1" smtClean="0">
@@ -7055,14 +7003,7 @@
                 <a:latin typeface="Times New Roman" pitchFamily="18" charset="0"/>
                 <a:cs typeface="Times New Roman" pitchFamily="18" charset="0"/>
               </a:rPr>
-              <a:t> -R $USER:$USER </a:t>
-            </a:r>
-            <a:r>
-              <a:rPr lang="en-US" sz="2400" dirty="0" smtClean="0">
-                <a:latin typeface="Times New Roman" pitchFamily="18" charset="0"/>
-                <a:cs typeface="Times New Roman" pitchFamily="18" charset="0"/>
-              </a:rPr>
-              <a:t>.</a:t>
+              <a:t> -R $USER:$USER .</a:t>
             </a:r>
           </a:p>
           <a:p>
@@ -7083,42 +7024,21 @@
                 <a:latin typeface="Times New Roman" pitchFamily="18" charset="0"/>
                 <a:cs typeface="Times New Roman" pitchFamily="18" charset="0"/>
               </a:rPr>
-              <a:t>Run </a:t>
+              <a:t>Run the </a:t>
+            </a:r>
+            <a:r>
+              <a:rPr lang="en-US" sz="2400" dirty="0" err="1" smtClean="0">
+                <a:latin typeface="Times New Roman" pitchFamily="18" charset="0"/>
+                <a:cs typeface="Times New Roman" pitchFamily="18" charset="0"/>
+              </a:rPr>
+              <a:t>docker</a:t>
             </a:r>
             <a:r>
               <a:rPr lang="en-US" sz="2400" dirty="0" smtClean="0">
                 <a:latin typeface="Times New Roman" pitchFamily="18" charset="0"/>
                 <a:cs typeface="Times New Roman" pitchFamily="18" charset="0"/>
               </a:rPr>
-              <a:t>the </a:t>
-            </a:r>
-            <a:r>
-              <a:rPr lang="en-US" sz="2400" dirty="0" err="1" smtClean="0">
-                <a:latin typeface="Times New Roman" pitchFamily="18" charset="0"/>
-                <a:cs typeface="Times New Roman" pitchFamily="18" charset="0"/>
-              </a:rPr>
-              <a:t>docker</a:t>
-            </a:r>
-            <a:r>
-              <a:rPr lang="en-US" sz="2400" dirty="0" smtClean="0">
-                <a:latin typeface="Times New Roman" pitchFamily="18" charset="0"/>
-                <a:cs typeface="Times New Roman" pitchFamily="18" charset="0"/>
-              </a:rPr>
-              <a:t>-compose up command from the top </a:t>
-            </a:r>
-            <a:r>
-              <a:rPr lang="en-US" sz="2400" dirty="0" smtClean="0">
-                <a:latin typeface="Times New Roman" pitchFamily="18" charset="0"/>
-                <a:cs typeface="Times New Roman" pitchFamily="18" charset="0"/>
-              </a:rPr>
-              <a:t>level directory </a:t>
-            </a:r>
-            <a:r>
-              <a:rPr lang="en-US" sz="2400" dirty="0" smtClean="0">
-                <a:latin typeface="Times New Roman" pitchFamily="18" charset="0"/>
-                <a:cs typeface="Times New Roman" pitchFamily="18" charset="0"/>
-              </a:rPr>
-              <a:t>for your project.</a:t>
+              <a:t>-compose up command from the top level directory for your project.</a:t>
             </a:r>
           </a:p>
           <a:p>
@@ -7469,6 +7389,176 @@
           </a:prstGeom>
         </p:spPr>
       </p:pic>
+    </p:spTree>
+  </p:cSld>
+  <p:clrMapOvr>
+    <a:masterClrMapping/>
+  </p:clrMapOvr>
+</p:sld>
+</file>
+
+<file path=ppt/slides/slide28.xml><?xml version="1.0" encoding="utf-8"?>
+<p:sld xmlns:a="http://schemas.openxmlformats.org/drawingml/2006/main" xmlns:r="http://schemas.openxmlformats.org/officeDocument/2006/relationships" xmlns:p="http://schemas.openxmlformats.org/presentationml/2006/main">
+  <p:cSld>
+    <p:spTree>
+      <p:nvGrpSpPr>
+        <p:cNvPr id="1" name=""/>
+        <p:cNvGrpSpPr/>
+        <p:nvPr/>
+      </p:nvGrpSpPr>
+      <p:grpSpPr>
+        <a:xfrm>
+          <a:off x="0" y="0"/>
+          <a:ext cx="0" cy="0"/>
+          <a:chOff x="0" y="0"/>
+          <a:chExt cx="0" cy="0"/>
+        </a:xfrm>
+      </p:grpSpPr>
+      <p:sp>
+        <p:nvSpPr>
+          <p:cNvPr id="3" name="Содержимое 2"/>
+          <p:cNvSpPr>
+            <a:spLocks noGrp="1"/>
+          </p:cNvSpPr>
+          <p:nvPr>
+            <p:ph idx="1"/>
+          </p:nvPr>
+        </p:nvSpPr>
+        <p:spPr/>
+        <p:txBody>
+          <a:bodyPr/>
+          <a:lstStyle/>
+          <a:p>
+            <a:pPr marL="0" indent="0" algn="ctr">
+              <a:buNone/>
+            </a:pPr>
+            <a:r>
+              <a:rPr lang="en-US" sz="4800" dirty="0" smtClean="0">
+                <a:latin typeface="Times New Roman" pitchFamily="18" charset="0"/>
+                <a:cs typeface="Times New Roman" pitchFamily="18" charset="0"/>
+              </a:rPr>
+              <a:t>Thanks for attention</a:t>
+            </a:r>
+            <a:r>
+              <a:rPr lang="ru-RU" sz="4800" dirty="0" smtClean="0">
+                <a:latin typeface="Times New Roman" pitchFamily="18" charset="0"/>
+                <a:cs typeface="Times New Roman" pitchFamily="18" charset="0"/>
+              </a:rPr>
+              <a:t>!</a:t>
+            </a:r>
+            <a:endParaRPr lang="en-US" sz="4800" dirty="0" smtClean="0">
+              <a:latin typeface="Times New Roman" pitchFamily="18" charset="0"/>
+              <a:cs typeface="Times New Roman" pitchFamily="18" charset="0"/>
+            </a:endParaRPr>
+          </a:p>
+          <a:p>
+            <a:pPr marL="0" indent="0" algn="ctr">
+              <a:buNone/>
+            </a:pPr>
+            <a:endParaRPr lang="en-US" sz="4800" dirty="0" smtClean="0">
+              <a:latin typeface="Times New Roman" pitchFamily="18" charset="0"/>
+              <a:cs typeface="Times New Roman" pitchFamily="18" charset="0"/>
+            </a:endParaRPr>
+          </a:p>
+          <a:p>
+            <a:pPr marL="0" indent="0" algn="ctr">
+              <a:buNone/>
+            </a:pPr>
+            <a:endParaRPr lang="ru-RU" sz="4800" dirty="0" smtClean="0">
+              <a:latin typeface="Times New Roman" pitchFamily="18" charset="0"/>
+              <a:cs typeface="Times New Roman" pitchFamily="18" charset="0"/>
+            </a:endParaRPr>
+          </a:p>
+          <a:p>
+            <a:pPr marL="0" indent="0" algn="just">
+              <a:buNone/>
+            </a:pPr>
+            <a:r>
+              <a:rPr lang="uk-UA" sz="2800" dirty="0" smtClean="0">
+                <a:latin typeface="Times New Roman" pitchFamily="18" charset="0"/>
+                <a:cs typeface="Times New Roman" pitchFamily="18" charset="0"/>
+              </a:rPr>
+              <a:t>			</a:t>
+            </a:r>
+            <a:r>
+              <a:rPr lang="en-US" sz="2800" dirty="0" smtClean="0">
+                <a:latin typeface="Times New Roman" pitchFamily="18" charset="0"/>
+                <a:cs typeface="Times New Roman" pitchFamily="18" charset="0"/>
+              </a:rPr>
+              <a:t>Student</a:t>
+            </a:r>
+            <a:r>
+              <a:rPr lang="en-US" sz="2800" dirty="0" smtClean="0">
+                <a:latin typeface="Times New Roman" pitchFamily="18" charset="0"/>
+                <a:cs typeface="Times New Roman" pitchFamily="18" charset="0"/>
+              </a:rPr>
+              <a:t>: </a:t>
+            </a:r>
+            <a:r>
+              <a:rPr lang="en-US" sz="2800" dirty="0" err="1" smtClean="0">
+                <a:latin typeface="Times New Roman" pitchFamily="18" charset="0"/>
+                <a:cs typeface="Times New Roman" pitchFamily="18" charset="0"/>
+              </a:rPr>
+              <a:t>Andrii</a:t>
+            </a:r>
+            <a:r>
+              <a:rPr lang="en-US" sz="2800" dirty="0" smtClean="0">
+                <a:latin typeface="Times New Roman" pitchFamily="18" charset="0"/>
+                <a:cs typeface="Times New Roman" pitchFamily="18" charset="0"/>
+              </a:rPr>
+              <a:t> </a:t>
+            </a:r>
+            <a:r>
+              <a:rPr lang="en-US" sz="2800" dirty="0" err="1" smtClean="0">
+                <a:latin typeface="Times New Roman" pitchFamily="18" charset="0"/>
+                <a:cs typeface="Times New Roman" pitchFamily="18" charset="0"/>
+              </a:rPr>
+              <a:t>Kozak</a:t>
+            </a:r>
+            <a:endParaRPr lang="en-US" sz="2800" dirty="0" smtClean="0">
+              <a:latin typeface="Times New Roman" pitchFamily="18" charset="0"/>
+              <a:cs typeface="Times New Roman" pitchFamily="18" charset="0"/>
+            </a:endParaRPr>
+          </a:p>
+          <a:p>
+            <a:pPr marL="0" indent="0" algn="just">
+              <a:buNone/>
+            </a:pPr>
+            <a:r>
+              <a:rPr lang="uk-UA" sz="2800" smtClean="0">
+                <a:latin typeface="Times New Roman" pitchFamily="18" charset="0"/>
+                <a:cs typeface="Times New Roman" pitchFamily="18" charset="0"/>
+              </a:rPr>
+              <a:t>			</a:t>
+            </a:r>
+            <a:r>
+              <a:rPr lang="en-US" sz="2800" smtClean="0">
+                <a:latin typeface="Times New Roman" pitchFamily="18" charset="0"/>
+                <a:cs typeface="Times New Roman" pitchFamily="18" charset="0"/>
+              </a:rPr>
+              <a:t>Email</a:t>
+            </a:r>
+            <a:r>
+              <a:rPr lang="en-US" sz="2800" dirty="0" smtClean="0">
+                <a:latin typeface="Times New Roman" pitchFamily="18" charset="0"/>
+                <a:cs typeface="Times New Roman" pitchFamily="18" charset="0"/>
+              </a:rPr>
+              <a:t>: </a:t>
+            </a:r>
+            <a:r>
+              <a:rPr lang="en-US" sz="2800" dirty="0" smtClean="0">
+                <a:latin typeface="Times New Roman" pitchFamily="18" charset="0"/>
+                <a:cs typeface="Times New Roman" pitchFamily="18" charset="0"/>
+              </a:rPr>
+              <a:t>agcossack@gmail.com</a:t>
+            </a:r>
+            <a:endParaRPr lang="en-US" sz="2800" dirty="0">
+              <a:latin typeface="Times New Roman" pitchFamily="18" charset="0"/>
+              <a:cs typeface="Times New Roman" pitchFamily="18" charset="0"/>
+            </a:endParaRPr>
+          </a:p>
+        </p:txBody>
+      </p:sp>
     </p:spTree>
   </p:cSld>
   <p:clrMapOvr>

</xml_diff>